<commit_message>
factory method - renamed wrapper to creator component and added top bar in the angular app
</commit_message>
<xml_diff>
--- a/slides/Patrones de diseño con Typescript en el mundo real.pptx
+++ b/slides/Patrones de diseño con Typescript en el mundo real.pptx
@@ -266,7 +266,7 @@
           <a:p>
             <a:fld id="{0985B797-0E29-4660-9B0F-1C71CA65525C}" type="datetimeFigureOut">
               <a:rPr lang="en-US" smtClean="0"/>
-              <a:t>10/25/2019</a:t>
+              <a:t>10/26/2019</a:t>
             </a:fld>
             <a:endParaRPr lang="en-US"/>
           </a:p>
@@ -466,7 +466,7 @@
           <a:p>
             <a:fld id="{0985B797-0E29-4660-9B0F-1C71CA65525C}" type="datetimeFigureOut">
               <a:rPr lang="en-US" smtClean="0"/>
-              <a:t>10/25/2019</a:t>
+              <a:t>10/26/2019</a:t>
             </a:fld>
             <a:endParaRPr lang="en-US"/>
           </a:p>
@@ -676,7 +676,7 @@
           <a:p>
             <a:fld id="{0985B797-0E29-4660-9B0F-1C71CA65525C}" type="datetimeFigureOut">
               <a:rPr lang="en-US" smtClean="0"/>
-              <a:t>10/25/2019</a:t>
+              <a:t>10/26/2019</a:t>
             </a:fld>
             <a:endParaRPr lang="en-US"/>
           </a:p>
@@ -876,7 +876,7 @@
           <a:p>
             <a:fld id="{0985B797-0E29-4660-9B0F-1C71CA65525C}" type="datetimeFigureOut">
               <a:rPr lang="en-US" smtClean="0"/>
-              <a:t>10/25/2019</a:t>
+              <a:t>10/26/2019</a:t>
             </a:fld>
             <a:endParaRPr lang="en-US"/>
           </a:p>
@@ -1152,7 +1152,7 @@
           <a:p>
             <a:fld id="{0985B797-0E29-4660-9B0F-1C71CA65525C}" type="datetimeFigureOut">
               <a:rPr lang="en-US" smtClean="0"/>
-              <a:t>10/25/2019</a:t>
+              <a:t>10/26/2019</a:t>
             </a:fld>
             <a:endParaRPr lang="en-US"/>
           </a:p>
@@ -1420,7 +1420,7 @@
           <a:p>
             <a:fld id="{0985B797-0E29-4660-9B0F-1C71CA65525C}" type="datetimeFigureOut">
               <a:rPr lang="en-US" smtClean="0"/>
-              <a:t>10/25/2019</a:t>
+              <a:t>10/26/2019</a:t>
             </a:fld>
             <a:endParaRPr lang="en-US"/>
           </a:p>
@@ -1835,7 +1835,7 @@
           <a:p>
             <a:fld id="{0985B797-0E29-4660-9B0F-1C71CA65525C}" type="datetimeFigureOut">
               <a:rPr lang="en-US" smtClean="0"/>
-              <a:t>10/25/2019</a:t>
+              <a:t>10/26/2019</a:t>
             </a:fld>
             <a:endParaRPr lang="en-US"/>
           </a:p>
@@ -1977,7 +1977,7 @@
           <a:p>
             <a:fld id="{0985B797-0E29-4660-9B0F-1C71CA65525C}" type="datetimeFigureOut">
               <a:rPr lang="en-US" smtClean="0"/>
-              <a:t>10/25/2019</a:t>
+              <a:t>10/26/2019</a:t>
             </a:fld>
             <a:endParaRPr lang="en-US"/>
           </a:p>
@@ -2090,7 +2090,7 @@
           <a:p>
             <a:fld id="{0985B797-0E29-4660-9B0F-1C71CA65525C}" type="datetimeFigureOut">
               <a:rPr lang="en-US" smtClean="0"/>
-              <a:t>10/25/2019</a:t>
+              <a:t>10/26/2019</a:t>
             </a:fld>
             <a:endParaRPr lang="en-US"/>
           </a:p>
@@ -2403,7 +2403,7 @@
           <a:p>
             <a:fld id="{0985B797-0E29-4660-9B0F-1C71CA65525C}" type="datetimeFigureOut">
               <a:rPr lang="en-US" smtClean="0"/>
-              <a:t>10/25/2019</a:t>
+              <a:t>10/26/2019</a:t>
             </a:fld>
             <a:endParaRPr lang="en-US"/>
           </a:p>
@@ -2692,7 +2692,7 @@
           <a:p>
             <a:fld id="{0985B797-0E29-4660-9B0F-1C71CA65525C}" type="datetimeFigureOut">
               <a:rPr lang="en-US" smtClean="0"/>
-              <a:t>10/25/2019</a:t>
+              <a:t>10/26/2019</a:t>
             </a:fld>
             <a:endParaRPr lang="en-US"/>
           </a:p>
@@ -2935,7 +2935,7 @@
           <a:p>
             <a:fld id="{0985B797-0E29-4660-9B0F-1C71CA65525C}" type="datetimeFigureOut">
               <a:rPr lang="en-US" smtClean="0"/>
-              <a:t>10/25/2019</a:t>
+              <a:t>10/26/2019</a:t>
             </a:fld>
             <a:endParaRPr lang="en-US"/>
           </a:p>
@@ -5664,43 +5664,6 @@
           </a:effectLst>
         </p:spPr>
       </p:pic>
-      <p:pic>
-        <p:nvPicPr>
-          <p:cNvPr id="15" name="Imagen 14">
-            <a:extLst>
-              <a:ext uri="{FF2B5EF4-FFF2-40B4-BE49-F238E27FC236}">
-                <a16:creationId xmlns:a16="http://schemas.microsoft.com/office/drawing/2014/main" id="{53F864D0-8C3F-4518-A3B1-648B52A65960}"/>
-              </a:ext>
-            </a:extLst>
-          </p:cNvPr>
-          <p:cNvPicPr>
-            <a:picLocks noChangeAspect="1"/>
-          </p:cNvPicPr>
-          <p:nvPr/>
-        </p:nvPicPr>
-        <p:blipFill>
-          <a:blip r:embed="rId4"/>
-          <a:stretch>
-            <a:fillRect/>
-          </a:stretch>
-        </p:blipFill>
-        <p:spPr>
-          <a:xfrm>
-            <a:off x="6567864" y="2155699"/>
-            <a:ext cx="5515533" cy="3373454"/>
-          </a:xfrm>
-          <a:prstGeom prst="rect">
-            <a:avLst/>
-          </a:prstGeom>
-          <a:effectLst>
-            <a:glow rad="25400">
-              <a:schemeClr val="bg1">
-                <a:alpha val="40000"/>
-              </a:schemeClr>
-            </a:glow>
-          </a:effectLst>
-        </p:spPr>
-      </p:pic>
       <p:cxnSp>
         <p:nvCxnSpPr>
           <p:cNvPr id="27" name="Conector recto de flecha 26">
@@ -5845,7 +5808,7 @@
         </p:nvSpPr>
         <p:spPr>
           <a:xfrm>
-            <a:off x="5720382" y="2090384"/>
+            <a:off x="5670848" y="2076804"/>
             <a:ext cx="1376218" cy="338554"/>
           </a:xfrm>
           <a:prstGeom prst="rect">
@@ -5959,10 +5922,79 @@
       </p:sp>
       <p:pic>
         <p:nvPicPr>
-          <p:cNvPr id="52" name="Imagen 51">
-            <a:extLst>
-              <a:ext uri="{FF2B5EF4-FFF2-40B4-BE49-F238E27FC236}">
-                <a16:creationId xmlns:a16="http://schemas.microsoft.com/office/drawing/2014/main" id="{5BB59DB6-5E71-4EE6-89AA-ACD7DD387B33}"/>
+          <p:cNvPr id="53" name="Imagen 52">
+            <a:extLst>
+              <a:ext uri="{FF2B5EF4-FFF2-40B4-BE49-F238E27FC236}">
+                <a16:creationId xmlns:a16="http://schemas.microsoft.com/office/drawing/2014/main" id="{258348A1-8868-4B4B-B380-B32C7F6D44D0}"/>
+              </a:ext>
+            </a:extLst>
+          </p:cNvPr>
+          <p:cNvPicPr>
+            <a:picLocks noChangeAspect="1"/>
+          </p:cNvPicPr>
+          <p:nvPr/>
+        </p:nvPicPr>
+        <p:blipFill>
+          <a:blip r:embed="rId4"/>
+          <a:stretch>
+            <a:fillRect/>
+          </a:stretch>
+        </p:blipFill>
+        <p:spPr>
+          <a:xfrm>
+            <a:off x="329997" y="4798389"/>
+            <a:ext cx="3219074" cy="1642218"/>
+          </a:xfrm>
+          <a:prstGeom prst="rect">
+            <a:avLst/>
+          </a:prstGeom>
+        </p:spPr>
+      </p:pic>
+      <p:sp>
+        <p:nvSpPr>
+          <p:cNvPr id="95" name="CuadroTexto 94">
+            <a:extLst>
+              <a:ext uri="{FF2B5EF4-FFF2-40B4-BE49-F238E27FC236}">
+                <a16:creationId xmlns:a16="http://schemas.microsoft.com/office/drawing/2014/main" id="{67848249-14A6-4729-A6A1-BB8AF75BB5E5}"/>
+              </a:ext>
+            </a:extLst>
+          </p:cNvPr>
+          <p:cNvSpPr txBox="1"/>
+          <p:nvPr/>
+        </p:nvSpPr>
+        <p:spPr>
+          <a:xfrm>
+            <a:off x="175289" y="3723216"/>
+            <a:ext cx="935768" cy="369332"/>
+          </a:xfrm>
+          <a:prstGeom prst="rect">
+            <a:avLst/>
+          </a:prstGeom>
+          <a:noFill/>
+        </p:spPr>
+        <p:txBody>
+          <a:bodyPr wrap="square" rtlCol="0">
+            <a:spAutoFit/>
+          </a:bodyPr>
+          <a:lstStyle/>
+          <a:p>
+            <a:r>
+              <a:rPr lang="en-US" dirty="0">
+                <a:solidFill>
+                  <a:schemeClr val="bg1"/>
+                </a:solidFill>
+              </a:rPr>
+              <a:t>Usage:</a:t>
+            </a:r>
+          </a:p>
+        </p:txBody>
+      </p:sp>
+      <p:pic>
+        <p:nvPicPr>
+          <p:cNvPr id="98" name="Imagen 97">
+            <a:extLst>
+              <a:ext uri="{FF2B5EF4-FFF2-40B4-BE49-F238E27FC236}">
+                <a16:creationId xmlns:a16="http://schemas.microsoft.com/office/drawing/2014/main" id="{FD217EEE-32A7-4431-A10D-C72C9D432A7D}"/>
               </a:ext>
             </a:extLst>
           </p:cNvPr>
@@ -5979,8 +6011,8 @@
         </p:blipFill>
         <p:spPr>
           <a:xfrm>
-            <a:off x="288904" y="4200065"/>
-            <a:ext cx="5515533" cy="578890"/>
+            <a:off x="235185" y="2097665"/>
+            <a:ext cx="5328679" cy="598728"/>
           </a:xfrm>
           <a:prstGeom prst="rect">
             <a:avLst/>
@@ -5989,10 +6021,10 @@
       </p:pic>
       <p:pic>
         <p:nvPicPr>
-          <p:cNvPr id="53" name="Imagen 52">
-            <a:extLst>
-              <a:ext uri="{FF2B5EF4-FFF2-40B4-BE49-F238E27FC236}">
-                <a16:creationId xmlns:a16="http://schemas.microsoft.com/office/drawing/2014/main" id="{258348A1-8868-4B4B-B380-B32C7F6D44D0}"/>
+          <p:cNvPr id="99" name="Imagen 98">
+            <a:extLst>
+              <a:ext uri="{FF2B5EF4-FFF2-40B4-BE49-F238E27FC236}">
+                <a16:creationId xmlns:a16="http://schemas.microsoft.com/office/drawing/2014/main" id="{B7554640-2141-4ECA-9DBB-AA03B44695E0}"/>
               </a:ext>
             </a:extLst>
           </p:cNvPr>
@@ -6009,59 +6041,20 @@
         </p:blipFill>
         <p:spPr>
           <a:xfrm>
-            <a:off x="288904" y="4859508"/>
-            <a:ext cx="3219074" cy="1642218"/>
+            <a:off x="244407" y="1395745"/>
+            <a:ext cx="5143609" cy="631952"/>
           </a:xfrm>
           <a:prstGeom prst="rect">
             <a:avLst/>
           </a:prstGeom>
         </p:spPr>
       </p:pic>
-      <p:sp>
-        <p:nvSpPr>
-          <p:cNvPr id="95" name="CuadroTexto 94">
-            <a:extLst>
-              <a:ext uri="{FF2B5EF4-FFF2-40B4-BE49-F238E27FC236}">
-                <a16:creationId xmlns:a16="http://schemas.microsoft.com/office/drawing/2014/main" id="{67848249-14A6-4729-A6A1-BB8AF75BB5E5}"/>
-              </a:ext>
-            </a:extLst>
-          </p:cNvPr>
-          <p:cNvSpPr txBox="1"/>
-          <p:nvPr/>
-        </p:nvSpPr>
-        <p:spPr>
-          <a:xfrm>
-            <a:off x="175289" y="3723216"/>
-            <a:ext cx="935768" cy="369332"/>
-          </a:xfrm>
-          <a:prstGeom prst="rect">
-            <a:avLst/>
-          </a:prstGeom>
-          <a:noFill/>
-        </p:spPr>
-        <p:txBody>
-          <a:bodyPr wrap="square" rtlCol="0">
-            <a:spAutoFit/>
-          </a:bodyPr>
-          <a:lstStyle/>
-          <a:p>
-            <a:r>
-              <a:rPr lang="en-US" dirty="0">
-                <a:solidFill>
-                  <a:schemeClr val="bg1"/>
-                </a:solidFill>
-              </a:rPr>
-              <a:t>Usage:</a:t>
-            </a:r>
-          </a:p>
-        </p:txBody>
-      </p:sp>
       <p:pic>
         <p:nvPicPr>
-          <p:cNvPr id="98" name="Imagen 97">
-            <a:extLst>
-              <a:ext uri="{FF2B5EF4-FFF2-40B4-BE49-F238E27FC236}">
-                <a16:creationId xmlns:a16="http://schemas.microsoft.com/office/drawing/2014/main" id="{FD217EEE-32A7-4431-A10D-C72C9D432A7D}"/>
+          <p:cNvPr id="100" name="Imagen 99">
+            <a:extLst>
+              <a:ext uri="{FF2B5EF4-FFF2-40B4-BE49-F238E27FC236}">
+                <a16:creationId xmlns:a16="http://schemas.microsoft.com/office/drawing/2014/main" id="{0D705CEE-9F14-416B-8B73-39260594E740}"/>
               </a:ext>
             </a:extLst>
           </p:cNvPr>
@@ -6078,8 +6071,8 @@
         </p:blipFill>
         <p:spPr>
           <a:xfrm>
-            <a:off x="235185" y="2097665"/>
-            <a:ext cx="5328679" cy="598728"/>
+            <a:off x="235185" y="2755462"/>
+            <a:ext cx="5290656" cy="629285"/>
           </a:xfrm>
           <a:prstGeom prst="rect">
             <a:avLst/>
@@ -6088,10 +6081,10 @@
       </p:pic>
       <p:pic>
         <p:nvPicPr>
-          <p:cNvPr id="99" name="Imagen 98">
-            <a:extLst>
-              <a:ext uri="{FF2B5EF4-FFF2-40B4-BE49-F238E27FC236}">
-                <a16:creationId xmlns:a16="http://schemas.microsoft.com/office/drawing/2014/main" id="{B7554640-2141-4ECA-9DBB-AA03B44695E0}"/>
+          <p:cNvPr id="2" name="Imagen 1">
+            <a:extLst>
+              <a:ext uri="{FF2B5EF4-FFF2-40B4-BE49-F238E27FC236}">
+                <a16:creationId xmlns:a16="http://schemas.microsoft.com/office/drawing/2014/main" id="{609F9505-B986-494B-892B-D1F095D77BE1}"/>
               </a:ext>
             </a:extLst>
           </p:cNvPr>
@@ -6108,8 +6101,8 @@
         </p:blipFill>
         <p:spPr>
           <a:xfrm>
-            <a:off x="244407" y="1395745"/>
-            <a:ext cx="5143609" cy="631952"/>
+            <a:off x="288904" y="4238453"/>
+            <a:ext cx="5431478" cy="446854"/>
           </a:xfrm>
           <a:prstGeom prst="rect">
             <a:avLst/>
@@ -6118,10 +6111,10 @@
       </p:pic>
       <p:pic>
         <p:nvPicPr>
-          <p:cNvPr id="100" name="Imagen 99">
-            <a:extLst>
-              <a:ext uri="{FF2B5EF4-FFF2-40B4-BE49-F238E27FC236}">
-                <a16:creationId xmlns:a16="http://schemas.microsoft.com/office/drawing/2014/main" id="{0D705CEE-9F14-416B-8B73-39260594E740}"/>
+          <p:cNvPr id="3" name="Imagen 2">
+            <a:extLst>
+              <a:ext uri="{FF2B5EF4-FFF2-40B4-BE49-F238E27FC236}">
+                <a16:creationId xmlns:a16="http://schemas.microsoft.com/office/drawing/2014/main" id="{9ECA7B51-42E0-45E5-BDA6-E7BA03961FBE}"/>
               </a:ext>
             </a:extLst>
           </p:cNvPr>
@@ -6138,12 +6131,19 @@
         </p:blipFill>
         <p:spPr>
           <a:xfrm>
-            <a:off x="235185" y="2755462"/>
-            <a:ext cx="5290656" cy="629285"/>
+            <a:off x="6442125" y="2157145"/>
+            <a:ext cx="5662740" cy="3508364"/>
           </a:xfrm>
           <a:prstGeom prst="rect">
             <a:avLst/>
           </a:prstGeom>
+          <a:effectLst>
+            <a:glow rad="25400">
+              <a:schemeClr val="bg1">
+                <a:alpha val="40000"/>
+              </a:schemeClr>
+            </a:glow>
+          </a:effectLst>
         </p:spPr>
       </p:pic>
     </p:spTree>

</xml_diff>

<commit_message>
added simple connector and store and updated mvvm pattern
</commit_message>
<xml_diff>
--- a/slides/Patrones de diseño con Typescript en el mundo real.pptx
+++ b/slides/Patrones de diseño con Typescript en el mundo real.pptx
@@ -300,7 +300,7 @@
           <a:p>
             <a:fld id="{0985B797-0E29-4660-9B0F-1C71CA65525C}" type="datetimeFigureOut">
               <a:rPr lang="en-US" smtClean="0"/>
-              <a:t>10/29/2019</a:t>
+              <a:t>10/30/2019</a:t>
             </a:fld>
             <a:endParaRPr lang="en-US"/>
           </a:p>
@@ -500,7 +500,7 @@
           <a:p>
             <a:fld id="{0985B797-0E29-4660-9B0F-1C71CA65525C}" type="datetimeFigureOut">
               <a:rPr lang="en-US" smtClean="0"/>
-              <a:t>10/29/2019</a:t>
+              <a:t>10/30/2019</a:t>
             </a:fld>
             <a:endParaRPr lang="en-US"/>
           </a:p>
@@ -710,7 +710,7 @@
           <a:p>
             <a:fld id="{0985B797-0E29-4660-9B0F-1C71CA65525C}" type="datetimeFigureOut">
               <a:rPr lang="en-US" smtClean="0"/>
-              <a:t>10/29/2019</a:t>
+              <a:t>10/30/2019</a:t>
             </a:fld>
             <a:endParaRPr lang="en-US"/>
           </a:p>
@@ -910,7 +910,7 @@
           <a:p>
             <a:fld id="{0985B797-0E29-4660-9B0F-1C71CA65525C}" type="datetimeFigureOut">
               <a:rPr lang="en-US" smtClean="0"/>
-              <a:t>10/29/2019</a:t>
+              <a:t>10/30/2019</a:t>
             </a:fld>
             <a:endParaRPr lang="en-US"/>
           </a:p>
@@ -1186,7 +1186,7 @@
           <a:p>
             <a:fld id="{0985B797-0E29-4660-9B0F-1C71CA65525C}" type="datetimeFigureOut">
               <a:rPr lang="en-US" smtClean="0"/>
-              <a:t>10/29/2019</a:t>
+              <a:t>10/30/2019</a:t>
             </a:fld>
             <a:endParaRPr lang="en-US"/>
           </a:p>
@@ -1454,7 +1454,7 @@
           <a:p>
             <a:fld id="{0985B797-0E29-4660-9B0F-1C71CA65525C}" type="datetimeFigureOut">
               <a:rPr lang="en-US" smtClean="0"/>
-              <a:t>10/29/2019</a:t>
+              <a:t>10/30/2019</a:t>
             </a:fld>
             <a:endParaRPr lang="en-US"/>
           </a:p>
@@ -1869,7 +1869,7 @@
           <a:p>
             <a:fld id="{0985B797-0E29-4660-9B0F-1C71CA65525C}" type="datetimeFigureOut">
               <a:rPr lang="en-US" smtClean="0"/>
-              <a:t>10/29/2019</a:t>
+              <a:t>10/30/2019</a:t>
             </a:fld>
             <a:endParaRPr lang="en-US"/>
           </a:p>
@@ -2011,7 +2011,7 @@
           <a:p>
             <a:fld id="{0985B797-0E29-4660-9B0F-1C71CA65525C}" type="datetimeFigureOut">
               <a:rPr lang="en-US" smtClean="0"/>
-              <a:t>10/29/2019</a:t>
+              <a:t>10/30/2019</a:t>
             </a:fld>
             <a:endParaRPr lang="en-US"/>
           </a:p>
@@ -2124,7 +2124,7 @@
           <a:p>
             <a:fld id="{0985B797-0E29-4660-9B0F-1C71CA65525C}" type="datetimeFigureOut">
               <a:rPr lang="en-US" smtClean="0"/>
-              <a:t>10/29/2019</a:t>
+              <a:t>10/30/2019</a:t>
             </a:fld>
             <a:endParaRPr lang="en-US"/>
           </a:p>
@@ -2437,7 +2437,7 @@
           <a:p>
             <a:fld id="{0985B797-0E29-4660-9B0F-1C71CA65525C}" type="datetimeFigureOut">
               <a:rPr lang="en-US" smtClean="0"/>
-              <a:t>10/29/2019</a:t>
+              <a:t>10/30/2019</a:t>
             </a:fld>
             <a:endParaRPr lang="en-US"/>
           </a:p>
@@ -2726,7 +2726,7 @@
           <a:p>
             <a:fld id="{0985B797-0E29-4660-9B0F-1C71CA65525C}" type="datetimeFigureOut">
               <a:rPr lang="en-US" smtClean="0"/>
-              <a:t>10/29/2019</a:t>
+              <a:t>10/30/2019</a:t>
             </a:fld>
             <a:endParaRPr lang="en-US"/>
           </a:p>
@@ -2969,7 +2969,7 @@
           <a:p>
             <a:fld id="{0985B797-0E29-4660-9B0F-1C71CA65525C}" type="datetimeFigureOut">
               <a:rPr lang="en-US" smtClean="0"/>
-              <a:t>10/29/2019</a:t>
+              <a:t>10/30/2019</a:t>
             </a:fld>
             <a:endParaRPr lang="en-US"/>
           </a:p>
@@ -11715,10 +11715,10 @@
       </p:sp>
       <p:pic>
         <p:nvPicPr>
-          <p:cNvPr id="18" name="Imagen 17">
-            <a:extLst>
-              <a:ext uri="{FF2B5EF4-FFF2-40B4-BE49-F238E27FC236}">
-                <a16:creationId xmlns:a16="http://schemas.microsoft.com/office/drawing/2014/main" id="{7100EEAD-5007-4563-B3A6-F4D7A44A81B0}"/>
+          <p:cNvPr id="19" name="Imagen 18">
+            <a:extLst>
+              <a:ext uri="{FF2B5EF4-FFF2-40B4-BE49-F238E27FC236}">
+                <a16:creationId xmlns:a16="http://schemas.microsoft.com/office/drawing/2014/main" id="{AD0CDA8F-35A5-48B4-9D35-466C095B6E83}"/>
               </a:ext>
             </a:extLst>
           </p:cNvPr>
@@ -11735,8 +11735,8 @@
         </p:blipFill>
         <p:spPr>
           <a:xfrm>
-            <a:off x="6439688" y="431999"/>
-            <a:ext cx="5124450" cy="1543050"/>
+            <a:off x="2464109" y="3141771"/>
+            <a:ext cx="6286500" cy="3343275"/>
           </a:xfrm>
           <a:prstGeom prst="rect">
             <a:avLst/>
@@ -11752,10 +11752,10 @@
       </p:pic>
       <p:pic>
         <p:nvPicPr>
-          <p:cNvPr id="19" name="Imagen 18">
-            <a:extLst>
-              <a:ext uri="{FF2B5EF4-FFF2-40B4-BE49-F238E27FC236}">
-                <a16:creationId xmlns:a16="http://schemas.microsoft.com/office/drawing/2014/main" id="{AD0CDA8F-35A5-48B4-9D35-466C095B6E83}"/>
+          <p:cNvPr id="20" name="Imagen 19">
+            <a:extLst>
+              <a:ext uri="{FF2B5EF4-FFF2-40B4-BE49-F238E27FC236}">
+                <a16:creationId xmlns:a16="http://schemas.microsoft.com/office/drawing/2014/main" id="{0CB9DBB1-A444-47E7-8C56-084B56BC9929}"/>
               </a:ext>
             </a:extLst>
           </p:cNvPr>
@@ -11772,8 +11772,8 @@
         </p:blipFill>
         <p:spPr>
           <a:xfrm>
-            <a:off x="2464109" y="3141771"/>
-            <a:ext cx="6286500" cy="3343275"/>
+            <a:off x="1170789" y="1365448"/>
+            <a:ext cx="2019300" cy="1219200"/>
           </a:xfrm>
           <a:prstGeom prst="rect">
             <a:avLst/>
@@ -11787,12 +11787,265 @@
           </a:effectLst>
         </p:spPr>
       </p:pic>
+      <p:cxnSp>
+        <p:nvCxnSpPr>
+          <p:cNvPr id="21" name="Conector recto de flecha 20">
+            <a:extLst>
+              <a:ext uri="{FF2B5EF4-FFF2-40B4-BE49-F238E27FC236}">
+                <a16:creationId xmlns:a16="http://schemas.microsoft.com/office/drawing/2014/main" id="{6081FD7E-32DF-4951-9784-B2FFCABB9DBB}"/>
+              </a:ext>
+            </a:extLst>
+          </p:cNvPr>
+          <p:cNvCxnSpPr>
+            <a:cxnSpLocks/>
+            <a:stCxn id="19" idx="0"/>
+            <a:endCxn id="20" idx="3"/>
+          </p:cNvCxnSpPr>
+          <p:nvPr/>
+        </p:nvCxnSpPr>
+        <p:spPr>
+          <a:xfrm flipH="1" flipV="1">
+            <a:off x="3190089" y="1975048"/>
+            <a:ext cx="2417270" cy="1166723"/>
+          </a:xfrm>
+          <a:prstGeom prst="straightConnector1">
+            <a:avLst/>
+          </a:prstGeom>
+          <a:ln w="12700">
+            <a:solidFill>
+              <a:schemeClr val="bg1"/>
+            </a:solidFill>
+            <a:tailEnd type="triangle"/>
+          </a:ln>
+        </p:spPr>
+        <p:style>
+          <a:lnRef idx="1">
+            <a:schemeClr val="accent1"/>
+          </a:lnRef>
+          <a:fillRef idx="0">
+            <a:schemeClr val="accent1"/>
+          </a:fillRef>
+          <a:effectRef idx="0">
+            <a:schemeClr val="accent1"/>
+          </a:effectRef>
+          <a:fontRef idx="minor">
+            <a:schemeClr val="tx1"/>
+          </a:fontRef>
+        </p:style>
+      </p:cxnSp>
+      <p:sp>
+        <p:nvSpPr>
+          <p:cNvPr id="22" name="CuadroTexto 21">
+            <a:extLst>
+              <a:ext uri="{FF2B5EF4-FFF2-40B4-BE49-F238E27FC236}">
+                <a16:creationId xmlns:a16="http://schemas.microsoft.com/office/drawing/2014/main" id="{C441E18B-5085-4218-841B-6CBDE9D09AA2}"/>
+              </a:ext>
+            </a:extLst>
+          </p:cNvPr>
+          <p:cNvSpPr txBox="1"/>
+          <p:nvPr/>
+        </p:nvSpPr>
+        <p:spPr>
+          <a:xfrm rot="1518848">
+            <a:off x="3913144" y="2251538"/>
+            <a:ext cx="1376218" cy="369332"/>
+          </a:xfrm>
+          <a:prstGeom prst="rect">
+            <a:avLst/>
+          </a:prstGeom>
+          <a:noFill/>
+        </p:spPr>
+        <p:txBody>
+          <a:bodyPr wrap="square" rtlCol="0">
+            <a:spAutoFit/>
+          </a:bodyPr>
+          <a:lstStyle/>
+          <a:p>
+            <a:r>
+              <a:rPr lang="en-US" dirty="0">
+                <a:solidFill>
+                  <a:schemeClr val="bg1"/>
+                </a:solidFill>
+              </a:rPr>
+              <a:t>contains</a:t>
+            </a:r>
+          </a:p>
+        </p:txBody>
+      </p:sp>
+      <p:cxnSp>
+        <p:nvCxnSpPr>
+          <p:cNvPr id="23" name="Conector recto de flecha 22">
+            <a:extLst>
+              <a:ext uri="{FF2B5EF4-FFF2-40B4-BE49-F238E27FC236}">
+                <a16:creationId xmlns:a16="http://schemas.microsoft.com/office/drawing/2014/main" id="{574D6455-8697-43A6-AD09-A3DEB8692CB8}"/>
+              </a:ext>
+            </a:extLst>
+          </p:cNvPr>
+          <p:cNvCxnSpPr>
+            <a:cxnSpLocks/>
+          </p:cNvCxnSpPr>
+          <p:nvPr/>
+        </p:nvCxnSpPr>
+        <p:spPr>
+          <a:xfrm flipV="1">
+            <a:off x="7123569" y="1975049"/>
+            <a:ext cx="1878344" cy="1166723"/>
+          </a:xfrm>
+          <a:prstGeom prst="straightConnector1">
+            <a:avLst/>
+          </a:prstGeom>
+          <a:ln w="12700">
+            <a:solidFill>
+              <a:schemeClr val="bg1"/>
+            </a:solidFill>
+            <a:headEnd type="none"/>
+            <a:tailEnd type="triangle"/>
+          </a:ln>
+        </p:spPr>
+        <p:style>
+          <a:lnRef idx="1">
+            <a:schemeClr val="accent1"/>
+          </a:lnRef>
+          <a:fillRef idx="0">
+            <a:schemeClr val="accent1"/>
+          </a:fillRef>
+          <a:effectRef idx="0">
+            <a:schemeClr val="accent1"/>
+          </a:effectRef>
+          <a:fontRef idx="minor">
+            <a:schemeClr val="tx1"/>
+          </a:fontRef>
+        </p:style>
+      </p:cxnSp>
+      <p:sp>
+        <p:nvSpPr>
+          <p:cNvPr id="25" name="CuadroTexto 24">
+            <a:extLst>
+              <a:ext uri="{FF2B5EF4-FFF2-40B4-BE49-F238E27FC236}">
+                <a16:creationId xmlns:a16="http://schemas.microsoft.com/office/drawing/2014/main" id="{02F6BD05-4155-4839-8166-B0525AEC5FB7}"/>
+              </a:ext>
+            </a:extLst>
+          </p:cNvPr>
+          <p:cNvSpPr txBox="1"/>
+          <p:nvPr/>
+        </p:nvSpPr>
+        <p:spPr>
+          <a:xfrm rot="19684380">
+            <a:off x="7321205" y="2156818"/>
+            <a:ext cx="1376218" cy="369332"/>
+          </a:xfrm>
+          <a:prstGeom prst="rect">
+            <a:avLst/>
+          </a:prstGeom>
+          <a:noFill/>
+        </p:spPr>
+        <p:txBody>
+          <a:bodyPr wrap="square" rtlCol="0">
+            <a:spAutoFit/>
+          </a:bodyPr>
+          <a:lstStyle/>
+          <a:p>
+            <a:r>
+              <a:rPr lang="en-US" dirty="0">
+                <a:solidFill>
+                  <a:schemeClr val="bg1"/>
+                </a:solidFill>
+              </a:rPr>
+              <a:t>shows</a:t>
+            </a:r>
+          </a:p>
+        </p:txBody>
+      </p:sp>
+      <p:cxnSp>
+        <p:nvCxnSpPr>
+          <p:cNvPr id="26" name="Conector recto de flecha 25">
+            <a:extLst>
+              <a:ext uri="{FF2B5EF4-FFF2-40B4-BE49-F238E27FC236}">
+                <a16:creationId xmlns:a16="http://schemas.microsoft.com/office/drawing/2014/main" id="{EAF687F8-0C6A-4F5F-8D35-524D606EF8AA}"/>
+              </a:ext>
+            </a:extLst>
+          </p:cNvPr>
+          <p:cNvCxnSpPr>
+            <a:cxnSpLocks/>
+          </p:cNvCxnSpPr>
+          <p:nvPr/>
+        </p:nvCxnSpPr>
+        <p:spPr>
+          <a:xfrm flipV="1">
+            <a:off x="8009314" y="1944088"/>
+            <a:ext cx="1803404" cy="1162436"/>
+          </a:xfrm>
+          <a:prstGeom prst="straightConnector1">
+            <a:avLst/>
+          </a:prstGeom>
+          <a:ln w="12700">
+            <a:solidFill>
+              <a:schemeClr val="bg1"/>
+            </a:solidFill>
+            <a:headEnd type="triangle"/>
+            <a:tailEnd type="none"/>
+          </a:ln>
+        </p:spPr>
+        <p:style>
+          <a:lnRef idx="1">
+            <a:schemeClr val="accent1"/>
+          </a:lnRef>
+          <a:fillRef idx="0">
+            <a:schemeClr val="accent1"/>
+          </a:fillRef>
+          <a:effectRef idx="0">
+            <a:schemeClr val="accent1"/>
+          </a:effectRef>
+          <a:fontRef idx="minor">
+            <a:schemeClr val="tx1"/>
+          </a:fontRef>
+        </p:style>
+      </p:cxnSp>
+      <p:sp>
+        <p:nvSpPr>
+          <p:cNvPr id="30" name="CuadroTexto 29">
+            <a:extLst>
+              <a:ext uri="{FF2B5EF4-FFF2-40B4-BE49-F238E27FC236}">
+                <a16:creationId xmlns:a16="http://schemas.microsoft.com/office/drawing/2014/main" id="{1A6D4CFD-9757-4884-8C01-C19D63E26B51}"/>
+              </a:ext>
+            </a:extLst>
+          </p:cNvPr>
+          <p:cNvSpPr txBox="1"/>
+          <p:nvPr/>
+        </p:nvSpPr>
+        <p:spPr>
+          <a:xfrm rot="19684380">
+            <a:off x="8602317" y="2280255"/>
+            <a:ext cx="1376218" cy="369332"/>
+          </a:xfrm>
+          <a:prstGeom prst="rect">
+            <a:avLst/>
+          </a:prstGeom>
+          <a:noFill/>
+        </p:spPr>
+        <p:txBody>
+          <a:bodyPr wrap="square" rtlCol="0">
+            <a:spAutoFit/>
+          </a:bodyPr>
+          <a:lstStyle/>
+          <a:p>
+            <a:r>
+              <a:rPr lang="en-US" dirty="0">
+                <a:solidFill>
+                  <a:schemeClr val="bg1"/>
+                </a:solidFill>
+              </a:rPr>
+              <a:t>calls</a:t>
+            </a:r>
+          </a:p>
+        </p:txBody>
+      </p:sp>
       <p:pic>
         <p:nvPicPr>
-          <p:cNvPr id="20" name="Imagen 19">
-            <a:extLst>
-              <a:ext uri="{FF2B5EF4-FFF2-40B4-BE49-F238E27FC236}">
-                <a16:creationId xmlns:a16="http://schemas.microsoft.com/office/drawing/2014/main" id="{0CB9DBB1-A444-47E7-8C56-084B56BC9929}"/>
+          <p:cNvPr id="4" name="Imagen 3">
+            <a:extLst>
+              <a:ext uri="{FF2B5EF4-FFF2-40B4-BE49-F238E27FC236}">
+                <a16:creationId xmlns:a16="http://schemas.microsoft.com/office/drawing/2014/main" id="{9BF0D330-2B6A-4399-AD67-B9065E442DE6}"/>
               </a:ext>
             </a:extLst>
           </p:cNvPr>
@@ -11809,8 +12062,8 @@
         </p:blipFill>
         <p:spPr>
           <a:xfrm>
-            <a:off x="1170789" y="1365448"/>
-            <a:ext cx="2019300" cy="1219200"/>
+            <a:off x="7357891" y="1201138"/>
+            <a:ext cx="3971925" cy="742950"/>
           </a:xfrm>
           <a:prstGeom prst="rect">
             <a:avLst/>
@@ -11824,260 +12077,6 @@
           </a:effectLst>
         </p:spPr>
       </p:pic>
-      <p:cxnSp>
-        <p:nvCxnSpPr>
-          <p:cNvPr id="21" name="Conector recto de flecha 20">
-            <a:extLst>
-              <a:ext uri="{FF2B5EF4-FFF2-40B4-BE49-F238E27FC236}">
-                <a16:creationId xmlns:a16="http://schemas.microsoft.com/office/drawing/2014/main" id="{6081FD7E-32DF-4951-9784-B2FFCABB9DBB}"/>
-              </a:ext>
-            </a:extLst>
-          </p:cNvPr>
-          <p:cNvCxnSpPr>
-            <a:cxnSpLocks/>
-            <a:stCxn id="19" idx="0"/>
-            <a:endCxn id="20" idx="3"/>
-          </p:cNvCxnSpPr>
-          <p:nvPr/>
-        </p:nvCxnSpPr>
-        <p:spPr>
-          <a:xfrm flipH="1" flipV="1">
-            <a:off x="3190089" y="1975048"/>
-            <a:ext cx="2417270" cy="1166723"/>
-          </a:xfrm>
-          <a:prstGeom prst="straightConnector1">
-            <a:avLst/>
-          </a:prstGeom>
-          <a:ln w="12700">
-            <a:solidFill>
-              <a:schemeClr val="bg1"/>
-            </a:solidFill>
-            <a:tailEnd type="triangle"/>
-          </a:ln>
-        </p:spPr>
-        <p:style>
-          <a:lnRef idx="1">
-            <a:schemeClr val="accent1"/>
-          </a:lnRef>
-          <a:fillRef idx="0">
-            <a:schemeClr val="accent1"/>
-          </a:fillRef>
-          <a:effectRef idx="0">
-            <a:schemeClr val="accent1"/>
-          </a:effectRef>
-          <a:fontRef idx="minor">
-            <a:schemeClr val="tx1"/>
-          </a:fontRef>
-        </p:style>
-      </p:cxnSp>
-      <p:sp>
-        <p:nvSpPr>
-          <p:cNvPr id="22" name="CuadroTexto 21">
-            <a:extLst>
-              <a:ext uri="{FF2B5EF4-FFF2-40B4-BE49-F238E27FC236}">
-                <a16:creationId xmlns:a16="http://schemas.microsoft.com/office/drawing/2014/main" id="{C441E18B-5085-4218-841B-6CBDE9D09AA2}"/>
-              </a:ext>
-            </a:extLst>
-          </p:cNvPr>
-          <p:cNvSpPr txBox="1"/>
-          <p:nvPr/>
-        </p:nvSpPr>
-        <p:spPr>
-          <a:xfrm rot="1518848">
-            <a:off x="3913144" y="2251538"/>
-            <a:ext cx="1376218" cy="369332"/>
-          </a:xfrm>
-          <a:prstGeom prst="rect">
-            <a:avLst/>
-          </a:prstGeom>
-          <a:noFill/>
-        </p:spPr>
-        <p:txBody>
-          <a:bodyPr wrap="square" rtlCol="0">
-            <a:spAutoFit/>
-          </a:bodyPr>
-          <a:lstStyle/>
-          <a:p>
-            <a:r>
-              <a:rPr lang="en-US" dirty="0">
-                <a:solidFill>
-                  <a:schemeClr val="bg1"/>
-                </a:solidFill>
-              </a:rPr>
-              <a:t>contains</a:t>
-            </a:r>
-          </a:p>
-        </p:txBody>
-      </p:sp>
-      <p:cxnSp>
-        <p:nvCxnSpPr>
-          <p:cNvPr id="23" name="Conector recto de flecha 22">
-            <a:extLst>
-              <a:ext uri="{FF2B5EF4-FFF2-40B4-BE49-F238E27FC236}">
-                <a16:creationId xmlns:a16="http://schemas.microsoft.com/office/drawing/2014/main" id="{574D6455-8697-43A6-AD09-A3DEB8692CB8}"/>
-              </a:ext>
-            </a:extLst>
-          </p:cNvPr>
-          <p:cNvCxnSpPr>
-            <a:cxnSpLocks/>
-            <a:endCxn id="18" idx="2"/>
-          </p:cNvCxnSpPr>
-          <p:nvPr/>
-        </p:nvCxnSpPr>
-        <p:spPr>
-          <a:xfrm flipV="1">
-            <a:off x="7123569" y="1975049"/>
-            <a:ext cx="1878344" cy="1166723"/>
-          </a:xfrm>
-          <a:prstGeom prst="straightConnector1">
-            <a:avLst/>
-          </a:prstGeom>
-          <a:ln w="12700">
-            <a:solidFill>
-              <a:schemeClr val="bg1"/>
-            </a:solidFill>
-            <a:headEnd type="none"/>
-            <a:tailEnd type="triangle"/>
-          </a:ln>
-        </p:spPr>
-        <p:style>
-          <a:lnRef idx="1">
-            <a:schemeClr val="accent1"/>
-          </a:lnRef>
-          <a:fillRef idx="0">
-            <a:schemeClr val="accent1"/>
-          </a:fillRef>
-          <a:effectRef idx="0">
-            <a:schemeClr val="accent1"/>
-          </a:effectRef>
-          <a:fontRef idx="minor">
-            <a:schemeClr val="tx1"/>
-          </a:fontRef>
-        </p:style>
-      </p:cxnSp>
-      <p:sp>
-        <p:nvSpPr>
-          <p:cNvPr id="25" name="CuadroTexto 24">
-            <a:extLst>
-              <a:ext uri="{FF2B5EF4-FFF2-40B4-BE49-F238E27FC236}">
-                <a16:creationId xmlns:a16="http://schemas.microsoft.com/office/drawing/2014/main" id="{02F6BD05-4155-4839-8166-B0525AEC5FB7}"/>
-              </a:ext>
-            </a:extLst>
-          </p:cNvPr>
-          <p:cNvSpPr txBox="1"/>
-          <p:nvPr/>
-        </p:nvSpPr>
-        <p:spPr>
-          <a:xfrm rot="19684380">
-            <a:off x="7321205" y="2156818"/>
-            <a:ext cx="1376218" cy="369332"/>
-          </a:xfrm>
-          <a:prstGeom prst="rect">
-            <a:avLst/>
-          </a:prstGeom>
-          <a:noFill/>
-        </p:spPr>
-        <p:txBody>
-          <a:bodyPr wrap="square" rtlCol="0">
-            <a:spAutoFit/>
-          </a:bodyPr>
-          <a:lstStyle/>
-          <a:p>
-            <a:r>
-              <a:rPr lang="en-US" dirty="0">
-                <a:solidFill>
-                  <a:schemeClr val="bg1"/>
-                </a:solidFill>
-              </a:rPr>
-              <a:t>shows</a:t>
-            </a:r>
-          </a:p>
-        </p:txBody>
-      </p:sp>
-      <p:cxnSp>
-        <p:nvCxnSpPr>
-          <p:cNvPr id="26" name="Conector recto de flecha 25">
-            <a:extLst>
-              <a:ext uri="{FF2B5EF4-FFF2-40B4-BE49-F238E27FC236}">
-                <a16:creationId xmlns:a16="http://schemas.microsoft.com/office/drawing/2014/main" id="{EAF687F8-0C6A-4F5F-8D35-524D606EF8AA}"/>
-              </a:ext>
-            </a:extLst>
-          </p:cNvPr>
-          <p:cNvCxnSpPr>
-            <a:cxnSpLocks/>
-          </p:cNvCxnSpPr>
-          <p:nvPr/>
-        </p:nvCxnSpPr>
-        <p:spPr>
-          <a:xfrm flipV="1">
-            <a:off x="8009314" y="2005806"/>
-            <a:ext cx="1676480" cy="1100717"/>
-          </a:xfrm>
-          <a:prstGeom prst="straightConnector1">
-            <a:avLst/>
-          </a:prstGeom>
-          <a:ln w="12700">
-            <a:solidFill>
-              <a:schemeClr val="bg1"/>
-            </a:solidFill>
-            <a:headEnd type="triangle"/>
-            <a:tailEnd type="none"/>
-          </a:ln>
-        </p:spPr>
-        <p:style>
-          <a:lnRef idx="1">
-            <a:schemeClr val="accent1"/>
-          </a:lnRef>
-          <a:fillRef idx="0">
-            <a:schemeClr val="accent1"/>
-          </a:fillRef>
-          <a:effectRef idx="0">
-            <a:schemeClr val="accent1"/>
-          </a:effectRef>
-          <a:fontRef idx="minor">
-            <a:schemeClr val="tx1"/>
-          </a:fontRef>
-        </p:style>
-      </p:cxnSp>
-      <p:sp>
-        <p:nvSpPr>
-          <p:cNvPr id="30" name="CuadroTexto 29">
-            <a:extLst>
-              <a:ext uri="{FF2B5EF4-FFF2-40B4-BE49-F238E27FC236}">
-                <a16:creationId xmlns:a16="http://schemas.microsoft.com/office/drawing/2014/main" id="{1A6D4CFD-9757-4884-8C01-C19D63E26B51}"/>
-              </a:ext>
-            </a:extLst>
-          </p:cNvPr>
-          <p:cNvSpPr txBox="1"/>
-          <p:nvPr/>
-        </p:nvSpPr>
-        <p:spPr>
-          <a:xfrm rot="19684380">
-            <a:off x="8602317" y="2280255"/>
-            <a:ext cx="1376218" cy="369332"/>
-          </a:xfrm>
-          <a:prstGeom prst="rect">
-            <a:avLst/>
-          </a:prstGeom>
-          <a:noFill/>
-        </p:spPr>
-        <p:txBody>
-          <a:bodyPr wrap="square" rtlCol="0">
-            <a:spAutoFit/>
-          </a:bodyPr>
-          <a:lstStyle/>
-          <a:p>
-            <a:r>
-              <a:rPr lang="en-US" dirty="0">
-                <a:solidFill>
-                  <a:schemeClr val="bg1"/>
-                </a:solidFill>
-              </a:rPr>
-              <a:t>calls</a:t>
-            </a:r>
-          </a:p>
-        </p:txBody>
-      </p:sp>
     </p:spTree>
     <p:extLst>
       <p:ext uri="{BB962C8B-B14F-4D97-AF65-F5344CB8AC3E}">
@@ -12155,12 +12154,265 @@
           </a:p>
         </p:txBody>
       </p:sp>
+      <p:cxnSp>
+        <p:nvCxnSpPr>
+          <p:cNvPr id="13" name="Conector recto de flecha 12">
+            <a:extLst>
+              <a:ext uri="{FF2B5EF4-FFF2-40B4-BE49-F238E27FC236}">
+                <a16:creationId xmlns:a16="http://schemas.microsoft.com/office/drawing/2014/main" id="{3FEF1901-0773-4F55-AA20-B58A56F18BD1}"/>
+              </a:ext>
+            </a:extLst>
+          </p:cNvPr>
+          <p:cNvCxnSpPr>
+            <a:cxnSpLocks/>
+            <a:stCxn id="10" idx="1"/>
+            <a:endCxn id="8" idx="3"/>
+          </p:cNvCxnSpPr>
+          <p:nvPr/>
+        </p:nvCxnSpPr>
+        <p:spPr>
+          <a:xfrm flipH="1">
+            <a:off x="5122993" y="4304236"/>
+            <a:ext cx="2014643" cy="0"/>
+          </a:xfrm>
+          <a:prstGeom prst="straightConnector1">
+            <a:avLst/>
+          </a:prstGeom>
+          <a:ln w="12700">
+            <a:solidFill>
+              <a:schemeClr val="bg1"/>
+            </a:solidFill>
+            <a:tailEnd type="triangle"/>
+          </a:ln>
+        </p:spPr>
+        <p:style>
+          <a:lnRef idx="1">
+            <a:schemeClr val="accent1"/>
+          </a:lnRef>
+          <a:fillRef idx="0">
+            <a:schemeClr val="accent1"/>
+          </a:fillRef>
+          <a:effectRef idx="0">
+            <a:schemeClr val="accent1"/>
+          </a:effectRef>
+          <a:fontRef idx="minor">
+            <a:schemeClr val="tx1"/>
+          </a:fontRef>
+        </p:style>
+      </p:cxnSp>
+      <p:sp>
+        <p:nvSpPr>
+          <p:cNvPr id="14" name="CuadroTexto 13">
+            <a:extLst>
+              <a:ext uri="{FF2B5EF4-FFF2-40B4-BE49-F238E27FC236}">
+                <a16:creationId xmlns:a16="http://schemas.microsoft.com/office/drawing/2014/main" id="{9B0DA9C3-988A-48A6-AE67-460CB9540473}"/>
+              </a:ext>
+            </a:extLst>
+          </p:cNvPr>
+          <p:cNvSpPr txBox="1"/>
+          <p:nvPr/>
+        </p:nvSpPr>
+        <p:spPr>
+          <a:xfrm>
+            <a:off x="5609059" y="3996717"/>
+            <a:ext cx="1376218" cy="369332"/>
+          </a:xfrm>
+          <a:prstGeom prst="rect">
+            <a:avLst/>
+          </a:prstGeom>
+          <a:noFill/>
+        </p:spPr>
+        <p:txBody>
+          <a:bodyPr wrap="square" rtlCol="0">
+            <a:spAutoFit/>
+          </a:bodyPr>
+          <a:lstStyle/>
+          <a:p>
+            <a:r>
+              <a:rPr lang="en-US" dirty="0">
+                <a:solidFill>
+                  <a:schemeClr val="bg1"/>
+                </a:solidFill>
+              </a:rPr>
+              <a:t>contains</a:t>
+            </a:r>
+          </a:p>
+        </p:txBody>
+      </p:sp>
+      <p:cxnSp>
+        <p:nvCxnSpPr>
+          <p:cNvPr id="23" name="Conector recto de flecha 22">
+            <a:extLst>
+              <a:ext uri="{FF2B5EF4-FFF2-40B4-BE49-F238E27FC236}">
+                <a16:creationId xmlns:a16="http://schemas.microsoft.com/office/drawing/2014/main" id="{34AE3A4C-C027-4534-B21C-6462C9EB6F54}"/>
+              </a:ext>
+            </a:extLst>
+          </p:cNvPr>
+          <p:cNvCxnSpPr>
+            <a:cxnSpLocks/>
+            <a:endCxn id="7" idx="2"/>
+          </p:cNvCxnSpPr>
+          <p:nvPr/>
+        </p:nvCxnSpPr>
+        <p:spPr>
+          <a:xfrm flipH="1" flipV="1">
+            <a:off x="7933721" y="1089348"/>
+            <a:ext cx="588266" cy="841185"/>
+          </a:xfrm>
+          <a:prstGeom prst="straightConnector1">
+            <a:avLst/>
+          </a:prstGeom>
+          <a:ln w="12700">
+            <a:solidFill>
+              <a:schemeClr val="bg1"/>
+            </a:solidFill>
+            <a:tailEnd type="triangle"/>
+          </a:ln>
+        </p:spPr>
+        <p:style>
+          <a:lnRef idx="1">
+            <a:schemeClr val="accent1"/>
+          </a:lnRef>
+          <a:fillRef idx="0">
+            <a:schemeClr val="accent1"/>
+          </a:fillRef>
+          <a:effectRef idx="0">
+            <a:schemeClr val="accent1"/>
+          </a:effectRef>
+          <a:fontRef idx="minor">
+            <a:schemeClr val="tx1"/>
+          </a:fontRef>
+        </p:style>
+      </p:cxnSp>
+      <p:sp>
+        <p:nvSpPr>
+          <p:cNvPr id="25" name="CuadroTexto 24">
+            <a:extLst>
+              <a:ext uri="{FF2B5EF4-FFF2-40B4-BE49-F238E27FC236}">
+                <a16:creationId xmlns:a16="http://schemas.microsoft.com/office/drawing/2014/main" id="{BB1FF878-5C4C-466C-9FC5-A1BAA31AA318}"/>
+              </a:ext>
+            </a:extLst>
+          </p:cNvPr>
+          <p:cNvSpPr txBox="1"/>
+          <p:nvPr/>
+        </p:nvSpPr>
+        <p:spPr>
+          <a:xfrm>
+            <a:off x="7360795" y="1325274"/>
+            <a:ext cx="1376218" cy="369332"/>
+          </a:xfrm>
+          <a:prstGeom prst="rect">
+            <a:avLst/>
+          </a:prstGeom>
+          <a:noFill/>
+        </p:spPr>
+        <p:txBody>
+          <a:bodyPr wrap="square" rtlCol="0">
+            <a:spAutoFit/>
+          </a:bodyPr>
+          <a:lstStyle/>
+          <a:p>
+            <a:r>
+              <a:rPr lang="en-US" dirty="0">
+                <a:solidFill>
+                  <a:schemeClr val="bg1"/>
+                </a:solidFill>
+              </a:rPr>
+              <a:t>shows</a:t>
+            </a:r>
+          </a:p>
+        </p:txBody>
+      </p:sp>
+      <p:cxnSp>
+        <p:nvCxnSpPr>
+          <p:cNvPr id="26" name="Conector recto de flecha 25">
+            <a:extLst>
+              <a:ext uri="{FF2B5EF4-FFF2-40B4-BE49-F238E27FC236}">
+                <a16:creationId xmlns:a16="http://schemas.microsoft.com/office/drawing/2014/main" id="{81001ED0-1228-4F08-BAA6-AC852D419646}"/>
+              </a:ext>
+            </a:extLst>
+          </p:cNvPr>
+          <p:cNvCxnSpPr>
+            <a:cxnSpLocks/>
+          </p:cNvCxnSpPr>
+          <p:nvPr/>
+        </p:nvCxnSpPr>
+        <p:spPr>
+          <a:xfrm flipH="1" flipV="1">
+            <a:off x="8547902" y="1090420"/>
+            <a:ext cx="587430" cy="840113"/>
+          </a:xfrm>
+          <a:prstGeom prst="straightConnector1">
+            <a:avLst/>
+          </a:prstGeom>
+          <a:ln w="12700">
+            <a:solidFill>
+              <a:schemeClr val="bg1"/>
+            </a:solidFill>
+            <a:headEnd type="triangle"/>
+            <a:tailEnd type="none"/>
+          </a:ln>
+        </p:spPr>
+        <p:style>
+          <a:lnRef idx="1">
+            <a:schemeClr val="accent1"/>
+          </a:lnRef>
+          <a:fillRef idx="0">
+            <a:schemeClr val="accent1"/>
+          </a:fillRef>
+          <a:effectRef idx="0">
+            <a:schemeClr val="accent1"/>
+          </a:effectRef>
+          <a:fontRef idx="minor">
+            <a:schemeClr val="tx1"/>
+          </a:fontRef>
+        </p:style>
+      </p:cxnSp>
+      <p:sp>
+        <p:nvSpPr>
+          <p:cNvPr id="27" name="CuadroTexto 26">
+            <a:extLst>
+              <a:ext uri="{FF2B5EF4-FFF2-40B4-BE49-F238E27FC236}">
+                <a16:creationId xmlns:a16="http://schemas.microsoft.com/office/drawing/2014/main" id="{DB051C0C-8A08-4ABE-A33C-3AEEF757C89F}"/>
+              </a:ext>
+            </a:extLst>
+          </p:cNvPr>
+          <p:cNvSpPr txBox="1"/>
+          <p:nvPr/>
+        </p:nvSpPr>
+        <p:spPr>
+          <a:xfrm>
+            <a:off x="8946221" y="1325274"/>
+            <a:ext cx="1376218" cy="369332"/>
+          </a:xfrm>
+          <a:prstGeom prst="rect">
+            <a:avLst/>
+          </a:prstGeom>
+          <a:noFill/>
+        </p:spPr>
+        <p:txBody>
+          <a:bodyPr wrap="square" rtlCol="0">
+            <a:spAutoFit/>
+          </a:bodyPr>
+          <a:lstStyle/>
+          <a:p>
+            <a:r>
+              <a:rPr lang="en-US" dirty="0">
+                <a:solidFill>
+                  <a:schemeClr val="bg1"/>
+                </a:solidFill>
+              </a:rPr>
+              <a:t>calls</a:t>
+            </a:r>
+          </a:p>
+        </p:txBody>
+      </p:sp>
       <p:pic>
         <p:nvPicPr>
-          <p:cNvPr id="2" name="Imagen 1">
-            <a:extLst>
-              <a:ext uri="{FF2B5EF4-FFF2-40B4-BE49-F238E27FC236}">
-                <a16:creationId xmlns:a16="http://schemas.microsoft.com/office/drawing/2014/main" id="{266AD09E-F426-4396-A0E1-5B83C2152B2D}"/>
+          <p:cNvPr id="7" name="Imagen 6">
+            <a:extLst>
+              <a:ext uri="{FF2B5EF4-FFF2-40B4-BE49-F238E27FC236}">
+                <a16:creationId xmlns:a16="http://schemas.microsoft.com/office/drawing/2014/main" id="{6093698F-10F2-4A23-AAAF-32CC685B484B}"/>
               </a:ext>
             </a:extLst>
           </p:cNvPr>
@@ -12177,8 +12429,8 @@
         </p:blipFill>
         <p:spPr>
           <a:xfrm>
-            <a:off x="447615" y="3745599"/>
-            <a:ext cx="6915150" cy="1819275"/>
+            <a:off x="5361971" y="374973"/>
+            <a:ext cx="5143500" cy="714375"/>
           </a:xfrm>
           <a:prstGeom prst="rect">
             <a:avLst/>
@@ -12194,10 +12446,10 @@
       </p:pic>
       <p:pic>
         <p:nvPicPr>
-          <p:cNvPr id="4" name="Imagen 3">
-            <a:extLst>
-              <a:ext uri="{FF2B5EF4-FFF2-40B4-BE49-F238E27FC236}">
-                <a16:creationId xmlns:a16="http://schemas.microsoft.com/office/drawing/2014/main" id="{C3393B52-AD30-488F-8F05-22AB5631AF56}"/>
+          <p:cNvPr id="8" name="Imagen 7">
+            <a:extLst>
+              <a:ext uri="{FF2B5EF4-FFF2-40B4-BE49-F238E27FC236}">
+                <a16:creationId xmlns:a16="http://schemas.microsoft.com/office/drawing/2014/main" id="{90553F9F-F089-4AC7-88B2-FAEE12B0CBEF}"/>
               </a:ext>
             </a:extLst>
           </p:cNvPr>
@@ -12214,8 +12466,8 @@
         </p:blipFill>
         <p:spPr>
           <a:xfrm>
-            <a:off x="6769477" y="277666"/>
-            <a:ext cx="5133975" cy="790575"/>
+            <a:off x="361700" y="3395989"/>
+            <a:ext cx="4761293" cy="1816493"/>
           </a:xfrm>
           <a:prstGeom prst="rect">
             <a:avLst/>
@@ -12231,10 +12483,10 @@
       </p:pic>
       <p:pic>
         <p:nvPicPr>
-          <p:cNvPr id="5" name="Imagen 4">
-            <a:extLst>
-              <a:ext uri="{FF2B5EF4-FFF2-40B4-BE49-F238E27FC236}">
-                <a16:creationId xmlns:a16="http://schemas.microsoft.com/office/drawing/2014/main" id="{08049953-0398-413A-A6EA-4797B7B45252}"/>
+          <p:cNvPr id="10" name="Imagen 9">
+            <a:extLst>
+              <a:ext uri="{FF2B5EF4-FFF2-40B4-BE49-F238E27FC236}">
+                <a16:creationId xmlns:a16="http://schemas.microsoft.com/office/drawing/2014/main" id="{44E765E2-07D6-4F0B-A066-D1C68161C31A}"/>
               </a:ext>
             </a:extLst>
           </p:cNvPr>
@@ -12251,8 +12503,8 @@
         </p:blipFill>
         <p:spPr>
           <a:xfrm>
-            <a:off x="7944340" y="2054161"/>
-            <a:ext cx="3959112" cy="4529995"/>
+            <a:off x="7137636" y="1930533"/>
+            <a:ext cx="4711778" cy="4747406"/>
           </a:xfrm>
           <a:prstGeom prst="rect">
             <a:avLst/>
@@ -12266,379 +12518,6 @@
           </a:effectLst>
         </p:spPr>
       </p:pic>
-      <p:pic>
-        <p:nvPicPr>
-          <p:cNvPr id="6" name="Imagen 5">
-            <a:extLst>
-              <a:ext uri="{FF2B5EF4-FFF2-40B4-BE49-F238E27FC236}">
-                <a16:creationId xmlns:a16="http://schemas.microsoft.com/office/drawing/2014/main" id="{5E4E6AF9-10D1-4B97-95E8-1CC8F2393DB4}"/>
-              </a:ext>
-            </a:extLst>
-          </p:cNvPr>
-          <p:cNvPicPr>
-            <a:picLocks noChangeAspect="1"/>
-          </p:cNvPicPr>
-          <p:nvPr/>
-        </p:nvPicPr>
-        <p:blipFill>
-          <a:blip r:embed="rId5"/>
-          <a:stretch>
-            <a:fillRect/>
-          </a:stretch>
-        </p:blipFill>
-        <p:spPr>
-          <a:xfrm>
-            <a:off x="447615" y="1543615"/>
-            <a:ext cx="5057073" cy="1493782"/>
-          </a:xfrm>
-          <a:prstGeom prst="rect">
-            <a:avLst/>
-          </a:prstGeom>
-          <a:effectLst>
-            <a:glow rad="25400">
-              <a:schemeClr val="bg1">
-                <a:alpha val="40000"/>
-              </a:schemeClr>
-            </a:glow>
-          </a:effectLst>
-        </p:spPr>
-      </p:pic>
-      <p:cxnSp>
-        <p:nvCxnSpPr>
-          <p:cNvPr id="13" name="Conector recto de flecha 12">
-            <a:extLst>
-              <a:ext uri="{FF2B5EF4-FFF2-40B4-BE49-F238E27FC236}">
-                <a16:creationId xmlns:a16="http://schemas.microsoft.com/office/drawing/2014/main" id="{3FEF1901-0773-4F55-AA20-B58A56F18BD1}"/>
-              </a:ext>
-            </a:extLst>
-          </p:cNvPr>
-          <p:cNvCxnSpPr>
-            <a:cxnSpLocks/>
-            <a:endCxn id="6" idx="3"/>
-          </p:cNvCxnSpPr>
-          <p:nvPr/>
-        </p:nvCxnSpPr>
-        <p:spPr>
-          <a:xfrm flipH="1" flipV="1">
-            <a:off x="5504688" y="2290506"/>
-            <a:ext cx="2439654" cy="96080"/>
-          </a:xfrm>
-          <a:prstGeom prst="straightConnector1">
-            <a:avLst/>
-          </a:prstGeom>
-          <a:ln w="12700">
-            <a:solidFill>
-              <a:schemeClr val="bg1"/>
-            </a:solidFill>
-            <a:tailEnd type="triangle"/>
-          </a:ln>
-        </p:spPr>
-        <p:style>
-          <a:lnRef idx="1">
-            <a:schemeClr val="accent1"/>
-          </a:lnRef>
-          <a:fillRef idx="0">
-            <a:schemeClr val="accent1"/>
-          </a:fillRef>
-          <a:effectRef idx="0">
-            <a:schemeClr val="accent1"/>
-          </a:effectRef>
-          <a:fontRef idx="minor">
-            <a:schemeClr val="tx1"/>
-          </a:fontRef>
-        </p:style>
-      </p:cxnSp>
-      <p:sp>
-        <p:nvSpPr>
-          <p:cNvPr id="14" name="CuadroTexto 13">
-            <a:extLst>
-              <a:ext uri="{FF2B5EF4-FFF2-40B4-BE49-F238E27FC236}">
-                <a16:creationId xmlns:a16="http://schemas.microsoft.com/office/drawing/2014/main" id="{9B0DA9C3-988A-48A6-AE67-460CB9540473}"/>
-              </a:ext>
-            </a:extLst>
-          </p:cNvPr>
-          <p:cNvSpPr txBox="1"/>
-          <p:nvPr/>
-        </p:nvSpPr>
-        <p:spPr>
-          <a:xfrm rot="212874">
-            <a:off x="6267226" y="1926985"/>
-            <a:ext cx="1376218" cy="369332"/>
-          </a:xfrm>
-          <a:prstGeom prst="rect">
-            <a:avLst/>
-          </a:prstGeom>
-          <a:noFill/>
-        </p:spPr>
-        <p:txBody>
-          <a:bodyPr wrap="square" rtlCol="0">
-            <a:spAutoFit/>
-          </a:bodyPr>
-          <a:lstStyle/>
-          <a:p>
-            <a:r>
-              <a:rPr lang="en-US" dirty="0">
-                <a:solidFill>
-                  <a:schemeClr val="bg1"/>
-                </a:solidFill>
-              </a:rPr>
-              <a:t>contains</a:t>
-            </a:r>
-          </a:p>
-        </p:txBody>
-      </p:sp>
-      <p:cxnSp>
-        <p:nvCxnSpPr>
-          <p:cNvPr id="17" name="Conector recto de flecha 16">
-            <a:extLst>
-              <a:ext uri="{FF2B5EF4-FFF2-40B4-BE49-F238E27FC236}">
-                <a16:creationId xmlns:a16="http://schemas.microsoft.com/office/drawing/2014/main" id="{E7C6FCCA-4E6E-4BC4-95D7-B96C0906C0C3}"/>
-              </a:ext>
-            </a:extLst>
-          </p:cNvPr>
-          <p:cNvCxnSpPr>
-            <a:cxnSpLocks/>
-          </p:cNvCxnSpPr>
-          <p:nvPr/>
-        </p:nvCxnSpPr>
-        <p:spPr>
-          <a:xfrm flipH="1">
-            <a:off x="6181344" y="3301878"/>
-            <a:ext cx="1762997" cy="417673"/>
-          </a:xfrm>
-          <a:prstGeom prst="straightConnector1">
-            <a:avLst/>
-          </a:prstGeom>
-          <a:ln w="12700">
-            <a:solidFill>
-              <a:schemeClr val="bg1"/>
-            </a:solidFill>
-            <a:tailEnd type="triangle"/>
-          </a:ln>
-        </p:spPr>
-        <p:style>
-          <a:lnRef idx="1">
-            <a:schemeClr val="accent1"/>
-          </a:lnRef>
-          <a:fillRef idx="0">
-            <a:schemeClr val="accent1"/>
-          </a:fillRef>
-          <a:effectRef idx="0">
-            <a:schemeClr val="accent1"/>
-          </a:effectRef>
-          <a:fontRef idx="minor">
-            <a:schemeClr val="tx1"/>
-          </a:fontRef>
-        </p:style>
-      </p:cxnSp>
-      <p:sp>
-        <p:nvSpPr>
-          <p:cNvPr id="20" name="CuadroTexto 19">
-            <a:extLst>
-              <a:ext uri="{FF2B5EF4-FFF2-40B4-BE49-F238E27FC236}">
-                <a16:creationId xmlns:a16="http://schemas.microsoft.com/office/drawing/2014/main" id="{B67A2F72-0395-49BC-999E-DBDDA14360B9}"/>
-              </a:ext>
-            </a:extLst>
-          </p:cNvPr>
-          <p:cNvSpPr txBox="1"/>
-          <p:nvPr/>
-        </p:nvSpPr>
-        <p:spPr>
-          <a:xfrm rot="20864610">
-            <a:off x="6748034" y="2999513"/>
-            <a:ext cx="1376218" cy="369332"/>
-          </a:xfrm>
-          <a:prstGeom prst="rect">
-            <a:avLst/>
-          </a:prstGeom>
-          <a:noFill/>
-        </p:spPr>
-        <p:txBody>
-          <a:bodyPr wrap="square" rtlCol="0">
-            <a:spAutoFit/>
-          </a:bodyPr>
-          <a:lstStyle/>
-          <a:p>
-            <a:r>
-              <a:rPr lang="en-US" dirty="0">
-                <a:solidFill>
-                  <a:schemeClr val="bg1"/>
-                </a:solidFill>
-              </a:rPr>
-              <a:t>gets</a:t>
-            </a:r>
-          </a:p>
-        </p:txBody>
-      </p:sp>
-      <p:cxnSp>
-        <p:nvCxnSpPr>
-          <p:cNvPr id="23" name="Conector recto de flecha 22">
-            <a:extLst>
-              <a:ext uri="{FF2B5EF4-FFF2-40B4-BE49-F238E27FC236}">
-                <a16:creationId xmlns:a16="http://schemas.microsoft.com/office/drawing/2014/main" id="{34AE3A4C-C027-4534-B21C-6462C9EB6F54}"/>
-              </a:ext>
-            </a:extLst>
-          </p:cNvPr>
-          <p:cNvCxnSpPr>
-            <a:cxnSpLocks/>
-            <a:stCxn id="5" idx="0"/>
-            <a:endCxn id="4" idx="2"/>
-          </p:cNvCxnSpPr>
-          <p:nvPr/>
-        </p:nvCxnSpPr>
-        <p:spPr>
-          <a:xfrm flipH="1" flipV="1">
-            <a:off x="9336465" y="1068241"/>
-            <a:ext cx="587431" cy="985920"/>
-          </a:xfrm>
-          <a:prstGeom prst="straightConnector1">
-            <a:avLst/>
-          </a:prstGeom>
-          <a:ln w="12700">
-            <a:solidFill>
-              <a:schemeClr val="bg1"/>
-            </a:solidFill>
-            <a:tailEnd type="triangle"/>
-          </a:ln>
-        </p:spPr>
-        <p:style>
-          <a:lnRef idx="1">
-            <a:schemeClr val="accent1"/>
-          </a:lnRef>
-          <a:fillRef idx="0">
-            <a:schemeClr val="accent1"/>
-          </a:fillRef>
-          <a:effectRef idx="0">
-            <a:schemeClr val="accent1"/>
-          </a:effectRef>
-          <a:fontRef idx="minor">
-            <a:schemeClr val="tx1"/>
-          </a:fontRef>
-        </p:style>
-      </p:cxnSp>
-      <p:sp>
-        <p:nvSpPr>
-          <p:cNvPr id="25" name="CuadroTexto 24">
-            <a:extLst>
-              <a:ext uri="{FF2B5EF4-FFF2-40B4-BE49-F238E27FC236}">
-                <a16:creationId xmlns:a16="http://schemas.microsoft.com/office/drawing/2014/main" id="{BB1FF878-5C4C-466C-9FC5-A1BAA31AA318}"/>
-              </a:ext>
-            </a:extLst>
-          </p:cNvPr>
-          <p:cNvSpPr txBox="1"/>
-          <p:nvPr/>
-        </p:nvSpPr>
-        <p:spPr>
-          <a:xfrm>
-            <a:off x="8541822" y="1376535"/>
-            <a:ext cx="1376218" cy="369332"/>
-          </a:xfrm>
-          <a:prstGeom prst="rect">
-            <a:avLst/>
-          </a:prstGeom>
-          <a:noFill/>
-        </p:spPr>
-        <p:txBody>
-          <a:bodyPr wrap="square" rtlCol="0">
-            <a:spAutoFit/>
-          </a:bodyPr>
-          <a:lstStyle/>
-          <a:p>
-            <a:r>
-              <a:rPr lang="en-US" dirty="0">
-                <a:solidFill>
-                  <a:schemeClr val="bg1"/>
-                </a:solidFill>
-              </a:rPr>
-              <a:t>shows</a:t>
-            </a:r>
-          </a:p>
-        </p:txBody>
-      </p:sp>
-      <p:cxnSp>
-        <p:nvCxnSpPr>
-          <p:cNvPr id="26" name="Conector recto de flecha 25">
-            <a:extLst>
-              <a:ext uri="{FF2B5EF4-FFF2-40B4-BE49-F238E27FC236}">
-                <a16:creationId xmlns:a16="http://schemas.microsoft.com/office/drawing/2014/main" id="{81001ED0-1228-4F08-BAA6-AC852D419646}"/>
-              </a:ext>
-            </a:extLst>
-          </p:cNvPr>
-          <p:cNvCxnSpPr>
-            <a:cxnSpLocks/>
-          </p:cNvCxnSpPr>
-          <p:nvPr/>
-        </p:nvCxnSpPr>
-        <p:spPr>
-          <a:xfrm flipH="1" flipV="1">
-            <a:off x="9918040" y="1068241"/>
-            <a:ext cx="587431" cy="985920"/>
-          </a:xfrm>
-          <a:prstGeom prst="straightConnector1">
-            <a:avLst/>
-          </a:prstGeom>
-          <a:ln w="12700">
-            <a:solidFill>
-              <a:schemeClr val="bg1"/>
-            </a:solidFill>
-            <a:headEnd type="triangle"/>
-            <a:tailEnd type="none"/>
-          </a:ln>
-        </p:spPr>
-        <p:style>
-          <a:lnRef idx="1">
-            <a:schemeClr val="accent1"/>
-          </a:lnRef>
-          <a:fillRef idx="0">
-            <a:schemeClr val="accent1"/>
-          </a:fillRef>
-          <a:effectRef idx="0">
-            <a:schemeClr val="accent1"/>
-          </a:effectRef>
-          <a:fontRef idx="minor">
-            <a:schemeClr val="tx1"/>
-          </a:fontRef>
-        </p:style>
-      </p:cxnSp>
-      <p:sp>
-        <p:nvSpPr>
-          <p:cNvPr id="27" name="CuadroTexto 26">
-            <a:extLst>
-              <a:ext uri="{FF2B5EF4-FFF2-40B4-BE49-F238E27FC236}">
-                <a16:creationId xmlns:a16="http://schemas.microsoft.com/office/drawing/2014/main" id="{DB051C0C-8A08-4ABE-A33C-3AEEF757C89F}"/>
-              </a:ext>
-            </a:extLst>
-          </p:cNvPr>
-          <p:cNvSpPr txBox="1"/>
-          <p:nvPr/>
-        </p:nvSpPr>
-        <p:spPr>
-          <a:xfrm>
-            <a:off x="10336109" y="1376535"/>
-            <a:ext cx="1376218" cy="369332"/>
-          </a:xfrm>
-          <a:prstGeom prst="rect">
-            <a:avLst/>
-          </a:prstGeom>
-          <a:noFill/>
-        </p:spPr>
-        <p:txBody>
-          <a:bodyPr wrap="square" rtlCol="0">
-            <a:spAutoFit/>
-          </a:bodyPr>
-          <a:lstStyle/>
-          <a:p>
-            <a:r>
-              <a:rPr lang="en-US" dirty="0">
-                <a:solidFill>
-                  <a:schemeClr val="bg1"/>
-                </a:solidFill>
-              </a:rPr>
-              <a:t>calls</a:t>
-            </a:r>
-          </a:p>
-        </p:txBody>
-      </p:sp>
     </p:spTree>
     <p:extLst>
       <p:ext uri="{BB962C8B-B14F-4D97-AF65-F5344CB8AC3E}">

</xml_diff>

<commit_message>
added theory for mediator, memento and observer patterns
</commit_message>
<xml_diff>
--- a/slides/Patrones de diseño con Typescript en el mundo real.pptx
+++ b/slides/Patrones de diseño con Typescript en el mundo real.pptx
@@ -34,17 +34,23 @@
     <p:sldId id="295" r:id="rId28"/>
     <p:sldId id="296" r:id="rId29"/>
     <p:sldId id="272" r:id="rId30"/>
-    <p:sldId id="273" r:id="rId31"/>
+    <p:sldId id="300" r:id="rId31"/>
     <p:sldId id="274" r:id="rId32"/>
     <p:sldId id="275" r:id="rId33"/>
-    <p:sldId id="276" r:id="rId34"/>
-    <p:sldId id="297" r:id="rId35"/>
-    <p:sldId id="298" r:id="rId36"/>
-    <p:sldId id="299" r:id="rId37"/>
-    <p:sldId id="277" r:id="rId38"/>
-    <p:sldId id="278" r:id="rId39"/>
-    <p:sldId id="279" r:id="rId40"/>
-    <p:sldId id="280" r:id="rId41"/>
+    <p:sldId id="302" r:id="rId34"/>
+    <p:sldId id="303" r:id="rId35"/>
+    <p:sldId id="301" r:id="rId36"/>
+    <p:sldId id="305" r:id="rId37"/>
+    <p:sldId id="273" r:id="rId38"/>
+    <p:sldId id="304" r:id="rId39"/>
+    <p:sldId id="276" r:id="rId40"/>
+    <p:sldId id="297" r:id="rId41"/>
+    <p:sldId id="298" r:id="rId42"/>
+    <p:sldId id="299" r:id="rId43"/>
+    <p:sldId id="277" r:id="rId44"/>
+    <p:sldId id="278" r:id="rId45"/>
+    <p:sldId id="279" r:id="rId46"/>
+    <p:sldId id="280" r:id="rId47"/>
   </p:sldIdLst>
   <p:sldSz cx="12192000" cy="6858000"/>
   <p:notesSz cx="6858000" cy="9144000"/>
@@ -10196,7 +10202,7 @@
     </p:spTree>
     <p:extLst>
       <p:ext uri="{BB962C8B-B14F-4D97-AF65-F5344CB8AC3E}">
-        <p14:creationId xmlns:p14="http://schemas.microsoft.com/office/powerpoint/2010/main" val="1428411220"/>
+        <p14:creationId xmlns:p14="http://schemas.microsoft.com/office/powerpoint/2010/main" val="588457192"/>
       </p:ext>
     </p:extLst>
   </p:cSld>
@@ -11498,7 +11504,7 @@
           <p:cNvPr id="2" name="Título 1">
             <a:extLst>
               <a:ext uri="{FF2B5EF4-FFF2-40B4-BE49-F238E27FC236}">
-                <a16:creationId xmlns:a16="http://schemas.microsoft.com/office/drawing/2014/main" id="{73A2909B-13B3-4614-9321-16AF10F4286A}"/>
+                <a16:creationId xmlns:a16="http://schemas.microsoft.com/office/drawing/2014/main" id="{51E579E3-4D4D-4391-A4DB-77F6C6DD84BE}"/>
               </a:ext>
             </a:extLst>
           </p:cNvPr>
@@ -11511,7 +11517,7 @@
         </p:nvSpPr>
         <p:spPr>
           <a:xfrm>
-            <a:off x="838200" y="2103437"/>
+            <a:off x="900344" y="2766218"/>
             <a:ext cx="10515600" cy="1325563"/>
           </a:xfrm>
         </p:spPr>
@@ -11520,16 +11526,40 @@
           <a:lstStyle/>
           <a:p>
             <a:r>
-              <a:rPr lang="en-US" dirty="0"/>
-              <a:t>UI Patterns</a:t>
-            </a:r>
+              <a:rPr lang="es-ES" dirty="0" err="1">
+                <a:solidFill>
+                  <a:srgbClr val="000000"/>
+                </a:solidFill>
+                <a:latin typeface="Calibri" panose="020F0502020204030204" pitchFamily="34" charset="0"/>
+              </a:rPr>
+              <a:t>Observer</a:t>
+            </a:r>
+            <a:r>
+              <a:rPr lang="es-ES" dirty="0">
+                <a:solidFill>
+                  <a:srgbClr val="000000"/>
+                </a:solidFill>
+                <a:latin typeface="Calibri" panose="020F0502020204030204" pitchFamily="34" charset="0"/>
+              </a:rPr>
+              <a:t> </a:t>
+            </a:r>
+            <a:r>
+              <a:rPr lang="es-ES" dirty="0" err="1">
+                <a:solidFill>
+                  <a:srgbClr val="000000"/>
+                </a:solidFill>
+                <a:latin typeface="Calibri" panose="020F0502020204030204" pitchFamily="34" charset="0"/>
+              </a:rPr>
+              <a:t>pattern</a:t>
+            </a:r>
+            <a:endParaRPr lang="en-US" dirty="0"/>
           </a:p>
         </p:txBody>
       </p:sp>
     </p:spTree>
     <p:extLst>
       <p:ext uri="{BB962C8B-B14F-4D97-AF65-F5344CB8AC3E}">
-        <p14:creationId xmlns:p14="http://schemas.microsoft.com/office/powerpoint/2010/main" val="2266296736"/>
+        <p14:creationId xmlns:p14="http://schemas.microsoft.com/office/powerpoint/2010/main" val="4018794760"/>
       </p:ext>
     </p:extLst>
   </p:cSld>
@@ -11540,111 +11570,6 @@
 </file>
 
 <file path=ppt/slides/slide34.xml><?xml version="1.0" encoding="utf-8"?>
-<p:sld xmlns:a="http://schemas.openxmlformats.org/drawingml/2006/main" xmlns:r="http://schemas.openxmlformats.org/officeDocument/2006/relationships" xmlns:p="http://schemas.openxmlformats.org/presentationml/2006/main">
-  <p:cSld>
-    <p:spTree>
-      <p:nvGrpSpPr>
-        <p:cNvPr id="1" name=""/>
-        <p:cNvGrpSpPr/>
-        <p:nvPr/>
-      </p:nvGrpSpPr>
-      <p:grpSpPr>
-        <a:xfrm>
-          <a:off x="0" y="0"/>
-          <a:ext cx="0" cy="0"/>
-          <a:chOff x="0" y="0"/>
-          <a:chExt cx="0" cy="0"/>
-        </a:xfrm>
-      </p:grpSpPr>
-      <p:sp>
-        <p:nvSpPr>
-          <p:cNvPr id="2" name="Título 1">
-            <a:extLst>
-              <a:ext uri="{FF2B5EF4-FFF2-40B4-BE49-F238E27FC236}">
-                <a16:creationId xmlns:a16="http://schemas.microsoft.com/office/drawing/2014/main" id="{51E579E3-4D4D-4391-A4DB-77F6C6DD84BE}"/>
-              </a:ext>
-            </a:extLst>
-          </p:cNvPr>
-          <p:cNvSpPr>
-            <a:spLocks noGrp="1"/>
-          </p:cNvSpPr>
-          <p:nvPr>
-            <p:ph type="title"/>
-          </p:nvPr>
-        </p:nvSpPr>
-        <p:spPr>
-          <a:xfrm>
-            <a:off x="900344" y="2766218"/>
-            <a:ext cx="10515600" cy="1325563"/>
-          </a:xfrm>
-        </p:spPr>
-        <p:txBody>
-          <a:bodyPr/>
-          <a:lstStyle/>
-          <a:p>
-            <a:r>
-              <a:rPr lang="es-ES" dirty="0" err="1">
-                <a:solidFill>
-                  <a:srgbClr val="000000"/>
-                </a:solidFill>
-                <a:latin typeface="Calibri" panose="020F0502020204030204" pitchFamily="34" charset="0"/>
-              </a:rPr>
-              <a:t>Model</a:t>
-            </a:r>
-            <a:r>
-              <a:rPr lang="es-ES" dirty="0">
-                <a:solidFill>
-                  <a:srgbClr val="000000"/>
-                </a:solidFill>
-                <a:latin typeface="Calibri" panose="020F0502020204030204" pitchFamily="34" charset="0"/>
-              </a:rPr>
-              <a:t> View </a:t>
-            </a:r>
-            <a:r>
-              <a:rPr lang="es-ES" dirty="0" err="1">
-                <a:solidFill>
-                  <a:srgbClr val="000000"/>
-                </a:solidFill>
-                <a:latin typeface="Calibri" panose="020F0502020204030204" pitchFamily="34" charset="0"/>
-              </a:rPr>
-              <a:t>ViewModel</a:t>
-            </a:r>
-            <a:r>
-              <a:rPr lang="es-ES" dirty="0">
-                <a:solidFill>
-                  <a:srgbClr val="000000"/>
-                </a:solidFill>
-                <a:latin typeface="Calibri" panose="020F0502020204030204" pitchFamily="34" charset="0"/>
-              </a:rPr>
-              <a:t> (MVVM) </a:t>
-            </a:r>
-            <a:r>
-              <a:rPr lang="es-ES" dirty="0" err="1">
-                <a:solidFill>
-                  <a:srgbClr val="000000"/>
-                </a:solidFill>
-                <a:latin typeface="Calibri" panose="020F0502020204030204" pitchFamily="34" charset="0"/>
-              </a:rPr>
-              <a:t>pattern</a:t>
-            </a:r>
-            <a:endParaRPr lang="en-US" dirty="0"/>
-          </a:p>
-        </p:txBody>
-      </p:sp>
-    </p:spTree>
-    <p:extLst>
-      <p:ext uri="{BB962C8B-B14F-4D97-AF65-F5344CB8AC3E}">
-        <p14:creationId xmlns:p14="http://schemas.microsoft.com/office/powerpoint/2010/main" val="478699278"/>
-      </p:ext>
-    </p:extLst>
-  </p:cSld>
-  <p:clrMapOvr>
-    <a:masterClrMapping/>
-  </p:clrMapOvr>
-</p:sld>
-</file>
-
-<file path=ppt/slides/slide35.xml><?xml version="1.0" encoding="utf-8"?>
 <p:sld xmlns:a="http://schemas.openxmlformats.org/drawingml/2006/main" xmlns:r="http://schemas.openxmlformats.org/officeDocument/2006/relationships" xmlns:p="http://schemas.openxmlformats.org/presentationml/2006/main">
   <p:cSld>
     <p:bg>
@@ -11715,10 +11640,10 @@
       </p:sp>
       <p:pic>
         <p:nvPicPr>
-          <p:cNvPr id="19" name="Imagen 18">
-            <a:extLst>
-              <a:ext uri="{FF2B5EF4-FFF2-40B4-BE49-F238E27FC236}">
-                <a16:creationId xmlns:a16="http://schemas.microsoft.com/office/drawing/2014/main" id="{AD0CDA8F-35A5-48B4-9D35-466C095B6E83}"/>
+          <p:cNvPr id="18" name="Imagen 17">
+            <a:extLst>
+              <a:ext uri="{FF2B5EF4-FFF2-40B4-BE49-F238E27FC236}">
+                <a16:creationId xmlns:a16="http://schemas.microsoft.com/office/drawing/2014/main" id="{D5594BA5-75F8-45CB-9C25-B87DC4714B5B}"/>
               </a:ext>
             </a:extLst>
           </p:cNvPr>
@@ -11735,8 +11660,8 @@
         </p:blipFill>
         <p:spPr>
           <a:xfrm>
-            <a:off x="2464109" y="3141771"/>
-            <a:ext cx="6286500" cy="3343275"/>
+            <a:off x="7088669" y="203073"/>
+            <a:ext cx="4095750" cy="1257300"/>
           </a:xfrm>
           <a:prstGeom prst="rect">
             <a:avLst/>
@@ -11752,10 +11677,10 @@
       </p:pic>
       <p:pic>
         <p:nvPicPr>
-          <p:cNvPr id="20" name="Imagen 19">
-            <a:extLst>
-              <a:ext uri="{FF2B5EF4-FFF2-40B4-BE49-F238E27FC236}">
-                <a16:creationId xmlns:a16="http://schemas.microsoft.com/office/drawing/2014/main" id="{0CB9DBB1-A444-47E7-8C56-084B56BC9929}"/>
+          <p:cNvPr id="19" name="Imagen 18">
+            <a:extLst>
+              <a:ext uri="{FF2B5EF4-FFF2-40B4-BE49-F238E27FC236}">
+                <a16:creationId xmlns:a16="http://schemas.microsoft.com/office/drawing/2014/main" id="{8442DA08-07A8-4592-A067-A54B78B12D5B}"/>
               </a:ext>
             </a:extLst>
           </p:cNvPr>
@@ -11772,8 +11697,8 @@
         </p:blipFill>
         <p:spPr>
           <a:xfrm>
-            <a:off x="1170789" y="1365448"/>
-            <a:ext cx="2019300" cy="1219200"/>
+            <a:off x="6418690" y="1974407"/>
+            <a:ext cx="5435708" cy="3231078"/>
           </a:xfrm>
           <a:prstGeom prst="rect">
             <a:avLst/>
@@ -11787,265 +11712,12 @@
           </a:effectLst>
         </p:spPr>
       </p:pic>
-      <p:cxnSp>
-        <p:nvCxnSpPr>
-          <p:cNvPr id="21" name="Conector recto de flecha 20">
-            <a:extLst>
-              <a:ext uri="{FF2B5EF4-FFF2-40B4-BE49-F238E27FC236}">
-                <a16:creationId xmlns:a16="http://schemas.microsoft.com/office/drawing/2014/main" id="{6081FD7E-32DF-4951-9784-B2FFCABB9DBB}"/>
-              </a:ext>
-            </a:extLst>
-          </p:cNvPr>
-          <p:cNvCxnSpPr>
-            <a:cxnSpLocks/>
-            <a:stCxn id="19" idx="0"/>
-            <a:endCxn id="20" idx="3"/>
-          </p:cNvCxnSpPr>
-          <p:nvPr/>
-        </p:nvCxnSpPr>
-        <p:spPr>
-          <a:xfrm flipH="1" flipV="1">
-            <a:off x="3190089" y="1975048"/>
-            <a:ext cx="2417270" cy="1166723"/>
-          </a:xfrm>
-          <a:prstGeom prst="straightConnector1">
-            <a:avLst/>
-          </a:prstGeom>
-          <a:ln w="12700">
-            <a:solidFill>
-              <a:schemeClr val="bg1"/>
-            </a:solidFill>
-            <a:tailEnd type="triangle"/>
-          </a:ln>
-        </p:spPr>
-        <p:style>
-          <a:lnRef idx="1">
-            <a:schemeClr val="accent1"/>
-          </a:lnRef>
-          <a:fillRef idx="0">
-            <a:schemeClr val="accent1"/>
-          </a:fillRef>
-          <a:effectRef idx="0">
-            <a:schemeClr val="accent1"/>
-          </a:effectRef>
-          <a:fontRef idx="minor">
-            <a:schemeClr val="tx1"/>
-          </a:fontRef>
-        </p:style>
-      </p:cxnSp>
-      <p:sp>
-        <p:nvSpPr>
-          <p:cNvPr id="22" name="CuadroTexto 21">
-            <a:extLst>
-              <a:ext uri="{FF2B5EF4-FFF2-40B4-BE49-F238E27FC236}">
-                <a16:creationId xmlns:a16="http://schemas.microsoft.com/office/drawing/2014/main" id="{C441E18B-5085-4218-841B-6CBDE9D09AA2}"/>
-              </a:ext>
-            </a:extLst>
-          </p:cNvPr>
-          <p:cNvSpPr txBox="1"/>
-          <p:nvPr/>
-        </p:nvSpPr>
-        <p:spPr>
-          <a:xfrm rot="1518848">
-            <a:off x="3913144" y="2251538"/>
-            <a:ext cx="1376218" cy="369332"/>
-          </a:xfrm>
-          <a:prstGeom prst="rect">
-            <a:avLst/>
-          </a:prstGeom>
-          <a:noFill/>
-        </p:spPr>
-        <p:txBody>
-          <a:bodyPr wrap="square" rtlCol="0">
-            <a:spAutoFit/>
-          </a:bodyPr>
-          <a:lstStyle/>
-          <a:p>
-            <a:r>
-              <a:rPr lang="en-US" dirty="0">
-                <a:solidFill>
-                  <a:schemeClr val="bg1"/>
-                </a:solidFill>
-              </a:rPr>
-              <a:t>contains</a:t>
-            </a:r>
-          </a:p>
-        </p:txBody>
-      </p:sp>
-      <p:cxnSp>
-        <p:nvCxnSpPr>
-          <p:cNvPr id="23" name="Conector recto de flecha 22">
-            <a:extLst>
-              <a:ext uri="{FF2B5EF4-FFF2-40B4-BE49-F238E27FC236}">
-                <a16:creationId xmlns:a16="http://schemas.microsoft.com/office/drawing/2014/main" id="{574D6455-8697-43A6-AD09-A3DEB8692CB8}"/>
-              </a:ext>
-            </a:extLst>
-          </p:cNvPr>
-          <p:cNvCxnSpPr>
-            <a:cxnSpLocks/>
-          </p:cNvCxnSpPr>
-          <p:nvPr/>
-        </p:nvCxnSpPr>
-        <p:spPr>
-          <a:xfrm flipV="1">
-            <a:off x="7123569" y="1975049"/>
-            <a:ext cx="1878344" cy="1166723"/>
-          </a:xfrm>
-          <a:prstGeom prst="straightConnector1">
-            <a:avLst/>
-          </a:prstGeom>
-          <a:ln w="12700">
-            <a:solidFill>
-              <a:schemeClr val="bg1"/>
-            </a:solidFill>
-            <a:headEnd type="none"/>
-            <a:tailEnd type="triangle"/>
-          </a:ln>
-        </p:spPr>
-        <p:style>
-          <a:lnRef idx="1">
-            <a:schemeClr val="accent1"/>
-          </a:lnRef>
-          <a:fillRef idx="0">
-            <a:schemeClr val="accent1"/>
-          </a:fillRef>
-          <a:effectRef idx="0">
-            <a:schemeClr val="accent1"/>
-          </a:effectRef>
-          <a:fontRef idx="minor">
-            <a:schemeClr val="tx1"/>
-          </a:fontRef>
-        </p:style>
-      </p:cxnSp>
-      <p:sp>
-        <p:nvSpPr>
-          <p:cNvPr id="25" name="CuadroTexto 24">
-            <a:extLst>
-              <a:ext uri="{FF2B5EF4-FFF2-40B4-BE49-F238E27FC236}">
-                <a16:creationId xmlns:a16="http://schemas.microsoft.com/office/drawing/2014/main" id="{02F6BD05-4155-4839-8166-B0525AEC5FB7}"/>
-              </a:ext>
-            </a:extLst>
-          </p:cNvPr>
-          <p:cNvSpPr txBox="1"/>
-          <p:nvPr/>
-        </p:nvSpPr>
-        <p:spPr>
-          <a:xfrm rot="19684380">
-            <a:off x="7321205" y="2156818"/>
-            <a:ext cx="1376218" cy="369332"/>
-          </a:xfrm>
-          <a:prstGeom prst="rect">
-            <a:avLst/>
-          </a:prstGeom>
-          <a:noFill/>
-        </p:spPr>
-        <p:txBody>
-          <a:bodyPr wrap="square" rtlCol="0">
-            <a:spAutoFit/>
-          </a:bodyPr>
-          <a:lstStyle/>
-          <a:p>
-            <a:r>
-              <a:rPr lang="en-US" dirty="0">
-                <a:solidFill>
-                  <a:schemeClr val="bg1"/>
-                </a:solidFill>
-              </a:rPr>
-              <a:t>shows</a:t>
-            </a:r>
-          </a:p>
-        </p:txBody>
-      </p:sp>
-      <p:cxnSp>
-        <p:nvCxnSpPr>
-          <p:cNvPr id="26" name="Conector recto de flecha 25">
-            <a:extLst>
-              <a:ext uri="{FF2B5EF4-FFF2-40B4-BE49-F238E27FC236}">
-                <a16:creationId xmlns:a16="http://schemas.microsoft.com/office/drawing/2014/main" id="{EAF687F8-0C6A-4F5F-8D35-524D606EF8AA}"/>
-              </a:ext>
-            </a:extLst>
-          </p:cNvPr>
-          <p:cNvCxnSpPr>
-            <a:cxnSpLocks/>
-          </p:cNvCxnSpPr>
-          <p:nvPr/>
-        </p:nvCxnSpPr>
-        <p:spPr>
-          <a:xfrm flipV="1">
-            <a:off x="8009314" y="1944088"/>
-            <a:ext cx="1803404" cy="1162436"/>
-          </a:xfrm>
-          <a:prstGeom prst="straightConnector1">
-            <a:avLst/>
-          </a:prstGeom>
-          <a:ln w="12700">
-            <a:solidFill>
-              <a:schemeClr val="bg1"/>
-            </a:solidFill>
-            <a:headEnd type="triangle"/>
-            <a:tailEnd type="none"/>
-          </a:ln>
-        </p:spPr>
-        <p:style>
-          <a:lnRef idx="1">
-            <a:schemeClr val="accent1"/>
-          </a:lnRef>
-          <a:fillRef idx="0">
-            <a:schemeClr val="accent1"/>
-          </a:fillRef>
-          <a:effectRef idx="0">
-            <a:schemeClr val="accent1"/>
-          </a:effectRef>
-          <a:fontRef idx="minor">
-            <a:schemeClr val="tx1"/>
-          </a:fontRef>
-        </p:style>
-      </p:cxnSp>
-      <p:sp>
-        <p:nvSpPr>
-          <p:cNvPr id="30" name="CuadroTexto 29">
-            <a:extLst>
-              <a:ext uri="{FF2B5EF4-FFF2-40B4-BE49-F238E27FC236}">
-                <a16:creationId xmlns:a16="http://schemas.microsoft.com/office/drawing/2014/main" id="{1A6D4CFD-9757-4884-8C01-C19D63E26B51}"/>
-              </a:ext>
-            </a:extLst>
-          </p:cNvPr>
-          <p:cNvSpPr txBox="1"/>
-          <p:nvPr/>
-        </p:nvSpPr>
-        <p:spPr>
-          <a:xfrm rot="19684380">
-            <a:off x="8602317" y="2280255"/>
-            <a:ext cx="1376218" cy="369332"/>
-          </a:xfrm>
-          <a:prstGeom prst="rect">
-            <a:avLst/>
-          </a:prstGeom>
-          <a:noFill/>
-        </p:spPr>
-        <p:txBody>
-          <a:bodyPr wrap="square" rtlCol="0">
-            <a:spAutoFit/>
-          </a:bodyPr>
-          <a:lstStyle/>
-          <a:p>
-            <a:r>
-              <a:rPr lang="en-US" dirty="0">
-                <a:solidFill>
-                  <a:schemeClr val="bg1"/>
-                </a:solidFill>
-              </a:rPr>
-              <a:t>calls</a:t>
-            </a:r>
-          </a:p>
-        </p:txBody>
-      </p:sp>
       <p:pic>
         <p:nvPicPr>
-          <p:cNvPr id="4" name="Imagen 3">
-            <a:extLst>
-              <a:ext uri="{FF2B5EF4-FFF2-40B4-BE49-F238E27FC236}">
-                <a16:creationId xmlns:a16="http://schemas.microsoft.com/office/drawing/2014/main" id="{9BF0D330-2B6A-4399-AD67-B9065E442DE6}"/>
+          <p:cNvPr id="20" name="Imagen 19">
+            <a:extLst>
+              <a:ext uri="{FF2B5EF4-FFF2-40B4-BE49-F238E27FC236}">
+                <a16:creationId xmlns:a16="http://schemas.microsoft.com/office/drawing/2014/main" id="{9F21517B-AFE6-4534-8D48-19A845A99EDD}"/>
               </a:ext>
             </a:extLst>
           </p:cNvPr>
@@ -12062,8 +11734,8 @@
         </p:blipFill>
         <p:spPr>
           <a:xfrm>
-            <a:off x="7357891" y="1201138"/>
-            <a:ext cx="3971925" cy="742950"/>
+            <a:off x="1342490" y="1107257"/>
+            <a:ext cx="2133600" cy="666750"/>
           </a:xfrm>
           <a:prstGeom prst="rect">
             <a:avLst/>
@@ -12077,10 +11749,456 @@
           </a:effectLst>
         </p:spPr>
       </p:pic>
+      <p:pic>
+        <p:nvPicPr>
+          <p:cNvPr id="21" name="Imagen 20">
+            <a:extLst>
+              <a:ext uri="{FF2B5EF4-FFF2-40B4-BE49-F238E27FC236}">
+                <a16:creationId xmlns:a16="http://schemas.microsoft.com/office/drawing/2014/main" id="{F8E0B413-700B-43D0-B251-DAC03E8FAA31}"/>
+              </a:ext>
+            </a:extLst>
+          </p:cNvPr>
+          <p:cNvPicPr>
+            <a:picLocks noChangeAspect="1"/>
+          </p:cNvPicPr>
+          <p:nvPr/>
+        </p:nvPicPr>
+        <p:blipFill>
+          <a:blip r:embed="rId5"/>
+          <a:stretch>
+            <a:fillRect/>
+          </a:stretch>
+        </p:blipFill>
+        <p:spPr>
+          <a:xfrm>
+            <a:off x="337602" y="2486471"/>
+            <a:ext cx="4143375" cy="733425"/>
+          </a:xfrm>
+          <a:prstGeom prst="rect">
+            <a:avLst/>
+          </a:prstGeom>
+          <a:effectLst>
+            <a:glow rad="25400">
+              <a:schemeClr val="bg1">
+                <a:alpha val="40000"/>
+              </a:schemeClr>
+            </a:glow>
+          </a:effectLst>
+        </p:spPr>
+      </p:pic>
+      <p:pic>
+        <p:nvPicPr>
+          <p:cNvPr id="22" name="Imagen 21">
+            <a:extLst>
+              <a:ext uri="{FF2B5EF4-FFF2-40B4-BE49-F238E27FC236}">
+                <a16:creationId xmlns:a16="http://schemas.microsoft.com/office/drawing/2014/main" id="{565A2473-D34E-4925-A700-B70C80DB591C}"/>
+              </a:ext>
+            </a:extLst>
+          </p:cNvPr>
+          <p:cNvPicPr>
+            <a:picLocks noChangeAspect="1"/>
+          </p:cNvPicPr>
+          <p:nvPr/>
+        </p:nvPicPr>
+        <p:blipFill>
+          <a:blip r:embed="rId6"/>
+          <a:stretch>
+            <a:fillRect/>
+          </a:stretch>
+        </p:blipFill>
+        <p:spPr>
+          <a:xfrm>
+            <a:off x="216906" y="4000500"/>
+            <a:ext cx="4384768" cy="2672108"/>
+          </a:xfrm>
+          <a:prstGeom prst="rect">
+            <a:avLst/>
+          </a:prstGeom>
+          <a:effectLst>
+            <a:glow rad="25400">
+              <a:schemeClr val="bg1">
+                <a:alpha val="40000"/>
+              </a:schemeClr>
+            </a:glow>
+          </a:effectLst>
+        </p:spPr>
+      </p:pic>
+      <p:cxnSp>
+        <p:nvCxnSpPr>
+          <p:cNvPr id="23" name="Conector recto de flecha 22">
+            <a:extLst>
+              <a:ext uri="{FF2B5EF4-FFF2-40B4-BE49-F238E27FC236}">
+                <a16:creationId xmlns:a16="http://schemas.microsoft.com/office/drawing/2014/main" id="{288086D6-AC90-4253-9770-B09D2DF51D7B}"/>
+              </a:ext>
+            </a:extLst>
+          </p:cNvPr>
+          <p:cNvCxnSpPr>
+            <a:cxnSpLocks/>
+            <a:stCxn id="21" idx="0"/>
+            <a:endCxn id="20" idx="2"/>
+          </p:cNvCxnSpPr>
+          <p:nvPr/>
+        </p:nvCxnSpPr>
+        <p:spPr>
+          <a:xfrm flipV="1">
+            <a:off x="2409290" y="1774007"/>
+            <a:ext cx="0" cy="712464"/>
+          </a:xfrm>
+          <a:prstGeom prst="straightConnector1">
+            <a:avLst/>
+          </a:prstGeom>
+          <a:ln w="12700">
+            <a:solidFill>
+              <a:schemeClr val="bg1"/>
+            </a:solidFill>
+            <a:tailEnd type="triangle"/>
+          </a:ln>
+        </p:spPr>
+        <p:style>
+          <a:lnRef idx="1">
+            <a:schemeClr val="accent1"/>
+          </a:lnRef>
+          <a:fillRef idx="0">
+            <a:schemeClr val="accent1"/>
+          </a:fillRef>
+          <a:effectRef idx="0">
+            <a:schemeClr val="accent1"/>
+          </a:effectRef>
+          <a:fontRef idx="minor">
+            <a:schemeClr val="tx1"/>
+          </a:fontRef>
+        </p:style>
+      </p:cxnSp>
+      <p:cxnSp>
+        <p:nvCxnSpPr>
+          <p:cNvPr id="25" name="Conector recto de flecha 24">
+            <a:extLst>
+              <a:ext uri="{FF2B5EF4-FFF2-40B4-BE49-F238E27FC236}">
+                <a16:creationId xmlns:a16="http://schemas.microsoft.com/office/drawing/2014/main" id="{DCDBD17B-E640-4BC7-A2C1-1B181AB12B17}"/>
+              </a:ext>
+            </a:extLst>
+          </p:cNvPr>
+          <p:cNvCxnSpPr>
+            <a:cxnSpLocks/>
+            <a:stCxn id="19" idx="0"/>
+            <a:endCxn id="18" idx="2"/>
+          </p:cNvCxnSpPr>
+          <p:nvPr/>
+        </p:nvCxnSpPr>
+        <p:spPr>
+          <a:xfrm flipV="1">
+            <a:off x="9136544" y="1460373"/>
+            <a:ext cx="0" cy="514034"/>
+          </a:xfrm>
+          <a:prstGeom prst="straightConnector1">
+            <a:avLst/>
+          </a:prstGeom>
+          <a:ln w="12700">
+            <a:solidFill>
+              <a:schemeClr val="bg1"/>
+            </a:solidFill>
+            <a:tailEnd type="triangle"/>
+          </a:ln>
+        </p:spPr>
+        <p:style>
+          <a:lnRef idx="1">
+            <a:schemeClr val="accent1"/>
+          </a:lnRef>
+          <a:fillRef idx="0">
+            <a:schemeClr val="accent1"/>
+          </a:fillRef>
+          <a:effectRef idx="0">
+            <a:schemeClr val="accent1"/>
+          </a:effectRef>
+          <a:fontRef idx="minor">
+            <a:schemeClr val="tx1"/>
+          </a:fontRef>
+        </p:style>
+      </p:cxnSp>
+      <p:sp>
+        <p:nvSpPr>
+          <p:cNvPr id="40" name="CuadroTexto 39">
+            <a:extLst>
+              <a:ext uri="{FF2B5EF4-FFF2-40B4-BE49-F238E27FC236}">
+                <a16:creationId xmlns:a16="http://schemas.microsoft.com/office/drawing/2014/main" id="{03B08572-A362-4A23-ACE4-11F9311FFFFF}"/>
+              </a:ext>
+            </a:extLst>
+          </p:cNvPr>
+          <p:cNvSpPr txBox="1"/>
+          <p:nvPr/>
+        </p:nvSpPr>
+        <p:spPr>
+          <a:xfrm>
+            <a:off x="2409289" y="1956053"/>
+            <a:ext cx="1376218" cy="369332"/>
+          </a:xfrm>
+          <a:prstGeom prst="rect">
+            <a:avLst/>
+          </a:prstGeom>
+          <a:noFill/>
+        </p:spPr>
+        <p:txBody>
+          <a:bodyPr wrap="square" rtlCol="0">
+            <a:spAutoFit/>
+          </a:bodyPr>
+          <a:lstStyle/>
+          <a:p>
+            <a:r>
+              <a:rPr lang="en-US" dirty="0">
+                <a:solidFill>
+                  <a:schemeClr val="bg1"/>
+                </a:solidFill>
+              </a:rPr>
+              <a:t>implements</a:t>
+            </a:r>
+          </a:p>
+        </p:txBody>
+      </p:sp>
+      <p:sp>
+        <p:nvSpPr>
+          <p:cNvPr id="41" name="CuadroTexto 40">
+            <a:extLst>
+              <a:ext uri="{FF2B5EF4-FFF2-40B4-BE49-F238E27FC236}">
+                <a16:creationId xmlns:a16="http://schemas.microsoft.com/office/drawing/2014/main" id="{0E583B83-0817-44C5-8EEC-76AB33E83EC7}"/>
+              </a:ext>
+            </a:extLst>
+          </p:cNvPr>
+          <p:cNvSpPr txBox="1"/>
+          <p:nvPr/>
+        </p:nvSpPr>
+        <p:spPr>
+          <a:xfrm>
+            <a:off x="9136544" y="1532724"/>
+            <a:ext cx="1376218" cy="369332"/>
+          </a:xfrm>
+          <a:prstGeom prst="rect">
+            <a:avLst/>
+          </a:prstGeom>
+          <a:noFill/>
+        </p:spPr>
+        <p:txBody>
+          <a:bodyPr wrap="square" rtlCol="0">
+            <a:spAutoFit/>
+          </a:bodyPr>
+          <a:lstStyle/>
+          <a:p>
+            <a:r>
+              <a:rPr lang="en-US" dirty="0">
+                <a:solidFill>
+                  <a:schemeClr val="bg1"/>
+                </a:solidFill>
+              </a:rPr>
+              <a:t>implements</a:t>
+            </a:r>
+          </a:p>
+        </p:txBody>
+      </p:sp>
+      <p:cxnSp>
+        <p:nvCxnSpPr>
+          <p:cNvPr id="42" name="Conector recto de flecha 41">
+            <a:extLst>
+              <a:ext uri="{FF2B5EF4-FFF2-40B4-BE49-F238E27FC236}">
+                <a16:creationId xmlns:a16="http://schemas.microsoft.com/office/drawing/2014/main" id="{634564FE-B809-4BE0-9962-E12A1E1C3AD7}"/>
+              </a:ext>
+            </a:extLst>
+          </p:cNvPr>
+          <p:cNvCxnSpPr>
+            <a:cxnSpLocks/>
+            <a:stCxn id="19" idx="1"/>
+            <a:endCxn id="21" idx="3"/>
+          </p:cNvCxnSpPr>
+          <p:nvPr/>
+        </p:nvCxnSpPr>
+        <p:spPr>
+          <a:xfrm flipH="1" flipV="1">
+            <a:off x="4480977" y="2853184"/>
+            <a:ext cx="1937713" cy="736762"/>
+          </a:xfrm>
+          <a:prstGeom prst="straightConnector1">
+            <a:avLst/>
+          </a:prstGeom>
+          <a:ln w="12700">
+            <a:solidFill>
+              <a:schemeClr val="bg1"/>
+            </a:solidFill>
+            <a:tailEnd type="triangle"/>
+          </a:ln>
+        </p:spPr>
+        <p:style>
+          <a:lnRef idx="1">
+            <a:schemeClr val="accent1"/>
+          </a:lnRef>
+          <a:fillRef idx="0">
+            <a:schemeClr val="accent1"/>
+          </a:fillRef>
+          <a:effectRef idx="0">
+            <a:schemeClr val="accent1"/>
+          </a:effectRef>
+          <a:fontRef idx="minor">
+            <a:schemeClr val="tx1"/>
+          </a:fontRef>
+        </p:style>
+      </p:cxnSp>
+      <p:sp>
+        <p:nvSpPr>
+          <p:cNvPr id="45" name="CuadroTexto 44">
+            <a:extLst>
+              <a:ext uri="{FF2B5EF4-FFF2-40B4-BE49-F238E27FC236}">
+                <a16:creationId xmlns:a16="http://schemas.microsoft.com/office/drawing/2014/main" id="{490A1768-8CAE-4B4D-B7E6-7F5B4660D0B3}"/>
+              </a:ext>
+            </a:extLst>
+          </p:cNvPr>
+          <p:cNvSpPr txBox="1"/>
+          <p:nvPr/>
+        </p:nvSpPr>
+        <p:spPr>
+          <a:xfrm>
+            <a:off x="5250025" y="2785109"/>
+            <a:ext cx="1376218" cy="369332"/>
+          </a:xfrm>
+          <a:prstGeom prst="rect">
+            <a:avLst/>
+          </a:prstGeom>
+          <a:noFill/>
+        </p:spPr>
+        <p:txBody>
+          <a:bodyPr wrap="square" rtlCol="0">
+            <a:spAutoFit/>
+          </a:bodyPr>
+          <a:lstStyle/>
+          <a:p>
+            <a:r>
+              <a:rPr lang="en-US" dirty="0">
+                <a:solidFill>
+                  <a:schemeClr val="bg1"/>
+                </a:solidFill>
+              </a:rPr>
+              <a:t>notifies</a:t>
+            </a:r>
+          </a:p>
+        </p:txBody>
+      </p:sp>
+      <p:sp>
+        <p:nvSpPr>
+          <p:cNvPr id="46" name="CuadroTexto 45">
+            <a:extLst>
+              <a:ext uri="{FF2B5EF4-FFF2-40B4-BE49-F238E27FC236}">
+                <a16:creationId xmlns:a16="http://schemas.microsoft.com/office/drawing/2014/main" id="{65742C75-7357-47DB-8042-C59E3670D417}"/>
+              </a:ext>
+            </a:extLst>
+          </p:cNvPr>
+          <p:cNvSpPr txBox="1"/>
+          <p:nvPr/>
+        </p:nvSpPr>
+        <p:spPr>
+          <a:xfrm>
+            <a:off x="216508" y="3585703"/>
+            <a:ext cx="1376218" cy="369332"/>
+          </a:xfrm>
+          <a:prstGeom prst="rect">
+            <a:avLst/>
+          </a:prstGeom>
+          <a:noFill/>
+        </p:spPr>
+        <p:txBody>
+          <a:bodyPr wrap="square" rtlCol="0">
+            <a:spAutoFit/>
+          </a:bodyPr>
+          <a:lstStyle/>
+          <a:p>
+            <a:r>
+              <a:rPr lang="en-US" dirty="0">
+                <a:solidFill>
+                  <a:schemeClr val="bg1"/>
+                </a:solidFill>
+              </a:rPr>
+              <a:t>Usage:</a:t>
+            </a:r>
+          </a:p>
+        </p:txBody>
+      </p:sp>
     </p:spTree>
     <p:extLst>
       <p:ext uri="{BB962C8B-B14F-4D97-AF65-F5344CB8AC3E}">
-        <p14:creationId xmlns:p14="http://schemas.microsoft.com/office/powerpoint/2010/main" val="4248247360"/>
+        <p14:creationId xmlns:p14="http://schemas.microsoft.com/office/powerpoint/2010/main" val="338856597"/>
+      </p:ext>
+    </p:extLst>
+  </p:cSld>
+  <p:clrMapOvr>
+    <a:masterClrMapping/>
+  </p:clrMapOvr>
+</p:sld>
+</file>
+
+<file path=ppt/slides/slide35.xml><?xml version="1.0" encoding="utf-8"?>
+<p:sld xmlns:a="http://schemas.openxmlformats.org/drawingml/2006/main" xmlns:r="http://schemas.openxmlformats.org/officeDocument/2006/relationships" xmlns:p="http://schemas.openxmlformats.org/presentationml/2006/main">
+  <p:cSld>
+    <p:spTree>
+      <p:nvGrpSpPr>
+        <p:cNvPr id="1" name=""/>
+        <p:cNvGrpSpPr/>
+        <p:nvPr/>
+      </p:nvGrpSpPr>
+      <p:grpSpPr>
+        <a:xfrm>
+          <a:off x="0" y="0"/>
+          <a:ext cx="0" cy="0"/>
+          <a:chOff x="0" y="0"/>
+          <a:chExt cx="0" cy="0"/>
+        </a:xfrm>
+      </p:grpSpPr>
+      <p:sp>
+        <p:nvSpPr>
+          <p:cNvPr id="2" name="Título 1">
+            <a:extLst>
+              <a:ext uri="{FF2B5EF4-FFF2-40B4-BE49-F238E27FC236}">
+                <a16:creationId xmlns:a16="http://schemas.microsoft.com/office/drawing/2014/main" id="{51E579E3-4D4D-4391-A4DB-77F6C6DD84BE}"/>
+              </a:ext>
+            </a:extLst>
+          </p:cNvPr>
+          <p:cNvSpPr>
+            <a:spLocks noGrp="1"/>
+          </p:cNvSpPr>
+          <p:nvPr>
+            <p:ph type="title"/>
+          </p:nvPr>
+        </p:nvSpPr>
+        <p:spPr>
+          <a:xfrm>
+            <a:off x="900344" y="2766218"/>
+            <a:ext cx="10515600" cy="1325563"/>
+          </a:xfrm>
+        </p:spPr>
+        <p:txBody>
+          <a:bodyPr/>
+          <a:lstStyle/>
+          <a:p>
+            <a:r>
+              <a:rPr lang="es-ES" dirty="0">
+                <a:solidFill>
+                  <a:srgbClr val="000000"/>
+                </a:solidFill>
+                <a:latin typeface="Calibri" panose="020F0502020204030204" pitchFamily="34" charset="0"/>
+              </a:rPr>
+              <a:t>Mediator </a:t>
+            </a:r>
+            <a:r>
+              <a:rPr lang="es-ES" dirty="0" err="1">
+                <a:solidFill>
+                  <a:srgbClr val="000000"/>
+                </a:solidFill>
+                <a:latin typeface="Calibri" panose="020F0502020204030204" pitchFamily="34" charset="0"/>
+              </a:rPr>
+              <a:t>pattern</a:t>
+            </a:r>
+            <a:endParaRPr lang="en-US" dirty="0"/>
+          </a:p>
+        </p:txBody>
+      </p:sp>
+    </p:spTree>
+    <p:extLst>
+      <p:ext uri="{BB962C8B-B14F-4D97-AF65-F5344CB8AC3E}">
+        <p14:creationId xmlns:p14="http://schemas.microsoft.com/office/powerpoint/2010/main" val="1434885801"/>
       </p:ext>
     </p:extLst>
   </p:cSld>
@@ -12117,10 +12235,10 @@
       </p:grpSpPr>
       <p:sp>
         <p:nvSpPr>
-          <p:cNvPr id="22" name="CuadroTexto 21">
-            <a:extLst>
-              <a:ext uri="{FF2B5EF4-FFF2-40B4-BE49-F238E27FC236}">
-                <a16:creationId xmlns:a16="http://schemas.microsoft.com/office/drawing/2014/main" id="{C9B1F5C4-0BBA-41F3-84BD-1322F509FDEF}"/>
+          <p:cNvPr id="31" name="CuadroTexto 30">
+            <a:extLst>
+              <a:ext uri="{FF2B5EF4-FFF2-40B4-BE49-F238E27FC236}">
+                <a16:creationId xmlns:a16="http://schemas.microsoft.com/office/drawing/2014/main" id="{FBF7026D-12F4-4541-8110-DE706094717A}"/>
               </a:ext>
             </a:extLst>
           </p:cNvPr>
@@ -12129,7 +12247,7 @@
         </p:nvSpPr>
         <p:spPr>
           <a:xfrm>
-            <a:off x="361700" y="215130"/>
+            <a:off x="484863" y="185392"/>
             <a:ext cx="3397994" cy="646331"/>
           </a:xfrm>
           <a:prstGeom prst="rect">
@@ -12144,275 +12262,27 @@
           <a:lstStyle/>
           <a:p>
             <a:r>
-              <a:rPr lang="en-US" sz="3600" dirty="0">
+              <a:rPr lang="en-US" sz="3600" dirty="0" err="1">
                 <a:solidFill>
                   <a:srgbClr val="53A2D3"/>
                 </a:solidFill>
               </a:rPr>
-              <a:t>Mundo real</a:t>
-            </a:r>
-          </a:p>
-        </p:txBody>
-      </p:sp>
-      <p:cxnSp>
-        <p:nvCxnSpPr>
-          <p:cNvPr id="13" name="Conector recto de flecha 12">
-            <a:extLst>
-              <a:ext uri="{FF2B5EF4-FFF2-40B4-BE49-F238E27FC236}">
-                <a16:creationId xmlns:a16="http://schemas.microsoft.com/office/drawing/2014/main" id="{3FEF1901-0773-4F55-AA20-B58A56F18BD1}"/>
-              </a:ext>
-            </a:extLst>
-          </p:cNvPr>
-          <p:cNvCxnSpPr>
-            <a:cxnSpLocks/>
-            <a:stCxn id="10" idx="1"/>
-            <a:endCxn id="8" idx="3"/>
-          </p:cNvCxnSpPr>
-          <p:nvPr/>
-        </p:nvCxnSpPr>
-        <p:spPr>
-          <a:xfrm flipH="1">
-            <a:off x="5122993" y="4304236"/>
-            <a:ext cx="2014643" cy="0"/>
-          </a:xfrm>
-          <a:prstGeom prst="straightConnector1">
-            <a:avLst/>
-          </a:prstGeom>
-          <a:ln w="12700">
-            <a:solidFill>
-              <a:schemeClr val="bg1"/>
-            </a:solidFill>
-            <a:tailEnd type="triangle"/>
-          </a:ln>
-        </p:spPr>
-        <p:style>
-          <a:lnRef idx="1">
-            <a:schemeClr val="accent1"/>
-          </a:lnRef>
-          <a:fillRef idx="0">
-            <a:schemeClr val="accent1"/>
-          </a:fillRef>
-          <a:effectRef idx="0">
-            <a:schemeClr val="accent1"/>
-          </a:effectRef>
-          <a:fontRef idx="minor">
-            <a:schemeClr val="tx1"/>
-          </a:fontRef>
-        </p:style>
-      </p:cxnSp>
-      <p:sp>
-        <p:nvSpPr>
-          <p:cNvPr id="14" name="CuadroTexto 13">
-            <a:extLst>
-              <a:ext uri="{FF2B5EF4-FFF2-40B4-BE49-F238E27FC236}">
-                <a16:creationId xmlns:a16="http://schemas.microsoft.com/office/drawing/2014/main" id="{9B0DA9C3-988A-48A6-AE67-460CB9540473}"/>
-              </a:ext>
-            </a:extLst>
-          </p:cNvPr>
-          <p:cNvSpPr txBox="1"/>
-          <p:nvPr/>
-        </p:nvSpPr>
-        <p:spPr>
-          <a:xfrm>
-            <a:off x="5609059" y="3996717"/>
-            <a:ext cx="1376218" cy="369332"/>
-          </a:xfrm>
-          <a:prstGeom prst="rect">
-            <a:avLst/>
-          </a:prstGeom>
-          <a:noFill/>
-        </p:spPr>
-        <p:txBody>
-          <a:bodyPr wrap="square" rtlCol="0">
-            <a:spAutoFit/>
-          </a:bodyPr>
-          <a:lstStyle/>
-          <a:p>
-            <a:r>
-              <a:rPr lang="en-US" dirty="0">
-                <a:solidFill>
-                  <a:schemeClr val="bg1"/>
-                </a:solidFill>
-              </a:rPr>
-              <a:t>contains</a:t>
-            </a:r>
-          </a:p>
-        </p:txBody>
-      </p:sp>
-      <p:cxnSp>
-        <p:nvCxnSpPr>
-          <p:cNvPr id="23" name="Conector recto de flecha 22">
-            <a:extLst>
-              <a:ext uri="{FF2B5EF4-FFF2-40B4-BE49-F238E27FC236}">
-                <a16:creationId xmlns:a16="http://schemas.microsoft.com/office/drawing/2014/main" id="{34AE3A4C-C027-4534-B21C-6462C9EB6F54}"/>
-              </a:ext>
-            </a:extLst>
-          </p:cNvPr>
-          <p:cNvCxnSpPr>
-            <a:cxnSpLocks/>
-            <a:endCxn id="7" idx="2"/>
-          </p:cNvCxnSpPr>
-          <p:nvPr/>
-        </p:nvCxnSpPr>
-        <p:spPr>
-          <a:xfrm flipH="1" flipV="1">
-            <a:off x="7933721" y="1089348"/>
-            <a:ext cx="588266" cy="841185"/>
-          </a:xfrm>
-          <a:prstGeom prst="straightConnector1">
-            <a:avLst/>
-          </a:prstGeom>
-          <a:ln w="12700">
-            <a:solidFill>
-              <a:schemeClr val="bg1"/>
-            </a:solidFill>
-            <a:tailEnd type="triangle"/>
-          </a:ln>
-        </p:spPr>
-        <p:style>
-          <a:lnRef idx="1">
-            <a:schemeClr val="accent1"/>
-          </a:lnRef>
-          <a:fillRef idx="0">
-            <a:schemeClr val="accent1"/>
-          </a:fillRef>
-          <a:effectRef idx="0">
-            <a:schemeClr val="accent1"/>
-          </a:effectRef>
-          <a:fontRef idx="minor">
-            <a:schemeClr val="tx1"/>
-          </a:fontRef>
-        </p:style>
-      </p:cxnSp>
-      <p:sp>
-        <p:nvSpPr>
-          <p:cNvPr id="25" name="CuadroTexto 24">
-            <a:extLst>
-              <a:ext uri="{FF2B5EF4-FFF2-40B4-BE49-F238E27FC236}">
-                <a16:creationId xmlns:a16="http://schemas.microsoft.com/office/drawing/2014/main" id="{BB1FF878-5C4C-466C-9FC5-A1BAA31AA318}"/>
-              </a:ext>
-            </a:extLst>
-          </p:cNvPr>
-          <p:cNvSpPr txBox="1"/>
-          <p:nvPr/>
-        </p:nvSpPr>
-        <p:spPr>
-          <a:xfrm>
-            <a:off x="7360795" y="1325274"/>
-            <a:ext cx="1376218" cy="369332"/>
-          </a:xfrm>
-          <a:prstGeom prst="rect">
-            <a:avLst/>
-          </a:prstGeom>
-          <a:noFill/>
-        </p:spPr>
-        <p:txBody>
-          <a:bodyPr wrap="square" rtlCol="0">
-            <a:spAutoFit/>
-          </a:bodyPr>
-          <a:lstStyle/>
-          <a:p>
-            <a:r>
-              <a:rPr lang="en-US" dirty="0">
-                <a:solidFill>
-                  <a:schemeClr val="bg1"/>
-                </a:solidFill>
-              </a:rPr>
-              <a:t>shows</a:t>
-            </a:r>
-          </a:p>
-        </p:txBody>
-      </p:sp>
-      <p:cxnSp>
-        <p:nvCxnSpPr>
-          <p:cNvPr id="26" name="Conector recto de flecha 25">
-            <a:extLst>
-              <a:ext uri="{FF2B5EF4-FFF2-40B4-BE49-F238E27FC236}">
-                <a16:creationId xmlns:a16="http://schemas.microsoft.com/office/drawing/2014/main" id="{81001ED0-1228-4F08-BAA6-AC852D419646}"/>
-              </a:ext>
-            </a:extLst>
-          </p:cNvPr>
-          <p:cNvCxnSpPr>
-            <a:cxnSpLocks/>
-          </p:cNvCxnSpPr>
-          <p:nvPr/>
-        </p:nvCxnSpPr>
-        <p:spPr>
-          <a:xfrm flipH="1" flipV="1">
-            <a:off x="8547902" y="1090420"/>
-            <a:ext cx="587430" cy="840113"/>
-          </a:xfrm>
-          <a:prstGeom prst="straightConnector1">
-            <a:avLst/>
-          </a:prstGeom>
-          <a:ln w="12700">
-            <a:solidFill>
-              <a:schemeClr val="bg1"/>
-            </a:solidFill>
-            <a:headEnd type="triangle"/>
-            <a:tailEnd type="none"/>
-          </a:ln>
-        </p:spPr>
-        <p:style>
-          <a:lnRef idx="1">
-            <a:schemeClr val="accent1"/>
-          </a:lnRef>
-          <a:fillRef idx="0">
-            <a:schemeClr val="accent1"/>
-          </a:fillRef>
-          <a:effectRef idx="0">
-            <a:schemeClr val="accent1"/>
-          </a:effectRef>
-          <a:fontRef idx="minor">
-            <a:schemeClr val="tx1"/>
-          </a:fontRef>
-        </p:style>
-      </p:cxnSp>
-      <p:sp>
-        <p:nvSpPr>
-          <p:cNvPr id="27" name="CuadroTexto 26">
-            <a:extLst>
-              <a:ext uri="{FF2B5EF4-FFF2-40B4-BE49-F238E27FC236}">
-                <a16:creationId xmlns:a16="http://schemas.microsoft.com/office/drawing/2014/main" id="{DB051C0C-8A08-4ABE-A33C-3AEEF757C89F}"/>
-              </a:ext>
-            </a:extLst>
-          </p:cNvPr>
-          <p:cNvSpPr txBox="1"/>
-          <p:nvPr/>
-        </p:nvSpPr>
-        <p:spPr>
-          <a:xfrm>
-            <a:off x="8946221" y="1325274"/>
-            <a:ext cx="1376218" cy="369332"/>
-          </a:xfrm>
-          <a:prstGeom prst="rect">
-            <a:avLst/>
-          </a:prstGeom>
-          <a:noFill/>
-        </p:spPr>
-        <p:txBody>
-          <a:bodyPr wrap="square" rtlCol="0">
-            <a:spAutoFit/>
-          </a:bodyPr>
-          <a:lstStyle/>
-          <a:p>
-            <a:r>
-              <a:rPr lang="en-US" dirty="0">
-                <a:solidFill>
-                  <a:schemeClr val="bg1"/>
-                </a:solidFill>
-              </a:rPr>
-              <a:t>calls</a:t>
-            </a:r>
+              <a:t>Teoría</a:t>
+            </a:r>
+            <a:endParaRPr lang="en-US" sz="3600" dirty="0">
+              <a:solidFill>
+                <a:srgbClr val="53A2D3"/>
+              </a:solidFill>
+            </a:endParaRPr>
           </a:p>
         </p:txBody>
       </p:sp>
       <p:pic>
         <p:nvPicPr>
-          <p:cNvPr id="7" name="Imagen 6">
-            <a:extLst>
-              <a:ext uri="{FF2B5EF4-FFF2-40B4-BE49-F238E27FC236}">
-                <a16:creationId xmlns:a16="http://schemas.microsoft.com/office/drawing/2014/main" id="{6093698F-10F2-4A23-AAAF-32CC685B484B}"/>
+          <p:cNvPr id="12" name="Imagen 11">
+            <a:extLst>
+              <a:ext uri="{FF2B5EF4-FFF2-40B4-BE49-F238E27FC236}">
+                <a16:creationId xmlns:a16="http://schemas.microsoft.com/office/drawing/2014/main" id="{87D5173E-68ED-4CB9-B8B3-C75B37E09E34}"/>
               </a:ext>
             </a:extLst>
           </p:cNvPr>
@@ -12429,8 +12299,8 @@
         </p:blipFill>
         <p:spPr>
           <a:xfrm>
-            <a:off x="5361971" y="374973"/>
-            <a:ext cx="5143500" cy="714375"/>
+            <a:off x="5835620" y="667304"/>
+            <a:ext cx="2390775" cy="781050"/>
           </a:xfrm>
           <a:prstGeom prst="rect">
             <a:avLst/>
@@ -12446,10 +12316,10 @@
       </p:pic>
       <p:pic>
         <p:nvPicPr>
-          <p:cNvPr id="8" name="Imagen 7">
-            <a:extLst>
-              <a:ext uri="{FF2B5EF4-FFF2-40B4-BE49-F238E27FC236}">
-                <a16:creationId xmlns:a16="http://schemas.microsoft.com/office/drawing/2014/main" id="{90553F9F-F089-4AC7-88B2-FAEE12B0CBEF}"/>
+          <p:cNvPr id="13" name="Imagen 12">
+            <a:extLst>
+              <a:ext uri="{FF2B5EF4-FFF2-40B4-BE49-F238E27FC236}">
+                <a16:creationId xmlns:a16="http://schemas.microsoft.com/office/drawing/2014/main" id="{2D898126-78B1-40B7-90C4-890AD38DBB13}"/>
               </a:ext>
             </a:extLst>
           </p:cNvPr>
@@ -12466,8 +12336,8 @@
         </p:blipFill>
         <p:spPr>
           <a:xfrm>
-            <a:off x="361700" y="3395989"/>
-            <a:ext cx="4761293" cy="1816493"/>
+            <a:off x="2399700" y="2587021"/>
+            <a:ext cx="3781425" cy="771525"/>
           </a:xfrm>
           <a:prstGeom prst="rect">
             <a:avLst/>
@@ -12483,10 +12353,10 @@
       </p:pic>
       <p:pic>
         <p:nvPicPr>
-          <p:cNvPr id="10" name="Imagen 9">
-            <a:extLst>
-              <a:ext uri="{FF2B5EF4-FFF2-40B4-BE49-F238E27FC236}">
-                <a16:creationId xmlns:a16="http://schemas.microsoft.com/office/drawing/2014/main" id="{44E765E2-07D6-4F0B-A066-D1C68161C31A}"/>
+          <p:cNvPr id="14" name="Imagen 13">
+            <a:extLst>
+              <a:ext uri="{FF2B5EF4-FFF2-40B4-BE49-F238E27FC236}">
+                <a16:creationId xmlns:a16="http://schemas.microsoft.com/office/drawing/2014/main" id="{19B1A354-69C0-4961-9141-CF909426F6A3}"/>
               </a:ext>
             </a:extLst>
           </p:cNvPr>
@@ -12503,8 +12373,8 @@
         </p:blipFill>
         <p:spPr>
           <a:xfrm>
-            <a:off x="7137636" y="1930533"/>
-            <a:ext cx="4711778" cy="4747406"/>
+            <a:off x="7726302" y="2587021"/>
+            <a:ext cx="3848100" cy="752475"/>
           </a:xfrm>
           <a:prstGeom prst="rect">
             <a:avLst/>
@@ -12518,10 +12388,387 @@
           </a:effectLst>
         </p:spPr>
       </p:pic>
+      <p:pic>
+        <p:nvPicPr>
+          <p:cNvPr id="18" name="Imagen 17">
+            <a:extLst>
+              <a:ext uri="{FF2B5EF4-FFF2-40B4-BE49-F238E27FC236}">
+                <a16:creationId xmlns:a16="http://schemas.microsoft.com/office/drawing/2014/main" id="{5F2AC9E6-F6D3-4139-B8D4-1705BBDADF6E}"/>
+              </a:ext>
+            </a:extLst>
+          </p:cNvPr>
+          <p:cNvPicPr>
+            <a:picLocks noChangeAspect="1"/>
+          </p:cNvPicPr>
+          <p:nvPr/>
+        </p:nvPicPr>
+        <p:blipFill>
+          <a:blip r:embed="rId5"/>
+          <a:stretch>
+            <a:fillRect/>
+          </a:stretch>
+        </p:blipFill>
+        <p:spPr>
+          <a:xfrm>
+            <a:off x="5264121" y="4091971"/>
+            <a:ext cx="3533775" cy="2238375"/>
+          </a:xfrm>
+          <a:prstGeom prst="rect">
+            <a:avLst/>
+          </a:prstGeom>
+          <a:effectLst>
+            <a:glow rad="25400">
+              <a:schemeClr val="bg1">
+                <a:alpha val="40000"/>
+              </a:schemeClr>
+            </a:glow>
+          </a:effectLst>
+        </p:spPr>
+      </p:pic>
+      <p:cxnSp>
+        <p:nvCxnSpPr>
+          <p:cNvPr id="19" name="Conector recto de flecha 18">
+            <a:extLst>
+              <a:ext uri="{FF2B5EF4-FFF2-40B4-BE49-F238E27FC236}">
+                <a16:creationId xmlns:a16="http://schemas.microsoft.com/office/drawing/2014/main" id="{72E477A2-BA93-4B59-BE4C-D41FF49C2E84}"/>
+              </a:ext>
+            </a:extLst>
+          </p:cNvPr>
+          <p:cNvCxnSpPr>
+            <a:cxnSpLocks/>
+            <a:stCxn id="13" idx="0"/>
+            <a:endCxn id="12" idx="2"/>
+          </p:cNvCxnSpPr>
+          <p:nvPr/>
+        </p:nvCxnSpPr>
+        <p:spPr>
+          <a:xfrm flipV="1">
+            <a:off x="4290413" y="1448354"/>
+            <a:ext cx="2740595" cy="1138667"/>
+          </a:xfrm>
+          <a:prstGeom prst="straightConnector1">
+            <a:avLst/>
+          </a:prstGeom>
+          <a:ln w="12700">
+            <a:solidFill>
+              <a:schemeClr val="bg1"/>
+            </a:solidFill>
+            <a:tailEnd type="triangle"/>
+          </a:ln>
+        </p:spPr>
+        <p:style>
+          <a:lnRef idx="1">
+            <a:schemeClr val="accent1"/>
+          </a:lnRef>
+          <a:fillRef idx="0">
+            <a:schemeClr val="accent1"/>
+          </a:fillRef>
+          <a:effectRef idx="0">
+            <a:schemeClr val="accent1"/>
+          </a:effectRef>
+          <a:fontRef idx="minor">
+            <a:schemeClr val="tx1"/>
+          </a:fontRef>
+        </p:style>
+      </p:cxnSp>
+      <p:sp>
+        <p:nvSpPr>
+          <p:cNvPr id="20" name="CuadroTexto 19">
+            <a:extLst>
+              <a:ext uri="{FF2B5EF4-FFF2-40B4-BE49-F238E27FC236}">
+                <a16:creationId xmlns:a16="http://schemas.microsoft.com/office/drawing/2014/main" id="{9FC2B105-3330-4FDE-8278-ED11223BBBD0}"/>
+              </a:ext>
+            </a:extLst>
+          </p:cNvPr>
+          <p:cNvSpPr txBox="1"/>
+          <p:nvPr/>
+        </p:nvSpPr>
+        <p:spPr>
+          <a:xfrm>
+            <a:off x="4230899" y="1673890"/>
+            <a:ext cx="1376218" cy="369332"/>
+          </a:xfrm>
+          <a:prstGeom prst="rect">
+            <a:avLst/>
+          </a:prstGeom>
+          <a:noFill/>
+        </p:spPr>
+        <p:txBody>
+          <a:bodyPr wrap="square" rtlCol="0">
+            <a:spAutoFit/>
+          </a:bodyPr>
+          <a:lstStyle/>
+          <a:p>
+            <a:r>
+              <a:rPr lang="en-US" dirty="0">
+                <a:solidFill>
+                  <a:schemeClr val="bg1"/>
+                </a:solidFill>
+              </a:rPr>
+              <a:t>implements</a:t>
+            </a:r>
+          </a:p>
+        </p:txBody>
+      </p:sp>
+      <p:cxnSp>
+        <p:nvCxnSpPr>
+          <p:cNvPr id="21" name="Conector recto de flecha 20">
+            <a:extLst>
+              <a:ext uri="{FF2B5EF4-FFF2-40B4-BE49-F238E27FC236}">
+                <a16:creationId xmlns:a16="http://schemas.microsoft.com/office/drawing/2014/main" id="{065A241B-FACE-44E7-A47B-B6B595135389}"/>
+              </a:ext>
+            </a:extLst>
+          </p:cNvPr>
+          <p:cNvCxnSpPr>
+            <a:cxnSpLocks/>
+            <a:stCxn id="14" idx="0"/>
+            <a:endCxn id="12" idx="2"/>
+          </p:cNvCxnSpPr>
+          <p:nvPr/>
+        </p:nvCxnSpPr>
+        <p:spPr>
+          <a:xfrm flipH="1" flipV="1">
+            <a:off x="7031008" y="1448354"/>
+            <a:ext cx="2619344" cy="1138667"/>
+          </a:xfrm>
+          <a:prstGeom prst="straightConnector1">
+            <a:avLst/>
+          </a:prstGeom>
+          <a:ln w="12700">
+            <a:solidFill>
+              <a:schemeClr val="bg1"/>
+            </a:solidFill>
+            <a:tailEnd type="triangle"/>
+          </a:ln>
+        </p:spPr>
+        <p:style>
+          <a:lnRef idx="1">
+            <a:schemeClr val="accent1"/>
+          </a:lnRef>
+          <a:fillRef idx="0">
+            <a:schemeClr val="accent1"/>
+          </a:fillRef>
+          <a:effectRef idx="0">
+            <a:schemeClr val="accent1"/>
+          </a:effectRef>
+          <a:fontRef idx="minor">
+            <a:schemeClr val="tx1"/>
+          </a:fontRef>
+        </p:style>
+      </p:cxnSp>
+      <p:sp>
+        <p:nvSpPr>
+          <p:cNvPr id="23" name="CuadroTexto 22">
+            <a:extLst>
+              <a:ext uri="{FF2B5EF4-FFF2-40B4-BE49-F238E27FC236}">
+                <a16:creationId xmlns:a16="http://schemas.microsoft.com/office/drawing/2014/main" id="{0F191663-A16A-4BC0-8120-6ACAD429A1D0}"/>
+              </a:ext>
+            </a:extLst>
+          </p:cNvPr>
+          <p:cNvSpPr txBox="1"/>
+          <p:nvPr/>
+        </p:nvSpPr>
+        <p:spPr>
+          <a:xfrm>
+            <a:off x="8454899" y="1649880"/>
+            <a:ext cx="1376218" cy="369332"/>
+          </a:xfrm>
+          <a:prstGeom prst="rect">
+            <a:avLst/>
+          </a:prstGeom>
+          <a:noFill/>
+        </p:spPr>
+        <p:txBody>
+          <a:bodyPr wrap="square" rtlCol="0">
+            <a:spAutoFit/>
+          </a:bodyPr>
+          <a:lstStyle/>
+          <a:p>
+            <a:r>
+              <a:rPr lang="en-US" dirty="0">
+                <a:solidFill>
+                  <a:schemeClr val="bg1"/>
+                </a:solidFill>
+              </a:rPr>
+              <a:t>implements</a:t>
+            </a:r>
+          </a:p>
+        </p:txBody>
+      </p:sp>
+      <p:cxnSp>
+        <p:nvCxnSpPr>
+          <p:cNvPr id="30" name="Conector recto de flecha 29">
+            <a:extLst>
+              <a:ext uri="{FF2B5EF4-FFF2-40B4-BE49-F238E27FC236}">
+                <a16:creationId xmlns:a16="http://schemas.microsoft.com/office/drawing/2014/main" id="{210F4F8A-303F-47CA-BF47-DC7C1FC9C5B1}"/>
+              </a:ext>
+            </a:extLst>
+          </p:cNvPr>
+          <p:cNvCxnSpPr>
+            <a:cxnSpLocks/>
+            <a:stCxn id="18" idx="1"/>
+            <a:endCxn id="13" idx="2"/>
+          </p:cNvCxnSpPr>
+          <p:nvPr/>
+        </p:nvCxnSpPr>
+        <p:spPr>
+          <a:xfrm flipH="1" flipV="1">
+            <a:off x="4290413" y="3358546"/>
+            <a:ext cx="973708" cy="1852613"/>
+          </a:xfrm>
+          <a:prstGeom prst="straightConnector1">
+            <a:avLst/>
+          </a:prstGeom>
+          <a:ln w="12700">
+            <a:solidFill>
+              <a:schemeClr val="bg1"/>
+            </a:solidFill>
+            <a:tailEnd type="triangle"/>
+          </a:ln>
+        </p:spPr>
+        <p:style>
+          <a:lnRef idx="1">
+            <a:schemeClr val="accent1"/>
+          </a:lnRef>
+          <a:fillRef idx="0">
+            <a:schemeClr val="accent1"/>
+          </a:fillRef>
+          <a:effectRef idx="0">
+            <a:schemeClr val="accent1"/>
+          </a:effectRef>
+          <a:fontRef idx="minor">
+            <a:schemeClr val="tx1"/>
+          </a:fontRef>
+        </p:style>
+      </p:cxnSp>
+      <p:sp>
+        <p:nvSpPr>
+          <p:cNvPr id="32" name="CuadroTexto 31">
+            <a:extLst>
+              <a:ext uri="{FF2B5EF4-FFF2-40B4-BE49-F238E27FC236}">
+                <a16:creationId xmlns:a16="http://schemas.microsoft.com/office/drawing/2014/main" id="{B40902AC-EBE4-47D2-84C7-52C946113453}"/>
+              </a:ext>
+            </a:extLst>
+          </p:cNvPr>
+          <p:cNvSpPr txBox="1"/>
+          <p:nvPr/>
+        </p:nvSpPr>
+        <p:spPr>
+          <a:xfrm>
+            <a:off x="3971819" y="3902345"/>
+            <a:ext cx="1376218" cy="369332"/>
+          </a:xfrm>
+          <a:prstGeom prst="rect">
+            <a:avLst/>
+          </a:prstGeom>
+          <a:noFill/>
+        </p:spPr>
+        <p:txBody>
+          <a:bodyPr wrap="square" rtlCol="0">
+            <a:spAutoFit/>
+          </a:bodyPr>
+          <a:lstStyle/>
+          <a:p>
+            <a:r>
+              <a:rPr lang="en-US" dirty="0">
+                <a:solidFill>
+                  <a:schemeClr val="bg1"/>
+                </a:solidFill>
+              </a:rPr>
+              <a:t>calls</a:t>
+            </a:r>
+          </a:p>
+        </p:txBody>
+      </p:sp>
+      <p:cxnSp>
+        <p:nvCxnSpPr>
+          <p:cNvPr id="33" name="Conector recto de flecha 32">
+            <a:extLst>
+              <a:ext uri="{FF2B5EF4-FFF2-40B4-BE49-F238E27FC236}">
+                <a16:creationId xmlns:a16="http://schemas.microsoft.com/office/drawing/2014/main" id="{709BB2E5-D414-41A5-A5C5-D936BBF42CEB}"/>
+              </a:ext>
+            </a:extLst>
+          </p:cNvPr>
+          <p:cNvCxnSpPr>
+            <a:cxnSpLocks/>
+            <a:stCxn id="18" idx="3"/>
+            <a:endCxn id="14" idx="2"/>
+          </p:cNvCxnSpPr>
+          <p:nvPr/>
+        </p:nvCxnSpPr>
+        <p:spPr>
+          <a:xfrm flipV="1">
+            <a:off x="8797896" y="3339496"/>
+            <a:ext cx="852456" cy="1871663"/>
+          </a:xfrm>
+          <a:prstGeom prst="straightConnector1">
+            <a:avLst/>
+          </a:prstGeom>
+          <a:ln w="12700">
+            <a:solidFill>
+              <a:schemeClr val="bg1"/>
+            </a:solidFill>
+            <a:tailEnd type="triangle"/>
+          </a:ln>
+        </p:spPr>
+        <p:style>
+          <a:lnRef idx="1">
+            <a:schemeClr val="accent1"/>
+          </a:lnRef>
+          <a:fillRef idx="0">
+            <a:schemeClr val="accent1"/>
+          </a:fillRef>
+          <a:effectRef idx="0">
+            <a:schemeClr val="accent1"/>
+          </a:effectRef>
+          <a:fontRef idx="minor">
+            <a:schemeClr val="tx1"/>
+          </a:fontRef>
+        </p:style>
+      </p:cxnSp>
+      <p:sp>
+        <p:nvSpPr>
+          <p:cNvPr id="35" name="CuadroTexto 34">
+            <a:extLst>
+              <a:ext uri="{FF2B5EF4-FFF2-40B4-BE49-F238E27FC236}">
+                <a16:creationId xmlns:a16="http://schemas.microsoft.com/office/drawing/2014/main" id="{45C8BD20-2C1F-4506-A664-D56156685A84}"/>
+              </a:ext>
+            </a:extLst>
+          </p:cNvPr>
+          <p:cNvSpPr txBox="1"/>
+          <p:nvPr/>
+        </p:nvSpPr>
+        <p:spPr>
+          <a:xfrm>
+            <a:off x="9345728" y="3902345"/>
+            <a:ext cx="1376218" cy="369332"/>
+          </a:xfrm>
+          <a:prstGeom prst="rect">
+            <a:avLst/>
+          </a:prstGeom>
+          <a:noFill/>
+        </p:spPr>
+        <p:txBody>
+          <a:bodyPr wrap="square" rtlCol="0">
+            <a:spAutoFit/>
+          </a:bodyPr>
+          <a:lstStyle/>
+          <a:p>
+            <a:r>
+              <a:rPr lang="en-US" dirty="0">
+                <a:solidFill>
+                  <a:schemeClr val="bg1"/>
+                </a:solidFill>
+              </a:rPr>
+              <a:t>calls</a:t>
+            </a:r>
+          </a:p>
+        </p:txBody>
+      </p:sp>
     </p:spTree>
     <p:extLst>
       <p:ext uri="{BB962C8B-B14F-4D97-AF65-F5344CB8AC3E}">
-        <p14:creationId xmlns:p14="http://schemas.microsoft.com/office/powerpoint/2010/main" val="416514896"/>
+        <p14:creationId xmlns:p14="http://schemas.microsoft.com/office/powerpoint/2010/main" val="3412169173"/>
       </p:ext>
     </p:extLst>
   </p:cSld>
@@ -12581,25 +12828,7 @@
                 </a:solidFill>
                 <a:latin typeface="Calibri" panose="020F0502020204030204" pitchFamily="34" charset="0"/>
               </a:rPr>
-              <a:t>Page-</a:t>
-            </a:r>
-            <a:r>
-              <a:rPr lang="es-ES" dirty="0" err="1">
-                <a:solidFill>
-                  <a:srgbClr val="000000"/>
-                </a:solidFill>
-                <a:latin typeface="Calibri" panose="020F0502020204030204" pitchFamily="34" charset="0"/>
-              </a:rPr>
-              <a:t>Object</a:t>
-            </a:r>
-            <a:r>
-              <a:rPr lang="es-ES" dirty="0">
-                <a:solidFill>
-                  <a:srgbClr val="000000"/>
-                </a:solidFill>
-                <a:latin typeface="Calibri" panose="020F0502020204030204" pitchFamily="34" charset="0"/>
-              </a:rPr>
-              <a:t> </a:t>
+              <a:t>Memento </a:t>
             </a:r>
             <a:r>
               <a:rPr lang="es-ES" dirty="0" err="1">
@@ -12617,7 +12846,7 @@
     </p:spTree>
     <p:extLst>
       <p:ext uri="{BB962C8B-B14F-4D97-AF65-F5344CB8AC3E}">
-        <p14:creationId xmlns:p14="http://schemas.microsoft.com/office/powerpoint/2010/main" val="2983471730"/>
+        <p14:creationId xmlns:p14="http://schemas.microsoft.com/office/powerpoint/2010/main" val="1428411220"/>
       </p:ext>
     </p:extLst>
   </p:cSld>
@@ -12698,10 +12927,10 @@
       </p:sp>
       <p:pic>
         <p:nvPicPr>
-          <p:cNvPr id="30" name="Imagen 29">
-            <a:extLst>
-              <a:ext uri="{FF2B5EF4-FFF2-40B4-BE49-F238E27FC236}">
-                <a16:creationId xmlns:a16="http://schemas.microsoft.com/office/drawing/2014/main" id="{11AA3BEE-0DB9-4E5E-97F9-46B38CC019A4}"/>
+          <p:cNvPr id="15" name="Imagen 14">
+            <a:extLst>
+              <a:ext uri="{FF2B5EF4-FFF2-40B4-BE49-F238E27FC236}">
+                <a16:creationId xmlns:a16="http://schemas.microsoft.com/office/drawing/2014/main" id="{38392C8C-FACC-4ECF-A7BA-DF180B59D5A3}"/>
               </a:ext>
             </a:extLst>
           </p:cNvPr>
@@ -12718,8 +12947,8 @@
         </p:blipFill>
         <p:spPr>
           <a:xfrm>
-            <a:off x="320338" y="3308109"/>
-            <a:ext cx="4785360" cy="2990850"/>
+            <a:off x="484863" y="956187"/>
+            <a:ext cx="4095750" cy="1628775"/>
           </a:xfrm>
           <a:prstGeom prst="rect">
             <a:avLst/>
@@ -12735,10 +12964,10 @@
       </p:pic>
       <p:pic>
         <p:nvPicPr>
-          <p:cNvPr id="33" name="Imagen 32">
-            <a:extLst>
-              <a:ext uri="{FF2B5EF4-FFF2-40B4-BE49-F238E27FC236}">
-                <a16:creationId xmlns:a16="http://schemas.microsoft.com/office/drawing/2014/main" id="{27AF6DC8-BCC6-43A0-ACB8-8E24581FFF99}"/>
+          <p:cNvPr id="16" name="Imagen 15">
+            <a:extLst>
+              <a:ext uri="{FF2B5EF4-FFF2-40B4-BE49-F238E27FC236}">
+                <a16:creationId xmlns:a16="http://schemas.microsoft.com/office/drawing/2014/main" id="{AA8452B2-EBF7-458F-BA16-E5BADC9F2DA4}"/>
               </a:ext>
             </a:extLst>
           </p:cNvPr>
@@ -12755,8 +12984,8 @@
         </p:blipFill>
         <p:spPr>
           <a:xfrm>
-            <a:off x="6221148" y="252067"/>
-            <a:ext cx="5485989" cy="2262533"/>
+            <a:off x="7423636" y="3099314"/>
+            <a:ext cx="4000500" cy="3476625"/>
           </a:xfrm>
           <a:prstGeom prst="rect">
             <a:avLst/>
@@ -12772,10 +13001,10 @@
       </p:pic>
       <p:pic>
         <p:nvPicPr>
-          <p:cNvPr id="2" name="Imagen 1">
-            <a:extLst>
-              <a:ext uri="{FF2B5EF4-FFF2-40B4-BE49-F238E27FC236}">
-                <a16:creationId xmlns:a16="http://schemas.microsoft.com/office/drawing/2014/main" id="{0D177CD9-B958-4BF5-9974-F66D391F7A44}"/>
+          <p:cNvPr id="17" name="Imagen 16">
+            <a:extLst>
+              <a:ext uri="{FF2B5EF4-FFF2-40B4-BE49-F238E27FC236}">
+                <a16:creationId xmlns:a16="http://schemas.microsoft.com/office/drawing/2014/main" id="{9F32DCE4-69A0-4BDD-A651-B579636C549E}"/>
               </a:ext>
             </a:extLst>
           </p:cNvPr>
@@ -12792,8 +13021,8 @@
         </p:blipFill>
         <p:spPr>
           <a:xfrm>
-            <a:off x="6221148" y="3124301"/>
-            <a:ext cx="5491163" cy="3358466"/>
+            <a:off x="6315456" y="1249799"/>
+            <a:ext cx="5685453" cy="1041550"/>
           </a:xfrm>
           <a:prstGeom prst="rect">
             <a:avLst/>
@@ -12807,26 +13036,63 @@
           </a:effectLst>
         </p:spPr>
       </p:pic>
+      <p:pic>
+        <p:nvPicPr>
+          <p:cNvPr id="2" name="Imagen 1">
+            <a:extLst>
+              <a:ext uri="{FF2B5EF4-FFF2-40B4-BE49-F238E27FC236}">
+                <a16:creationId xmlns:a16="http://schemas.microsoft.com/office/drawing/2014/main" id="{695C7165-BD4A-4AB9-976B-E680B2026739}"/>
+              </a:ext>
+            </a:extLst>
+          </p:cNvPr>
+          <p:cNvPicPr>
+            <a:picLocks noChangeAspect="1"/>
+          </p:cNvPicPr>
+          <p:nvPr/>
+        </p:nvPicPr>
+        <p:blipFill>
+          <a:blip r:embed="rId5"/>
+          <a:stretch>
+            <a:fillRect/>
+          </a:stretch>
+        </p:blipFill>
+        <p:spPr>
+          <a:xfrm>
+            <a:off x="484863" y="3671852"/>
+            <a:ext cx="4772025" cy="2781300"/>
+          </a:xfrm>
+          <a:prstGeom prst="rect">
+            <a:avLst/>
+          </a:prstGeom>
+          <a:effectLst>
+            <a:glow rad="25400">
+              <a:schemeClr val="bg1">
+                <a:alpha val="40000"/>
+              </a:schemeClr>
+            </a:glow>
+          </a:effectLst>
+        </p:spPr>
+      </p:pic>
       <p:cxnSp>
         <p:nvCxnSpPr>
-          <p:cNvPr id="34" name="Conector recto de flecha 33">
-            <a:extLst>
-              <a:ext uri="{FF2B5EF4-FFF2-40B4-BE49-F238E27FC236}">
-                <a16:creationId xmlns:a16="http://schemas.microsoft.com/office/drawing/2014/main" id="{FE5B11F8-9635-41F2-BA0B-CF1CE47617E6}"/>
+          <p:cNvPr id="24" name="Conector recto de flecha 23">
+            <a:extLst>
+              <a:ext uri="{FF2B5EF4-FFF2-40B4-BE49-F238E27FC236}">
+                <a16:creationId xmlns:a16="http://schemas.microsoft.com/office/drawing/2014/main" id="{85E8031D-5340-4D95-87F4-D6286DA74AB3}"/>
               </a:ext>
             </a:extLst>
           </p:cNvPr>
           <p:cNvCxnSpPr>
             <a:cxnSpLocks/>
-            <a:stCxn id="2" idx="0"/>
-            <a:endCxn id="33" idx="2"/>
+            <a:stCxn id="17" idx="1"/>
+            <a:endCxn id="15" idx="3"/>
           </p:cNvCxnSpPr>
           <p:nvPr/>
         </p:nvCxnSpPr>
         <p:spPr>
-          <a:xfrm flipH="1" flipV="1">
-            <a:off x="8964143" y="2514600"/>
-            <a:ext cx="2587" cy="609701"/>
+          <a:xfrm flipH="1">
+            <a:off x="4580613" y="1770574"/>
+            <a:ext cx="1734843" cy="1"/>
           </a:xfrm>
           <a:prstGeom prst="straightConnector1">
             <a:avLst/>
@@ -12835,7 +13101,6 @@
             <a:solidFill>
               <a:schemeClr val="bg1"/>
             </a:solidFill>
-            <a:headEnd type="triangle"/>
             <a:tailEnd type="triangle"/>
           </a:ln>
         </p:spPr>
@@ -12856,10 +13121,10 @@
       </p:cxnSp>
       <p:sp>
         <p:nvSpPr>
-          <p:cNvPr id="38" name="CuadroTexto 37">
-            <a:extLst>
-              <a:ext uri="{FF2B5EF4-FFF2-40B4-BE49-F238E27FC236}">
-                <a16:creationId xmlns:a16="http://schemas.microsoft.com/office/drawing/2014/main" id="{E593275B-18D5-4ED5-B785-2CD80B46AC8E}"/>
+          <p:cNvPr id="26" name="CuadroTexto 25">
+            <a:extLst>
+              <a:ext uri="{FF2B5EF4-FFF2-40B4-BE49-F238E27FC236}">
+                <a16:creationId xmlns:a16="http://schemas.microsoft.com/office/drawing/2014/main" id="{4575F0BB-CAC2-4D70-93A4-8FF455B10CD7}"/>
               </a:ext>
             </a:extLst>
           </p:cNvPr>
@@ -12868,46 +13133,7 @@
         </p:nvSpPr>
         <p:spPr>
           <a:xfrm>
-            <a:off x="8964141" y="2650173"/>
-            <a:ext cx="1758422" cy="338554"/>
-          </a:xfrm>
-          <a:prstGeom prst="rect">
-            <a:avLst/>
-          </a:prstGeom>
-          <a:noFill/>
-        </p:spPr>
-        <p:txBody>
-          <a:bodyPr wrap="square" rtlCol="0">
-            <a:spAutoFit/>
-          </a:bodyPr>
-          <a:lstStyle/>
-          <a:p>
-            <a:r>
-              <a:rPr lang="en-US" sz="1600" dirty="0">
-                <a:solidFill>
-                  <a:schemeClr val="bg1"/>
-                </a:solidFill>
-              </a:rPr>
-              <a:t>reads and interacts</a:t>
-            </a:r>
-          </a:p>
-        </p:txBody>
-      </p:sp>
-      <p:sp>
-        <p:nvSpPr>
-          <p:cNvPr id="39" name="CuadroTexto 38">
-            <a:extLst>
-              <a:ext uri="{FF2B5EF4-FFF2-40B4-BE49-F238E27FC236}">
-                <a16:creationId xmlns:a16="http://schemas.microsoft.com/office/drawing/2014/main" id="{E933C427-2012-4298-BAC7-CF5FE7311DE1}"/>
-              </a:ext>
-            </a:extLst>
-          </p:cNvPr>
-          <p:cNvSpPr txBox="1"/>
-          <p:nvPr/>
-        </p:nvSpPr>
-        <p:spPr>
-          <a:xfrm>
-            <a:off x="5282744" y="4434202"/>
+            <a:off x="4865976" y="1401242"/>
             <a:ext cx="1376218" cy="369332"/>
           </a:xfrm>
           <a:prstGeom prst="rect">
@@ -12927,31 +13153,69 @@
                   <a:schemeClr val="bg1"/>
                 </a:solidFill>
               </a:rPr>
-              <a:t>calls</a:t>
+              <a:t>remembers</a:t>
+            </a:r>
+          </a:p>
+        </p:txBody>
+      </p:sp>
+      <p:sp>
+        <p:nvSpPr>
+          <p:cNvPr id="27" name="CuadroTexto 26">
+            <a:extLst>
+              <a:ext uri="{FF2B5EF4-FFF2-40B4-BE49-F238E27FC236}">
+                <a16:creationId xmlns:a16="http://schemas.microsoft.com/office/drawing/2014/main" id="{21C15358-5602-4ECC-98DC-20B5066F4BFC}"/>
+              </a:ext>
+            </a:extLst>
+          </p:cNvPr>
+          <p:cNvSpPr txBox="1"/>
+          <p:nvPr/>
+        </p:nvSpPr>
+        <p:spPr>
+          <a:xfrm>
+            <a:off x="484863" y="3244334"/>
+            <a:ext cx="1376218" cy="369332"/>
+          </a:xfrm>
+          <a:prstGeom prst="rect">
+            <a:avLst/>
+          </a:prstGeom>
+          <a:noFill/>
+        </p:spPr>
+        <p:txBody>
+          <a:bodyPr wrap="square" rtlCol="0">
+            <a:spAutoFit/>
+          </a:bodyPr>
+          <a:lstStyle/>
+          <a:p>
+            <a:r>
+              <a:rPr lang="en-US" dirty="0">
+                <a:solidFill>
+                  <a:schemeClr val="bg1"/>
+                </a:solidFill>
+              </a:rPr>
+              <a:t>Usage:</a:t>
             </a:r>
           </a:p>
         </p:txBody>
       </p:sp>
       <p:cxnSp>
         <p:nvCxnSpPr>
-          <p:cNvPr id="40" name="Conector recto de flecha 39">
-            <a:extLst>
-              <a:ext uri="{FF2B5EF4-FFF2-40B4-BE49-F238E27FC236}">
-                <a16:creationId xmlns:a16="http://schemas.microsoft.com/office/drawing/2014/main" id="{65ADA00B-B061-4BC6-8BEA-533E11C25C79}"/>
+          <p:cNvPr id="28" name="Conector recto de flecha 27">
+            <a:extLst>
+              <a:ext uri="{FF2B5EF4-FFF2-40B4-BE49-F238E27FC236}">
+                <a16:creationId xmlns:a16="http://schemas.microsoft.com/office/drawing/2014/main" id="{A044E2DC-53A8-4398-92E6-2E09B55658CE}"/>
               </a:ext>
             </a:extLst>
           </p:cNvPr>
           <p:cNvCxnSpPr>
             <a:cxnSpLocks/>
-            <a:stCxn id="30" idx="3"/>
-            <a:endCxn id="2" idx="1"/>
+            <a:stCxn id="16" idx="1"/>
           </p:cNvCxnSpPr>
           <p:nvPr/>
         </p:nvCxnSpPr>
         <p:spPr>
-          <a:xfrm>
-            <a:off x="5105698" y="4803534"/>
-            <a:ext cx="1115450" cy="0"/>
+          <a:xfrm flipH="1" flipV="1">
+            <a:off x="4580614" y="2584963"/>
+            <a:ext cx="2843022" cy="2252664"/>
           </a:xfrm>
           <a:prstGeom prst="straightConnector1">
             <a:avLst/>
@@ -12978,10 +13242,49 @@
           </a:fontRef>
         </p:style>
       </p:cxnSp>
+      <p:sp>
+        <p:nvSpPr>
+          <p:cNvPr id="29" name="CuadroTexto 28">
+            <a:extLst>
+              <a:ext uri="{FF2B5EF4-FFF2-40B4-BE49-F238E27FC236}">
+                <a16:creationId xmlns:a16="http://schemas.microsoft.com/office/drawing/2014/main" id="{C5F385E5-F519-4AB5-A7BA-D080107A5515}"/>
+              </a:ext>
+            </a:extLst>
+          </p:cNvPr>
+          <p:cNvSpPr txBox="1"/>
+          <p:nvPr/>
+        </p:nvSpPr>
+        <p:spPr>
+          <a:xfrm>
+            <a:off x="5775318" y="2921168"/>
+            <a:ext cx="1628369" cy="646331"/>
+          </a:xfrm>
+          <a:prstGeom prst="rect">
+            <a:avLst/>
+          </a:prstGeom>
+          <a:noFill/>
+        </p:spPr>
+        <p:txBody>
+          <a:bodyPr wrap="square" rtlCol="0">
+            <a:spAutoFit/>
+          </a:bodyPr>
+          <a:lstStyle/>
+          <a:p>
+            <a:r>
+              <a:rPr lang="en-US" dirty="0">
+                <a:solidFill>
+                  <a:schemeClr val="bg1"/>
+                </a:solidFill>
+              </a:rPr>
+              <a:t>creates and restores</a:t>
+            </a:r>
+          </a:p>
+        </p:txBody>
+      </p:sp>
     </p:spTree>
     <p:extLst>
       <p:ext uri="{BB962C8B-B14F-4D97-AF65-F5344CB8AC3E}">
-        <p14:creationId xmlns:p14="http://schemas.microsoft.com/office/powerpoint/2010/main" val="2070501123"/>
+        <p14:creationId xmlns:p14="http://schemas.microsoft.com/office/powerpoint/2010/main" val="3966714351"/>
       </p:ext>
     </p:extLst>
   </p:cSld>
@@ -12994,14 +13297,6 @@
 <file path=ppt/slides/slide39.xml><?xml version="1.0" encoding="utf-8"?>
 <p:sld xmlns:a="http://schemas.openxmlformats.org/drawingml/2006/main" xmlns:r="http://schemas.openxmlformats.org/officeDocument/2006/relationships" xmlns:p="http://schemas.openxmlformats.org/presentationml/2006/main">
   <p:cSld>
-    <p:bg>
-      <p:bgPr>
-        <a:solidFill>
-          <a:srgbClr val="1E1E1E"/>
-        </a:solidFill>
-        <a:effectLst/>
-      </p:bgPr>
-    </p:bg>
     <p:spTree>
       <p:nvGrpSpPr>
         <p:cNvPr id="1" name=""/>
@@ -13016,323 +13311,35 @@
           <a:chExt cx="0" cy="0"/>
         </a:xfrm>
       </p:grpSpPr>
-      <p:pic>
-        <p:nvPicPr>
-          <p:cNvPr id="7" name="Imagen 6">
-            <a:extLst>
-              <a:ext uri="{FF2B5EF4-FFF2-40B4-BE49-F238E27FC236}">
-                <a16:creationId xmlns:a16="http://schemas.microsoft.com/office/drawing/2014/main" id="{2CFE6195-EA83-4C47-A03F-329D229C5AB7}"/>
-              </a:ext>
-            </a:extLst>
-          </p:cNvPr>
-          <p:cNvPicPr>
-            <a:picLocks noChangeAspect="1"/>
-          </p:cNvPicPr>
-          <p:nvPr/>
-        </p:nvPicPr>
-        <p:blipFill>
-          <a:blip r:embed="rId2"/>
-          <a:stretch>
-            <a:fillRect/>
-          </a:stretch>
-        </p:blipFill>
-        <p:spPr>
-          <a:xfrm>
-            <a:off x="207896" y="2087591"/>
-            <a:ext cx="5179886" cy="4335534"/>
-          </a:xfrm>
-          <a:prstGeom prst="rect">
-            <a:avLst/>
-          </a:prstGeom>
-          <a:effectLst>
-            <a:glow rad="25400">
-              <a:schemeClr val="bg1">
-                <a:alpha val="40000"/>
-              </a:schemeClr>
-            </a:glow>
-          </a:effectLst>
-        </p:spPr>
-      </p:pic>
-      <p:pic>
-        <p:nvPicPr>
-          <p:cNvPr id="11" name="Imagen 10">
-            <a:extLst>
-              <a:ext uri="{FF2B5EF4-FFF2-40B4-BE49-F238E27FC236}">
-                <a16:creationId xmlns:a16="http://schemas.microsoft.com/office/drawing/2014/main" id="{FACE3969-615E-4C45-B56D-19518D2A9CE0}"/>
-              </a:ext>
-            </a:extLst>
-          </p:cNvPr>
-          <p:cNvPicPr>
-            <a:picLocks noChangeAspect="1"/>
-          </p:cNvPicPr>
-          <p:nvPr/>
-        </p:nvPicPr>
-        <p:blipFill>
-          <a:blip r:embed="rId3"/>
-          <a:stretch>
-            <a:fillRect/>
-          </a:stretch>
-        </p:blipFill>
-        <p:spPr>
-          <a:xfrm>
-            <a:off x="6151615" y="1849550"/>
-            <a:ext cx="5830965" cy="4823295"/>
-          </a:xfrm>
-          <a:prstGeom prst="rect">
-            <a:avLst/>
-          </a:prstGeom>
-          <a:effectLst>
-            <a:glow rad="25400">
-              <a:schemeClr val="bg1">
-                <a:alpha val="40000"/>
-              </a:schemeClr>
-            </a:glow>
-          </a:effectLst>
-        </p:spPr>
-      </p:pic>
-      <p:pic>
-        <p:nvPicPr>
-          <p:cNvPr id="13" name="Imagen 12">
-            <a:extLst>
-              <a:ext uri="{FF2B5EF4-FFF2-40B4-BE49-F238E27FC236}">
-                <a16:creationId xmlns:a16="http://schemas.microsoft.com/office/drawing/2014/main" id="{DB69B325-2AFF-4143-A6CE-6A622ECFDFA2}"/>
-              </a:ext>
-            </a:extLst>
-          </p:cNvPr>
-          <p:cNvPicPr>
-            <a:picLocks noChangeAspect="1"/>
-          </p:cNvPicPr>
-          <p:nvPr/>
-        </p:nvPicPr>
-        <p:blipFill>
-          <a:blip r:embed="rId4"/>
-          <a:stretch>
-            <a:fillRect/>
-          </a:stretch>
-        </p:blipFill>
-        <p:spPr>
-          <a:xfrm>
-            <a:off x="6267604" y="433524"/>
-            <a:ext cx="5598986" cy="664286"/>
-          </a:xfrm>
-          <a:prstGeom prst="rect">
-            <a:avLst/>
-          </a:prstGeom>
-          <a:effectLst>
-            <a:glow rad="25400">
-              <a:schemeClr val="bg1">
-                <a:alpha val="40000"/>
-              </a:schemeClr>
-            </a:glow>
-          </a:effectLst>
-        </p:spPr>
-      </p:pic>
-      <p:sp>
-        <p:nvSpPr>
-          <p:cNvPr id="25" name="CuadroTexto 24">
-            <a:extLst>
-              <a:ext uri="{FF2B5EF4-FFF2-40B4-BE49-F238E27FC236}">
-                <a16:creationId xmlns:a16="http://schemas.microsoft.com/office/drawing/2014/main" id="{19C6170D-CFD8-49E4-816C-97EDFBA2B700}"/>
-              </a:ext>
-            </a:extLst>
-          </p:cNvPr>
-          <p:cNvSpPr txBox="1"/>
-          <p:nvPr/>
-        </p:nvSpPr>
-        <p:spPr>
-          <a:xfrm>
-            <a:off x="5407891" y="3891865"/>
-            <a:ext cx="1376218" cy="369332"/>
-          </a:xfrm>
-          <a:prstGeom prst="rect">
-            <a:avLst/>
-          </a:prstGeom>
-          <a:noFill/>
-        </p:spPr>
-        <p:txBody>
-          <a:bodyPr wrap="square" rtlCol="0">
-            <a:spAutoFit/>
-          </a:bodyPr>
+      <p:sp>
+        <p:nvSpPr>
+          <p:cNvPr id="2" name="Título 1">
+            <a:extLst>
+              <a:ext uri="{FF2B5EF4-FFF2-40B4-BE49-F238E27FC236}">
+                <a16:creationId xmlns:a16="http://schemas.microsoft.com/office/drawing/2014/main" id="{73A2909B-13B3-4614-9321-16AF10F4286A}"/>
+              </a:ext>
+            </a:extLst>
+          </p:cNvPr>
+          <p:cNvSpPr>
+            <a:spLocks noGrp="1"/>
+          </p:cNvSpPr>
+          <p:nvPr>
+            <p:ph type="title"/>
+          </p:nvPr>
+        </p:nvSpPr>
+        <p:spPr>
+          <a:xfrm>
+            <a:off x="838200" y="2103437"/>
+            <a:ext cx="10515600" cy="1325563"/>
+          </a:xfrm>
+        </p:spPr>
+        <p:txBody>
+          <a:bodyPr/>
           <a:lstStyle/>
           <a:p>
             <a:r>
-              <a:rPr lang="en-US" dirty="0">
-                <a:solidFill>
-                  <a:schemeClr val="bg1"/>
-                </a:solidFill>
-              </a:rPr>
-              <a:t>calls</a:t>
-            </a:r>
-          </a:p>
-        </p:txBody>
-      </p:sp>
-      <p:cxnSp>
-        <p:nvCxnSpPr>
-          <p:cNvPr id="26" name="Conector recto de flecha 25">
-            <a:extLst>
-              <a:ext uri="{FF2B5EF4-FFF2-40B4-BE49-F238E27FC236}">
-                <a16:creationId xmlns:a16="http://schemas.microsoft.com/office/drawing/2014/main" id="{76AE51E0-8D6F-4932-8634-0B5B6F4E744C}"/>
-              </a:ext>
-            </a:extLst>
-          </p:cNvPr>
-          <p:cNvCxnSpPr>
-            <a:cxnSpLocks/>
-            <a:stCxn id="7" idx="3"/>
-            <a:endCxn id="11" idx="1"/>
-          </p:cNvCxnSpPr>
-          <p:nvPr/>
-        </p:nvCxnSpPr>
-        <p:spPr>
-          <a:xfrm>
-            <a:off x="5387782" y="4255358"/>
-            <a:ext cx="763833" cy="5840"/>
-          </a:xfrm>
-          <a:prstGeom prst="straightConnector1">
-            <a:avLst/>
-          </a:prstGeom>
-          <a:ln w="12700">
-            <a:solidFill>
-              <a:schemeClr val="bg1"/>
-            </a:solidFill>
-            <a:tailEnd type="triangle"/>
-          </a:ln>
-        </p:spPr>
-        <p:style>
-          <a:lnRef idx="1">
-            <a:schemeClr val="accent1"/>
-          </a:lnRef>
-          <a:fillRef idx="0">
-            <a:schemeClr val="accent1"/>
-          </a:fillRef>
-          <a:effectRef idx="0">
-            <a:schemeClr val="accent1"/>
-          </a:effectRef>
-          <a:fontRef idx="minor">
-            <a:schemeClr val="tx1"/>
-          </a:fontRef>
-        </p:style>
-      </p:cxnSp>
-      <p:cxnSp>
-        <p:nvCxnSpPr>
-          <p:cNvPr id="29" name="Conector recto de flecha 28">
-            <a:extLst>
-              <a:ext uri="{FF2B5EF4-FFF2-40B4-BE49-F238E27FC236}">
-                <a16:creationId xmlns:a16="http://schemas.microsoft.com/office/drawing/2014/main" id="{03CB87ED-D98B-4404-8865-52F51E0F0D1A}"/>
-              </a:ext>
-            </a:extLst>
-          </p:cNvPr>
-          <p:cNvCxnSpPr>
-            <a:cxnSpLocks/>
-            <a:stCxn id="11" idx="0"/>
-            <a:endCxn id="13" idx="2"/>
-          </p:cNvCxnSpPr>
-          <p:nvPr/>
-        </p:nvCxnSpPr>
-        <p:spPr>
-          <a:xfrm flipH="1" flipV="1">
-            <a:off x="9067097" y="1097810"/>
-            <a:ext cx="1" cy="751740"/>
-          </a:xfrm>
-          <a:prstGeom prst="straightConnector1">
-            <a:avLst/>
-          </a:prstGeom>
-          <a:ln w="12700">
-            <a:solidFill>
-              <a:schemeClr val="bg1"/>
-            </a:solidFill>
-            <a:headEnd type="triangle"/>
-            <a:tailEnd type="triangle"/>
-          </a:ln>
-        </p:spPr>
-        <p:style>
-          <a:lnRef idx="1">
-            <a:schemeClr val="accent1"/>
-          </a:lnRef>
-          <a:fillRef idx="0">
-            <a:schemeClr val="accent1"/>
-          </a:fillRef>
-          <a:effectRef idx="0">
-            <a:schemeClr val="accent1"/>
-          </a:effectRef>
-          <a:fontRef idx="minor">
-            <a:schemeClr val="tx1"/>
-          </a:fontRef>
-        </p:style>
-      </p:cxnSp>
-      <p:sp>
-        <p:nvSpPr>
-          <p:cNvPr id="30" name="CuadroTexto 29">
-            <a:extLst>
-              <a:ext uri="{FF2B5EF4-FFF2-40B4-BE49-F238E27FC236}">
-                <a16:creationId xmlns:a16="http://schemas.microsoft.com/office/drawing/2014/main" id="{97B5AC85-396E-4BE9-9E35-EC6CFF814F96}"/>
-              </a:ext>
-            </a:extLst>
-          </p:cNvPr>
-          <p:cNvSpPr txBox="1"/>
-          <p:nvPr/>
-        </p:nvSpPr>
-        <p:spPr>
-          <a:xfrm>
-            <a:off x="9067097" y="1304403"/>
-            <a:ext cx="1758422" cy="338554"/>
-          </a:xfrm>
-          <a:prstGeom prst="rect">
-            <a:avLst/>
-          </a:prstGeom>
-          <a:noFill/>
-        </p:spPr>
-        <p:txBody>
-          <a:bodyPr wrap="square" rtlCol="0">
-            <a:spAutoFit/>
-          </a:bodyPr>
-          <a:lstStyle/>
-          <a:p>
-            <a:r>
-              <a:rPr lang="en-US" sz="1600" dirty="0">
-                <a:solidFill>
-                  <a:schemeClr val="bg1"/>
-                </a:solidFill>
-              </a:rPr>
-              <a:t>reads and interacts</a:t>
-            </a:r>
-          </a:p>
-        </p:txBody>
-      </p:sp>
-      <p:sp>
-        <p:nvSpPr>
-          <p:cNvPr id="36" name="CuadroTexto 35">
-            <a:extLst>
-              <a:ext uri="{FF2B5EF4-FFF2-40B4-BE49-F238E27FC236}">
-                <a16:creationId xmlns:a16="http://schemas.microsoft.com/office/drawing/2014/main" id="{8D5F8848-69CC-474A-8B0C-8685958FFF9D}"/>
-              </a:ext>
-            </a:extLst>
-          </p:cNvPr>
-          <p:cNvSpPr txBox="1"/>
-          <p:nvPr/>
-        </p:nvSpPr>
-        <p:spPr>
-          <a:xfrm>
-            <a:off x="361700" y="215130"/>
-            <a:ext cx="3397994" cy="646331"/>
-          </a:xfrm>
-          <a:prstGeom prst="rect">
-            <a:avLst/>
-          </a:prstGeom>
-          <a:noFill/>
-        </p:spPr>
-        <p:txBody>
-          <a:bodyPr wrap="square" rtlCol="0">
-            <a:spAutoFit/>
-          </a:bodyPr>
-          <a:lstStyle/>
-          <a:p>
-            <a:r>
-              <a:rPr lang="en-US" sz="3600" dirty="0">
-                <a:solidFill>
-                  <a:srgbClr val="53A2D3"/>
-                </a:solidFill>
-              </a:rPr>
-              <a:t>Mundo real</a:t>
+              <a:rPr lang="en-US" dirty="0"/>
+              <a:t>UI Patterns</a:t>
             </a:r>
           </a:p>
         </p:txBody>
@@ -13340,7 +13347,7 @@
     </p:spTree>
     <p:extLst>
       <p:ext uri="{BB962C8B-B14F-4D97-AF65-F5344CB8AC3E}">
-        <p14:creationId xmlns:p14="http://schemas.microsoft.com/office/powerpoint/2010/main" val="181309968"/>
+        <p14:creationId xmlns:p14="http://schemas.microsoft.com/office/powerpoint/2010/main" val="2266296736"/>
       </p:ext>
     </p:extLst>
   </p:cSld>
@@ -13707,6 +13714,1817 @@
 </file>
 
 <file path=ppt/slides/slide40.xml><?xml version="1.0" encoding="utf-8"?>
+<p:sld xmlns:a="http://schemas.openxmlformats.org/drawingml/2006/main" xmlns:r="http://schemas.openxmlformats.org/officeDocument/2006/relationships" xmlns:p="http://schemas.openxmlformats.org/presentationml/2006/main">
+  <p:cSld>
+    <p:spTree>
+      <p:nvGrpSpPr>
+        <p:cNvPr id="1" name=""/>
+        <p:cNvGrpSpPr/>
+        <p:nvPr/>
+      </p:nvGrpSpPr>
+      <p:grpSpPr>
+        <a:xfrm>
+          <a:off x="0" y="0"/>
+          <a:ext cx="0" cy="0"/>
+          <a:chOff x="0" y="0"/>
+          <a:chExt cx="0" cy="0"/>
+        </a:xfrm>
+      </p:grpSpPr>
+      <p:sp>
+        <p:nvSpPr>
+          <p:cNvPr id="2" name="Título 1">
+            <a:extLst>
+              <a:ext uri="{FF2B5EF4-FFF2-40B4-BE49-F238E27FC236}">
+                <a16:creationId xmlns:a16="http://schemas.microsoft.com/office/drawing/2014/main" id="{51E579E3-4D4D-4391-A4DB-77F6C6DD84BE}"/>
+              </a:ext>
+            </a:extLst>
+          </p:cNvPr>
+          <p:cNvSpPr>
+            <a:spLocks noGrp="1"/>
+          </p:cNvSpPr>
+          <p:nvPr>
+            <p:ph type="title"/>
+          </p:nvPr>
+        </p:nvSpPr>
+        <p:spPr>
+          <a:xfrm>
+            <a:off x="900344" y="2766218"/>
+            <a:ext cx="10515600" cy="1325563"/>
+          </a:xfrm>
+        </p:spPr>
+        <p:txBody>
+          <a:bodyPr/>
+          <a:lstStyle/>
+          <a:p>
+            <a:r>
+              <a:rPr lang="es-ES" dirty="0" err="1">
+                <a:solidFill>
+                  <a:srgbClr val="000000"/>
+                </a:solidFill>
+                <a:latin typeface="Calibri" panose="020F0502020204030204" pitchFamily="34" charset="0"/>
+              </a:rPr>
+              <a:t>Model</a:t>
+            </a:r>
+            <a:r>
+              <a:rPr lang="es-ES" dirty="0">
+                <a:solidFill>
+                  <a:srgbClr val="000000"/>
+                </a:solidFill>
+                <a:latin typeface="Calibri" panose="020F0502020204030204" pitchFamily="34" charset="0"/>
+              </a:rPr>
+              <a:t> View </a:t>
+            </a:r>
+            <a:r>
+              <a:rPr lang="es-ES" dirty="0" err="1">
+                <a:solidFill>
+                  <a:srgbClr val="000000"/>
+                </a:solidFill>
+                <a:latin typeface="Calibri" panose="020F0502020204030204" pitchFamily="34" charset="0"/>
+              </a:rPr>
+              <a:t>ViewModel</a:t>
+            </a:r>
+            <a:r>
+              <a:rPr lang="es-ES" dirty="0">
+                <a:solidFill>
+                  <a:srgbClr val="000000"/>
+                </a:solidFill>
+                <a:latin typeface="Calibri" panose="020F0502020204030204" pitchFamily="34" charset="0"/>
+              </a:rPr>
+              <a:t> (MVVM) </a:t>
+            </a:r>
+            <a:r>
+              <a:rPr lang="es-ES" dirty="0" err="1">
+                <a:solidFill>
+                  <a:srgbClr val="000000"/>
+                </a:solidFill>
+                <a:latin typeface="Calibri" panose="020F0502020204030204" pitchFamily="34" charset="0"/>
+              </a:rPr>
+              <a:t>pattern</a:t>
+            </a:r>
+            <a:endParaRPr lang="en-US" dirty="0"/>
+          </a:p>
+        </p:txBody>
+      </p:sp>
+    </p:spTree>
+    <p:extLst>
+      <p:ext uri="{BB962C8B-B14F-4D97-AF65-F5344CB8AC3E}">
+        <p14:creationId xmlns:p14="http://schemas.microsoft.com/office/powerpoint/2010/main" val="478699278"/>
+      </p:ext>
+    </p:extLst>
+  </p:cSld>
+  <p:clrMapOvr>
+    <a:masterClrMapping/>
+  </p:clrMapOvr>
+</p:sld>
+</file>
+
+<file path=ppt/slides/slide41.xml><?xml version="1.0" encoding="utf-8"?>
+<p:sld xmlns:a="http://schemas.openxmlformats.org/drawingml/2006/main" xmlns:r="http://schemas.openxmlformats.org/officeDocument/2006/relationships" xmlns:p="http://schemas.openxmlformats.org/presentationml/2006/main">
+  <p:cSld>
+    <p:bg>
+      <p:bgPr>
+        <a:solidFill>
+          <a:srgbClr val="1E1E1E"/>
+        </a:solidFill>
+        <a:effectLst/>
+      </p:bgPr>
+    </p:bg>
+    <p:spTree>
+      <p:nvGrpSpPr>
+        <p:cNvPr id="1" name=""/>
+        <p:cNvGrpSpPr/>
+        <p:nvPr/>
+      </p:nvGrpSpPr>
+      <p:grpSpPr>
+        <a:xfrm>
+          <a:off x="0" y="0"/>
+          <a:ext cx="0" cy="0"/>
+          <a:chOff x="0" y="0"/>
+          <a:chExt cx="0" cy="0"/>
+        </a:xfrm>
+      </p:grpSpPr>
+      <p:sp>
+        <p:nvSpPr>
+          <p:cNvPr id="31" name="CuadroTexto 30">
+            <a:extLst>
+              <a:ext uri="{FF2B5EF4-FFF2-40B4-BE49-F238E27FC236}">
+                <a16:creationId xmlns:a16="http://schemas.microsoft.com/office/drawing/2014/main" id="{FBF7026D-12F4-4541-8110-DE706094717A}"/>
+              </a:ext>
+            </a:extLst>
+          </p:cNvPr>
+          <p:cNvSpPr txBox="1"/>
+          <p:nvPr/>
+        </p:nvSpPr>
+        <p:spPr>
+          <a:xfrm>
+            <a:off x="484863" y="185392"/>
+            <a:ext cx="3397994" cy="646331"/>
+          </a:xfrm>
+          <a:prstGeom prst="rect">
+            <a:avLst/>
+          </a:prstGeom>
+          <a:noFill/>
+        </p:spPr>
+        <p:txBody>
+          <a:bodyPr wrap="square" rtlCol="0">
+            <a:spAutoFit/>
+          </a:bodyPr>
+          <a:lstStyle/>
+          <a:p>
+            <a:r>
+              <a:rPr lang="en-US" sz="3600" dirty="0" err="1">
+                <a:solidFill>
+                  <a:srgbClr val="53A2D3"/>
+                </a:solidFill>
+              </a:rPr>
+              <a:t>Teoría</a:t>
+            </a:r>
+            <a:endParaRPr lang="en-US" sz="3600" dirty="0">
+              <a:solidFill>
+                <a:srgbClr val="53A2D3"/>
+              </a:solidFill>
+            </a:endParaRPr>
+          </a:p>
+        </p:txBody>
+      </p:sp>
+      <p:pic>
+        <p:nvPicPr>
+          <p:cNvPr id="19" name="Imagen 18">
+            <a:extLst>
+              <a:ext uri="{FF2B5EF4-FFF2-40B4-BE49-F238E27FC236}">
+                <a16:creationId xmlns:a16="http://schemas.microsoft.com/office/drawing/2014/main" id="{AD0CDA8F-35A5-48B4-9D35-466C095B6E83}"/>
+              </a:ext>
+            </a:extLst>
+          </p:cNvPr>
+          <p:cNvPicPr>
+            <a:picLocks noChangeAspect="1"/>
+          </p:cNvPicPr>
+          <p:nvPr/>
+        </p:nvPicPr>
+        <p:blipFill>
+          <a:blip r:embed="rId2"/>
+          <a:stretch>
+            <a:fillRect/>
+          </a:stretch>
+        </p:blipFill>
+        <p:spPr>
+          <a:xfrm>
+            <a:off x="2464109" y="3141771"/>
+            <a:ext cx="6286500" cy="3343275"/>
+          </a:xfrm>
+          <a:prstGeom prst="rect">
+            <a:avLst/>
+          </a:prstGeom>
+          <a:effectLst>
+            <a:glow rad="25400">
+              <a:schemeClr val="bg1">
+                <a:alpha val="40000"/>
+              </a:schemeClr>
+            </a:glow>
+          </a:effectLst>
+        </p:spPr>
+      </p:pic>
+      <p:pic>
+        <p:nvPicPr>
+          <p:cNvPr id="20" name="Imagen 19">
+            <a:extLst>
+              <a:ext uri="{FF2B5EF4-FFF2-40B4-BE49-F238E27FC236}">
+                <a16:creationId xmlns:a16="http://schemas.microsoft.com/office/drawing/2014/main" id="{0CB9DBB1-A444-47E7-8C56-084B56BC9929}"/>
+              </a:ext>
+            </a:extLst>
+          </p:cNvPr>
+          <p:cNvPicPr>
+            <a:picLocks noChangeAspect="1"/>
+          </p:cNvPicPr>
+          <p:nvPr/>
+        </p:nvPicPr>
+        <p:blipFill>
+          <a:blip r:embed="rId3"/>
+          <a:stretch>
+            <a:fillRect/>
+          </a:stretch>
+        </p:blipFill>
+        <p:spPr>
+          <a:xfrm>
+            <a:off x="1170789" y="1365448"/>
+            <a:ext cx="2019300" cy="1219200"/>
+          </a:xfrm>
+          <a:prstGeom prst="rect">
+            <a:avLst/>
+          </a:prstGeom>
+          <a:effectLst>
+            <a:glow rad="25400">
+              <a:schemeClr val="bg1">
+                <a:alpha val="40000"/>
+              </a:schemeClr>
+            </a:glow>
+          </a:effectLst>
+        </p:spPr>
+      </p:pic>
+      <p:cxnSp>
+        <p:nvCxnSpPr>
+          <p:cNvPr id="21" name="Conector recto de flecha 20">
+            <a:extLst>
+              <a:ext uri="{FF2B5EF4-FFF2-40B4-BE49-F238E27FC236}">
+                <a16:creationId xmlns:a16="http://schemas.microsoft.com/office/drawing/2014/main" id="{6081FD7E-32DF-4951-9784-B2FFCABB9DBB}"/>
+              </a:ext>
+            </a:extLst>
+          </p:cNvPr>
+          <p:cNvCxnSpPr>
+            <a:cxnSpLocks/>
+            <a:stCxn id="19" idx="0"/>
+            <a:endCxn id="20" idx="3"/>
+          </p:cNvCxnSpPr>
+          <p:nvPr/>
+        </p:nvCxnSpPr>
+        <p:spPr>
+          <a:xfrm flipH="1" flipV="1">
+            <a:off x="3190089" y="1975048"/>
+            <a:ext cx="2417270" cy="1166723"/>
+          </a:xfrm>
+          <a:prstGeom prst="straightConnector1">
+            <a:avLst/>
+          </a:prstGeom>
+          <a:ln w="12700">
+            <a:solidFill>
+              <a:schemeClr val="bg1"/>
+            </a:solidFill>
+            <a:tailEnd type="triangle"/>
+          </a:ln>
+        </p:spPr>
+        <p:style>
+          <a:lnRef idx="1">
+            <a:schemeClr val="accent1"/>
+          </a:lnRef>
+          <a:fillRef idx="0">
+            <a:schemeClr val="accent1"/>
+          </a:fillRef>
+          <a:effectRef idx="0">
+            <a:schemeClr val="accent1"/>
+          </a:effectRef>
+          <a:fontRef idx="minor">
+            <a:schemeClr val="tx1"/>
+          </a:fontRef>
+        </p:style>
+      </p:cxnSp>
+      <p:sp>
+        <p:nvSpPr>
+          <p:cNvPr id="22" name="CuadroTexto 21">
+            <a:extLst>
+              <a:ext uri="{FF2B5EF4-FFF2-40B4-BE49-F238E27FC236}">
+                <a16:creationId xmlns:a16="http://schemas.microsoft.com/office/drawing/2014/main" id="{C441E18B-5085-4218-841B-6CBDE9D09AA2}"/>
+              </a:ext>
+            </a:extLst>
+          </p:cNvPr>
+          <p:cNvSpPr txBox="1"/>
+          <p:nvPr/>
+        </p:nvSpPr>
+        <p:spPr>
+          <a:xfrm rot="1518848">
+            <a:off x="3913144" y="2251538"/>
+            <a:ext cx="1376218" cy="369332"/>
+          </a:xfrm>
+          <a:prstGeom prst="rect">
+            <a:avLst/>
+          </a:prstGeom>
+          <a:noFill/>
+        </p:spPr>
+        <p:txBody>
+          <a:bodyPr wrap="square" rtlCol="0">
+            <a:spAutoFit/>
+          </a:bodyPr>
+          <a:lstStyle/>
+          <a:p>
+            <a:r>
+              <a:rPr lang="en-US" dirty="0">
+                <a:solidFill>
+                  <a:schemeClr val="bg1"/>
+                </a:solidFill>
+              </a:rPr>
+              <a:t>contains</a:t>
+            </a:r>
+          </a:p>
+        </p:txBody>
+      </p:sp>
+      <p:cxnSp>
+        <p:nvCxnSpPr>
+          <p:cNvPr id="23" name="Conector recto de flecha 22">
+            <a:extLst>
+              <a:ext uri="{FF2B5EF4-FFF2-40B4-BE49-F238E27FC236}">
+                <a16:creationId xmlns:a16="http://schemas.microsoft.com/office/drawing/2014/main" id="{574D6455-8697-43A6-AD09-A3DEB8692CB8}"/>
+              </a:ext>
+            </a:extLst>
+          </p:cNvPr>
+          <p:cNvCxnSpPr>
+            <a:cxnSpLocks/>
+          </p:cNvCxnSpPr>
+          <p:nvPr/>
+        </p:nvCxnSpPr>
+        <p:spPr>
+          <a:xfrm flipV="1">
+            <a:off x="7123569" y="1975049"/>
+            <a:ext cx="1878344" cy="1166723"/>
+          </a:xfrm>
+          <a:prstGeom prst="straightConnector1">
+            <a:avLst/>
+          </a:prstGeom>
+          <a:ln w="12700">
+            <a:solidFill>
+              <a:schemeClr val="bg1"/>
+            </a:solidFill>
+            <a:headEnd type="none"/>
+            <a:tailEnd type="triangle"/>
+          </a:ln>
+        </p:spPr>
+        <p:style>
+          <a:lnRef idx="1">
+            <a:schemeClr val="accent1"/>
+          </a:lnRef>
+          <a:fillRef idx="0">
+            <a:schemeClr val="accent1"/>
+          </a:fillRef>
+          <a:effectRef idx="0">
+            <a:schemeClr val="accent1"/>
+          </a:effectRef>
+          <a:fontRef idx="minor">
+            <a:schemeClr val="tx1"/>
+          </a:fontRef>
+        </p:style>
+      </p:cxnSp>
+      <p:sp>
+        <p:nvSpPr>
+          <p:cNvPr id="25" name="CuadroTexto 24">
+            <a:extLst>
+              <a:ext uri="{FF2B5EF4-FFF2-40B4-BE49-F238E27FC236}">
+                <a16:creationId xmlns:a16="http://schemas.microsoft.com/office/drawing/2014/main" id="{02F6BD05-4155-4839-8166-B0525AEC5FB7}"/>
+              </a:ext>
+            </a:extLst>
+          </p:cNvPr>
+          <p:cNvSpPr txBox="1"/>
+          <p:nvPr/>
+        </p:nvSpPr>
+        <p:spPr>
+          <a:xfrm rot="19684380">
+            <a:off x="7321205" y="2156818"/>
+            <a:ext cx="1376218" cy="369332"/>
+          </a:xfrm>
+          <a:prstGeom prst="rect">
+            <a:avLst/>
+          </a:prstGeom>
+          <a:noFill/>
+        </p:spPr>
+        <p:txBody>
+          <a:bodyPr wrap="square" rtlCol="0">
+            <a:spAutoFit/>
+          </a:bodyPr>
+          <a:lstStyle/>
+          <a:p>
+            <a:r>
+              <a:rPr lang="en-US" dirty="0">
+                <a:solidFill>
+                  <a:schemeClr val="bg1"/>
+                </a:solidFill>
+              </a:rPr>
+              <a:t>shows</a:t>
+            </a:r>
+          </a:p>
+        </p:txBody>
+      </p:sp>
+      <p:cxnSp>
+        <p:nvCxnSpPr>
+          <p:cNvPr id="26" name="Conector recto de flecha 25">
+            <a:extLst>
+              <a:ext uri="{FF2B5EF4-FFF2-40B4-BE49-F238E27FC236}">
+                <a16:creationId xmlns:a16="http://schemas.microsoft.com/office/drawing/2014/main" id="{EAF687F8-0C6A-4F5F-8D35-524D606EF8AA}"/>
+              </a:ext>
+            </a:extLst>
+          </p:cNvPr>
+          <p:cNvCxnSpPr>
+            <a:cxnSpLocks/>
+          </p:cNvCxnSpPr>
+          <p:nvPr/>
+        </p:nvCxnSpPr>
+        <p:spPr>
+          <a:xfrm flipV="1">
+            <a:off x="8009314" y="1944088"/>
+            <a:ext cx="1803404" cy="1162436"/>
+          </a:xfrm>
+          <a:prstGeom prst="straightConnector1">
+            <a:avLst/>
+          </a:prstGeom>
+          <a:ln w="12700">
+            <a:solidFill>
+              <a:schemeClr val="bg1"/>
+            </a:solidFill>
+            <a:headEnd type="triangle"/>
+            <a:tailEnd type="none"/>
+          </a:ln>
+        </p:spPr>
+        <p:style>
+          <a:lnRef idx="1">
+            <a:schemeClr val="accent1"/>
+          </a:lnRef>
+          <a:fillRef idx="0">
+            <a:schemeClr val="accent1"/>
+          </a:fillRef>
+          <a:effectRef idx="0">
+            <a:schemeClr val="accent1"/>
+          </a:effectRef>
+          <a:fontRef idx="minor">
+            <a:schemeClr val="tx1"/>
+          </a:fontRef>
+        </p:style>
+      </p:cxnSp>
+      <p:sp>
+        <p:nvSpPr>
+          <p:cNvPr id="30" name="CuadroTexto 29">
+            <a:extLst>
+              <a:ext uri="{FF2B5EF4-FFF2-40B4-BE49-F238E27FC236}">
+                <a16:creationId xmlns:a16="http://schemas.microsoft.com/office/drawing/2014/main" id="{1A6D4CFD-9757-4884-8C01-C19D63E26B51}"/>
+              </a:ext>
+            </a:extLst>
+          </p:cNvPr>
+          <p:cNvSpPr txBox="1"/>
+          <p:nvPr/>
+        </p:nvSpPr>
+        <p:spPr>
+          <a:xfrm rot="19684380">
+            <a:off x="8602317" y="2280255"/>
+            <a:ext cx="1376218" cy="369332"/>
+          </a:xfrm>
+          <a:prstGeom prst="rect">
+            <a:avLst/>
+          </a:prstGeom>
+          <a:noFill/>
+        </p:spPr>
+        <p:txBody>
+          <a:bodyPr wrap="square" rtlCol="0">
+            <a:spAutoFit/>
+          </a:bodyPr>
+          <a:lstStyle/>
+          <a:p>
+            <a:r>
+              <a:rPr lang="en-US" dirty="0">
+                <a:solidFill>
+                  <a:schemeClr val="bg1"/>
+                </a:solidFill>
+              </a:rPr>
+              <a:t>calls</a:t>
+            </a:r>
+          </a:p>
+        </p:txBody>
+      </p:sp>
+      <p:pic>
+        <p:nvPicPr>
+          <p:cNvPr id="4" name="Imagen 3">
+            <a:extLst>
+              <a:ext uri="{FF2B5EF4-FFF2-40B4-BE49-F238E27FC236}">
+                <a16:creationId xmlns:a16="http://schemas.microsoft.com/office/drawing/2014/main" id="{9BF0D330-2B6A-4399-AD67-B9065E442DE6}"/>
+              </a:ext>
+            </a:extLst>
+          </p:cNvPr>
+          <p:cNvPicPr>
+            <a:picLocks noChangeAspect="1"/>
+          </p:cNvPicPr>
+          <p:nvPr/>
+        </p:nvPicPr>
+        <p:blipFill>
+          <a:blip r:embed="rId4"/>
+          <a:stretch>
+            <a:fillRect/>
+          </a:stretch>
+        </p:blipFill>
+        <p:spPr>
+          <a:xfrm>
+            <a:off x="7357891" y="1201138"/>
+            <a:ext cx="3971925" cy="742950"/>
+          </a:xfrm>
+          <a:prstGeom prst="rect">
+            <a:avLst/>
+          </a:prstGeom>
+          <a:effectLst>
+            <a:glow rad="25400">
+              <a:schemeClr val="bg1">
+                <a:alpha val="40000"/>
+              </a:schemeClr>
+            </a:glow>
+          </a:effectLst>
+        </p:spPr>
+      </p:pic>
+    </p:spTree>
+    <p:extLst>
+      <p:ext uri="{BB962C8B-B14F-4D97-AF65-F5344CB8AC3E}">
+        <p14:creationId xmlns:p14="http://schemas.microsoft.com/office/powerpoint/2010/main" val="4248247360"/>
+      </p:ext>
+    </p:extLst>
+  </p:cSld>
+  <p:clrMapOvr>
+    <a:masterClrMapping/>
+  </p:clrMapOvr>
+</p:sld>
+</file>
+
+<file path=ppt/slides/slide42.xml><?xml version="1.0" encoding="utf-8"?>
+<p:sld xmlns:a="http://schemas.openxmlformats.org/drawingml/2006/main" xmlns:r="http://schemas.openxmlformats.org/officeDocument/2006/relationships" xmlns:p="http://schemas.openxmlformats.org/presentationml/2006/main">
+  <p:cSld>
+    <p:bg>
+      <p:bgPr>
+        <a:solidFill>
+          <a:srgbClr val="1E1E1E"/>
+        </a:solidFill>
+        <a:effectLst/>
+      </p:bgPr>
+    </p:bg>
+    <p:spTree>
+      <p:nvGrpSpPr>
+        <p:cNvPr id="1" name=""/>
+        <p:cNvGrpSpPr/>
+        <p:nvPr/>
+      </p:nvGrpSpPr>
+      <p:grpSpPr>
+        <a:xfrm>
+          <a:off x="0" y="0"/>
+          <a:ext cx="0" cy="0"/>
+          <a:chOff x="0" y="0"/>
+          <a:chExt cx="0" cy="0"/>
+        </a:xfrm>
+      </p:grpSpPr>
+      <p:sp>
+        <p:nvSpPr>
+          <p:cNvPr id="22" name="CuadroTexto 21">
+            <a:extLst>
+              <a:ext uri="{FF2B5EF4-FFF2-40B4-BE49-F238E27FC236}">
+                <a16:creationId xmlns:a16="http://schemas.microsoft.com/office/drawing/2014/main" id="{C9B1F5C4-0BBA-41F3-84BD-1322F509FDEF}"/>
+              </a:ext>
+            </a:extLst>
+          </p:cNvPr>
+          <p:cNvSpPr txBox="1"/>
+          <p:nvPr/>
+        </p:nvSpPr>
+        <p:spPr>
+          <a:xfrm>
+            <a:off x="361700" y="215130"/>
+            <a:ext cx="3397994" cy="646331"/>
+          </a:xfrm>
+          <a:prstGeom prst="rect">
+            <a:avLst/>
+          </a:prstGeom>
+          <a:noFill/>
+        </p:spPr>
+        <p:txBody>
+          <a:bodyPr wrap="square" rtlCol="0">
+            <a:spAutoFit/>
+          </a:bodyPr>
+          <a:lstStyle/>
+          <a:p>
+            <a:r>
+              <a:rPr lang="en-US" sz="3600" dirty="0">
+                <a:solidFill>
+                  <a:srgbClr val="53A2D3"/>
+                </a:solidFill>
+              </a:rPr>
+              <a:t>Mundo real</a:t>
+            </a:r>
+          </a:p>
+        </p:txBody>
+      </p:sp>
+      <p:cxnSp>
+        <p:nvCxnSpPr>
+          <p:cNvPr id="13" name="Conector recto de flecha 12">
+            <a:extLst>
+              <a:ext uri="{FF2B5EF4-FFF2-40B4-BE49-F238E27FC236}">
+                <a16:creationId xmlns:a16="http://schemas.microsoft.com/office/drawing/2014/main" id="{3FEF1901-0773-4F55-AA20-B58A56F18BD1}"/>
+              </a:ext>
+            </a:extLst>
+          </p:cNvPr>
+          <p:cNvCxnSpPr>
+            <a:cxnSpLocks/>
+            <a:stCxn id="10" idx="1"/>
+            <a:endCxn id="8" idx="3"/>
+          </p:cNvCxnSpPr>
+          <p:nvPr/>
+        </p:nvCxnSpPr>
+        <p:spPr>
+          <a:xfrm flipH="1">
+            <a:off x="5122993" y="4304236"/>
+            <a:ext cx="2014643" cy="0"/>
+          </a:xfrm>
+          <a:prstGeom prst="straightConnector1">
+            <a:avLst/>
+          </a:prstGeom>
+          <a:ln w="12700">
+            <a:solidFill>
+              <a:schemeClr val="bg1"/>
+            </a:solidFill>
+            <a:tailEnd type="triangle"/>
+          </a:ln>
+        </p:spPr>
+        <p:style>
+          <a:lnRef idx="1">
+            <a:schemeClr val="accent1"/>
+          </a:lnRef>
+          <a:fillRef idx="0">
+            <a:schemeClr val="accent1"/>
+          </a:fillRef>
+          <a:effectRef idx="0">
+            <a:schemeClr val="accent1"/>
+          </a:effectRef>
+          <a:fontRef idx="minor">
+            <a:schemeClr val="tx1"/>
+          </a:fontRef>
+        </p:style>
+      </p:cxnSp>
+      <p:sp>
+        <p:nvSpPr>
+          <p:cNvPr id="14" name="CuadroTexto 13">
+            <a:extLst>
+              <a:ext uri="{FF2B5EF4-FFF2-40B4-BE49-F238E27FC236}">
+                <a16:creationId xmlns:a16="http://schemas.microsoft.com/office/drawing/2014/main" id="{9B0DA9C3-988A-48A6-AE67-460CB9540473}"/>
+              </a:ext>
+            </a:extLst>
+          </p:cNvPr>
+          <p:cNvSpPr txBox="1"/>
+          <p:nvPr/>
+        </p:nvSpPr>
+        <p:spPr>
+          <a:xfrm>
+            <a:off x="5609059" y="3996717"/>
+            <a:ext cx="1376218" cy="369332"/>
+          </a:xfrm>
+          <a:prstGeom prst="rect">
+            <a:avLst/>
+          </a:prstGeom>
+          <a:noFill/>
+        </p:spPr>
+        <p:txBody>
+          <a:bodyPr wrap="square" rtlCol="0">
+            <a:spAutoFit/>
+          </a:bodyPr>
+          <a:lstStyle/>
+          <a:p>
+            <a:r>
+              <a:rPr lang="en-US" dirty="0">
+                <a:solidFill>
+                  <a:schemeClr val="bg1"/>
+                </a:solidFill>
+              </a:rPr>
+              <a:t>contains</a:t>
+            </a:r>
+          </a:p>
+        </p:txBody>
+      </p:sp>
+      <p:cxnSp>
+        <p:nvCxnSpPr>
+          <p:cNvPr id="23" name="Conector recto de flecha 22">
+            <a:extLst>
+              <a:ext uri="{FF2B5EF4-FFF2-40B4-BE49-F238E27FC236}">
+                <a16:creationId xmlns:a16="http://schemas.microsoft.com/office/drawing/2014/main" id="{34AE3A4C-C027-4534-B21C-6462C9EB6F54}"/>
+              </a:ext>
+            </a:extLst>
+          </p:cNvPr>
+          <p:cNvCxnSpPr>
+            <a:cxnSpLocks/>
+            <a:endCxn id="7" idx="2"/>
+          </p:cNvCxnSpPr>
+          <p:nvPr/>
+        </p:nvCxnSpPr>
+        <p:spPr>
+          <a:xfrm flipH="1" flipV="1">
+            <a:off x="7933721" y="1089348"/>
+            <a:ext cx="588266" cy="841185"/>
+          </a:xfrm>
+          <a:prstGeom prst="straightConnector1">
+            <a:avLst/>
+          </a:prstGeom>
+          <a:ln w="12700">
+            <a:solidFill>
+              <a:schemeClr val="bg1"/>
+            </a:solidFill>
+            <a:tailEnd type="triangle"/>
+          </a:ln>
+        </p:spPr>
+        <p:style>
+          <a:lnRef idx="1">
+            <a:schemeClr val="accent1"/>
+          </a:lnRef>
+          <a:fillRef idx="0">
+            <a:schemeClr val="accent1"/>
+          </a:fillRef>
+          <a:effectRef idx="0">
+            <a:schemeClr val="accent1"/>
+          </a:effectRef>
+          <a:fontRef idx="minor">
+            <a:schemeClr val="tx1"/>
+          </a:fontRef>
+        </p:style>
+      </p:cxnSp>
+      <p:sp>
+        <p:nvSpPr>
+          <p:cNvPr id="25" name="CuadroTexto 24">
+            <a:extLst>
+              <a:ext uri="{FF2B5EF4-FFF2-40B4-BE49-F238E27FC236}">
+                <a16:creationId xmlns:a16="http://schemas.microsoft.com/office/drawing/2014/main" id="{BB1FF878-5C4C-466C-9FC5-A1BAA31AA318}"/>
+              </a:ext>
+            </a:extLst>
+          </p:cNvPr>
+          <p:cNvSpPr txBox="1"/>
+          <p:nvPr/>
+        </p:nvSpPr>
+        <p:spPr>
+          <a:xfrm>
+            <a:off x="7360795" y="1325274"/>
+            <a:ext cx="1376218" cy="369332"/>
+          </a:xfrm>
+          <a:prstGeom prst="rect">
+            <a:avLst/>
+          </a:prstGeom>
+          <a:noFill/>
+        </p:spPr>
+        <p:txBody>
+          <a:bodyPr wrap="square" rtlCol="0">
+            <a:spAutoFit/>
+          </a:bodyPr>
+          <a:lstStyle/>
+          <a:p>
+            <a:r>
+              <a:rPr lang="en-US" dirty="0">
+                <a:solidFill>
+                  <a:schemeClr val="bg1"/>
+                </a:solidFill>
+              </a:rPr>
+              <a:t>shows</a:t>
+            </a:r>
+          </a:p>
+        </p:txBody>
+      </p:sp>
+      <p:cxnSp>
+        <p:nvCxnSpPr>
+          <p:cNvPr id="26" name="Conector recto de flecha 25">
+            <a:extLst>
+              <a:ext uri="{FF2B5EF4-FFF2-40B4-BE49-F238E27FC236}">
+                <a16:creationId xmlns:a16="http://schemas.microsoft.com/office/drawing/2014/main" id="{81001ED0-1228-4F08-BAA6-AC852D419646}"/>
+              </a:ext>
+            </a:extLst>
+          </p:cNvPr>
+          <p:cNvCxnSpPr>
+            <a:cxnSpLocks/>
+          </p:cNvCxnSpPr>
+          <p:nvPr/>
+        </p:nvCxnSpPr>
+        <p:spPr>
+          <a:xfrm flipH="1" flipV="1">
+            <a:off x="8547902" y="1090420"/>
+            <a:ext cx="587430" cy="840113"/>
+          </a:xfrm>
+          <a:prstGeom prst="straightConnector1">
+            <a:avLst/>
+          </a:prstGeom>
+          <a:ln w="12700">
+            <a:solidFill>
+              <a:schemeClr val="bg1"/>
+            </a:solidFill>
+            <a:headEnd type="triangle"/>
+            <a:tailEnd type="none"/>
+          </a:ln>
+        </p:spPr>
+        <p:style>
+          <a:lnRef idx="1">
+            <a:schemeClr val="accent1"/>
+          </a:lnRef>
+          <a:fillRef idx="0">
+            <a:schemeClr val="accent1"/>
+          </a:fillRef>
+          <a:effectRef idx="0">
+            <a:schemeClr val="accent1"/>
+          </a:effectRef>
+          <a:fontRef idx="minor">
+            <a:schemeClr val="tx1"/>
+          </a:fontRef>
+        </p:style>
+      </p:cxnSp>
+      <p:sp>
+        <p:nvSpPr>
+          <p:cNvPr id="27" name="CuadroTexto 26">
+            <a:extLst>
+              <a:ext uri="{FF2B5EF4-FFF2-40B4-BE49-F238E27FC236}">
+                <a16:creationId xmlns:a16="http://schemas.microsoft.com/office/drawing/2014/main" id="{DB051C0C-8A08-4ABE-A33C-3AEEF757C89F}"/>
+              </a:ext>
+            </a:extLst>
+          </p:cNvPr>
+          <p:cNvSpPr txBox="1"/>
+          <p:nvPr/>
+        </p:nvSpPr>
+        <p:spPr>
+          <a:xfrm>
+            <a:off x="8946221" y="1325274"/>
+            <a:ext cx="1376218" cy="369332"/>
+          </a:xfrm>
+          <a:prstGeom prst="rect">
+            <a:avLst/>
+          </a:prstGeom>
+          <a:noFill/>
+        </p:spPr>
+        <p:txBody>
+          <a:bodyPr wrap="square" rtlCol="0">
+            <a:spAutoFit/>
+          </a:bodyPr>
+          <a:lstStyle/>
+          <a:p>
+            <a:r>
+              <a:rPr lang="en-US" dirty="0">
+                <a:solidFill>
+                  <a:schemeClr val="bg1"/>
+                </a:solidFill>
+              </a:rPr>
+              <a:t>calls</a:t>
+            </a:r>
+          </a:p>
+        </p:txBody>
+      </p:sp>
+      <p:pic>
+        <p:nvPicPr>
+          <p:cNvPr id="7" name="Imagen 6">
+            <a:extLst>
+              <a:ext uri="{FF2B5EF4-FFF2-40B4-BE49-F238E27FC236}">
+                <a16:creationId xmlns:a16="http://schemas.microsoft.com/office/drawing/2014/main" id="{6093698F-10F2-4A23-AAAF-32CC685B484B}"/>
+              </a:ext>
+            </a:extLst>
+          </p:cNvPr>
+          <p:cNvPicPr>
+            <a:picLocks noChangeAspect="1"/>
+          </p:cNvPicPr>
+          <p:nvPr/>
+        </p:nvPicPr>
+        <p:blipFill>
+          <a:blip r:embed="rId2"/>
+          <a:stretch>
+            <a:fillRect/>
+          </a:stretch>
+        </p:blipFill>
+        <p:spPr>
+          <a:xfrm>
+            <a:off x="5361971" y="374973"/>
+            <a:ext cx="5143500" cy="714375"/>
+          </a:xfrm>
+          <a:prstGeom prst="rect">
+            <a:avLst/>
+          </a:prstGeom>
+          <a:effectLst>
+            <a:glow rad="25400">
+              <a:schemeClr val="bg1">
+                <a:alpha val="40000"/>
+              </a:schemeClr>
+            </a:glow>
+          </a:effectLst>
+        </p:spPr>
+      </p:pic>
+      <p:pic>
+        <p:nvPicPr>
+          <p:cNvPr id="8" name="Imagen 7">
+            <a:extLst>
+              <a:ext uri="{FF2B5EF4-FFF2-40B4-BE49-F238E27FC236}">
+                <a16:creationId xmlns:a16="http://schemas.microsoft.com/office/drawing/2014/main" id="{90553F9F-F089-4AC7-88B2-FAEE12B0CBEF}"/>
+              </a:ext>
+            </a:extLst>
+          </p:cNvPr>
+          <p:cNvPicPr>
+            <a:picLocks noChangeAspect="1"/>
+          </p:cNvPicPr>
+          <p:nvPr/>
+        </p:nvPicPr>
+        <p:blipFill>
+          <a:blip r:embed="rId3"/>
+          <a:stretch>
+            <a:fillRect/>
+          </a:stretch>
+        </p:blipFill>
+        <p:spPr>
+          <a:xfrm>
+            <a:off x="361700" y="3395989"/>
+            <a:ext cx="4761293" cy="1816493"/>
+          </a:xfrm>
+          <a:prstGeom prst="rect">
+            <a:avLst/>
+          </a:prstGeom>
+          <a:effectLst>
+            <a:glow rad="25400">
+              <a:schemeClr val="bg1">
+                <a:alpha val="40000"/>
+              </a:schemeClr>
+            </a:glow>
+          </a:effectLst>
+        </p:spPr>
+      </p:pic>
+      <p:pic>
+        <p:nvPicPr>
+          <p:cNvPr id="10" name="Imagen 9">
+            <a:extLst>
+              <a:ext uri="{FF2B5EF4-FFF2-40B4-BE49-F238E27FC236}">
+                <a16:creationId xmlns:a16="http://schemas.microsoft.com/office/drawing/2014/main" id="{44E765E2-07D6-4F0B-A066-D1C68161C31A}"/>
+              </a:ext>
+            </a:extLst>
+          </p:cNvPr>
+          <p:cNvPicPr>
+            <a:picLocks noChangeAspect="1"/>
+          </p:cNvPicPr>
+          <p:nvPr/>
+        </p:nvPicPr>
+        <p:blipFill>
+          <a:blip r:embed="rId4"/>
+          <a:stretch>
+            <a:fillRect/>
+          </a:stretch>
+        </p:blipFill>
+        <p:spPr>
+          <a:xfrm>
+            <a:off x="7137636" y="1930533"/>
+            <a:ext cx="4711778" cy="4747406"/>
+          </a:xfrm>
+          <a:prstGeom prst="rect">
+            <a:avLst/>
+          </a:prstGeom>
+          <a:effectLst>
+            <a:glow rad="25400">
+              <a:schemeClr val="bg1">
+                <a:alpha val="40000"/>
+              </a:schemeClr>
+            </a:glow>
+          </a:effectLst>
+        </p:spPr>
+      </p:pic>
+    </p:spTree>
+    <p:extLst>
+      <p:ext uri="{BB962C8B-B14F-4D97-AF65-F5344CB8AC3E}">
+        <p14:creationId xmlns:p14="http://schemas.microsoft.com/office/powerpoint/2010/main" val="416514896"/>
+      </p:ext>
+    </p:extLst>
+  </p:cSld>
+  <p:clrMapOvr>
+    <a:masterClrMapping/>
+  </p:clrMapOvr>
+</p:sld>
+</file>
+
+<file path=ppt/slides/slide43.xml><?xml version="1.0" encoding="utf-8"?>
+<p:sld xmlns:a="http://schemas.openxmlformats.org/drawingml/2006/main" xmlns:r="http://schemas.openxmlformats.org/officeDocument/2006/relationships" xmlns:p="http://schemas.openxmlformats.org/presentationml/2006/main">
+  <p:cSld>
+    <p:spTree>
+      <p:nvGrpSpPr>
+        <p:cNvPr id="1" name=""/>
+        <p:cNvGrpSpPr/>
+        <p:nvPr/>
+      </p:nvGrpSpPr>
+      <p:grpSpPr>
+        <a:xfrm>
+          <a:off x="0" y="0"/>
+          <a:ext cx="0" cy="0"/>
+          <a:chOff x="0" y="0"/>
+          <a:chExt cx="0" cy="0"/>
+        </a:xfrm>
+      </p:grpSpPr>
+      <p:sp>
+        <p:nvSpPr>
+          <p:cNvPr id="2" name="Título 1">
+            <a:extLst>
+              <a:ext uri="{FF2B5EF4-FFF2-40B4-BE49-F238E27FC236}">
+                <a16:creationId xmlns:a16="http://schemas.microsoft.com/office/drawing/2014/main" id="{51E579E3-4D4D-4391-A4DB-77F6C6DD84BE}"/>
+              </a:ext>
+            </a:extLst>
+          </p:cNvPr>
+          <p:cNvSpPr>
+            <a:spLocks noGrp="1"/>
+          </p:cNvSpPr>
+          <p:nvPr>
+            <p:ph type="title"/>
+          </p:nvPr>
+        </p:nvSpPr>
+        <p:spPr>
+          <a:xfrm>
+            <a:off x="900344" y="2766218"/>
+            <a:ext cx="10515600" cy="1325563"/>
+          </a:xfrm>
+        </p:spPr>
+        <p:txBody>
+          <a:bodyPr/>
+          <a:lstStyle/>
+          <a:p>
+            <a:r>
+              <a:rPr lang="es-ES" dirty="0">
+                <a:solidFill>
+                  <a:srgbClr val="000000"/>
+                </a:solidFill>
+                <a:latin typeface="Calibri" panose="020F0502020204030204" pitchFamily="34" charset="0"/>
+              </a:rPr>
+              <a:t>Page-</a:t>
+            </a:r>
+            <a:r>
+              <a:rPr lang="es-ES" dirty="0" err="1">
+                <a:solidFill>
+                  <a:srgbClr val="000000"/>
+                </a:solidFill>
+                <a:latin typeface="Calibri" panose="020F0502020204030204" pitchFamily="34" charset="0"/>
+              </a:rPr>
+              <a:t>Object</a:t>
+            </a:r>
+            <a:r>
+              <a:rPr lang="es-ES" dirty="0">
+                <a:solidFill>
+                  <a:srgbClr val="000000"/>
+                </a:solidFill>
+                <a:latin typeface="Calibri" panose="020F0502020204030204" pitchFamily="34" charset="0"/>
+              </a:rPr>
+              <a:t> </a:t>
+            </a:r>
+            <a:r>
+              <a:rPr lang="es-ES" dirty="0" err="1">
+                <a:solidFill>
+                  <a:srgbClr val="000000"/>
+                </a:solidFill>
+                <a:latin typeface="Calibri" panose="020F0502020204030204" pitchFamily="34" charset="0"/>
+              </a:rPr>
+              <a:t>pattern</a:t>
+            </a:r>
+            <a:endParaRPr lang="en-US" dirty="0"/>
+          </a:p>
+        </p:txBody>
+      </p:sp>
+    </p:spTree>
+    <p:extLst>
+      <p:ext uri="{BB962C8B-B14F-4D97-AF65-F5344CB8AC3E}">
+        <p14:creationId xmlns:p14="http://schemas.microsoft.com/office/powerpoint/2010/main" val="2983471730"/>
+      </p:ext>
+    </p:extLst>
+  </p:cSld>
+  <p:clrMapOvr>
+    <a:masterClrMapping/>
+  </p:clrMapOvr>
+</p:sld>
+</file>
+
+<file path=ppt/slides/slide44.xml><?xml version="1.0" encoding="utf-8"?>
+<p:sld xmlns:a="http://schemas.openxmlformats.org/drawingml/2006/main" xmlns:r="http://schemas.openxmlformats.org/officeDocument/2006/relationships" xmlns:p="http://schemas.openxmlformats.org/presentationml/2006/main">
+  <p:cSld>
+    <p:bg>
+      <p:bgPr>
+        <a:solidFill>
+          <a:srgbClr val="1E1E1E"/>
+        </a:solidFill>
+        <a:effectLst/>
+      </p:bgPr>
+    </p:bg>
+    <p:spTree>
+      <p:nvGrpSpPr>
+        <p:cNvPr id="1" name=""/>
+        <p:cNvGrpSpPr/>
+        <p:nvPr/>
+      </p:nvGrpSpPr>
+      <p:grpSpPr>
+        <a:xfrm>
+          <a:off x="0" y="0"/>
+          <a:ext cx="0" cy="0"/>
+          <a:chOff x="0" y="0"/>
+          <a:chExt cx="0" cy="0"/>
+        </a:xfrm>
+      </p:grpSpPr>
+      <p:sp>
+        <p:nvSpPr>
+          <p:cNvPr id="31" name="CuadroTexto 30">
+            <a:extLst>
+              <a:ext uri="{FF2B5EF4-FFF2-40B4-BE49-F238E27FC236}">
+                <a16:creationId xmlns:a16="http://schemas.microsoft.com/office/drawing/2014/main" id="{FBF7026D-12F4-4541-8110-DE706094717A}"/>
+              </a:ext>
+            </a:extLst>
+          </p:cNvPr>
+          <p:cNvSpPr txBox="1"/>
+          <p:nvPr/>
+        </p:nvSpPr>
+        <p:spPr>
+          <a:xfrm>
+            <a:off x="484863" y="185392"/>
+            <a:ext cx="3397994" cy="646331"/>
+          </a:xfrm>
+          <a:prstGeom prst="rect">
+            <a:avLst/>
+          </a:prstGeom>
+          <a:noFill/>
+        </p:spPr>
+        <p:txBody>
+          <a:bodyPr wrap="square" rtlCol="0">
+            <a:spAutoFit/>
+          </a:bodyPr>
+          <a:lstStyle/>
+          <a:p>
+            <a:r>
+              <a:rPr lang="en-US" sz="3600" dirty="0" err="1">
+                <a:solidFill>
+                  <a:srgbClr val="53A2D3"/>
+                </a:solidFill>
+              </a:rPr>
+              <a:t>Teoría</a:t>
+            </a:r>
+            <a:endParaRPr lang="en-US" sz="3600" dirty="0">
+              <a:solidFill>
+                <a:srgbClr val="53A2D3"/>
+              </a:solidFill>
+            </a:endParaRPr>
+          </a:p>
+        </p:txBody>
+      </p:sp>
+      <p:pic>
+        <p:nvPicPr>
+          <p:cNvPr id="30" name="Imagen 29">
+            <a:extLst>
+              <a:ext uri="{FF2B5EF4-FFF2-40B4-BE49-F238E27FC236}">
+                <a16:creationId xmlns:a16="http://schemas.microsoft.com/office/drawing/2014/main" id="{11AA3BEE-0DB9-4E5E-97F9-46B38CC019A4}"/>
+              </a:ext>
+            </a:extLst>
+          </p:cNvPr>
+          <p:cNvPicPr>
+            <a:picLocks noChangeAspect="1"/>
+          </p:cNvPicPr>
+          <p:nvPr/>
+        </p:nvPicPr>
+        <p:blipFill>
+          <a:blip r:embed="rId2"/>
+          <a:stretch>
+            <a:fillRect/>
+          </a:stretch>
+        </p:blipFill>
+        <p:spPr>
+          <a:xfrm>
+            <a:off x="320338" y="3308109"/>
+            <a:ext cx="4785360" cy="2990850"/>
+          </a:xfrm>
+          <a:prstGeom prst="rect">
+            <a:avLst/>
+          </a:prstGeom>
+          <a:effectLst>
+            <a:glow rad="25400">
+              <a:schemeClr val="bg1">
+                <a:alpha val="40000"/>
+              </a:schemeClr>
+            </a:glow>
+          </a:effectLst>
+        </p:spPr>
+      </p:pic>
+      <p:pic>
+        <p:nvPicPr>
+          <p:cNvPr id="33" name="Imagen 32">
+            <a:extLst>
+              <a:ext uri="{FF2B5EF4-FFF2-40B4-BE49-F238E27FC236}">
+                <a16:creationId xmlns:a16="http://schemas.microsoft.com/office/drawing/2014/main" id="{27AF6DC8-BCC6-43A0-ACB8-8E24581FFF99}"/>
+              </a:ext>
+            </a:extLst>
+          </p:cNvPr>
+          <p:cNvPicPr>
+            <a:picLocks noChangeAspect="1"/>
+          </p:cNvPicPr>
+          <p:nvPr/>
+        </p:nvPicPr>
+        <p:blipFill>
+          <a:blip r:embed="rId3"/>
+          <a:stretch>
+            <a:fillRect/>
+          </a:stretch>
+        </p:blipFill>
+        <p:spPr>
+          <a:xfrm>
+            <a:off x="6221148" y="252067"/>
+            <a:ext cx="5485989" cy="2262533"/>
+          </a:xfrm>
+          <a:prstGeom prst="rect">
+            <a:avLst/>
+          </a:prstGeom>
+          <a:effectLst>
+            <a:glow rad="25400">
+              <a:schemeClr val="bg1">
+                <a:alpha val="40000"/>
+              </a:schemeClr>
+            </a:glow>
+          </a:effectLst>
+        </p:spPr>
+      </p:pic>
+      <p:pic>
+        <p:nvPicPr>
+          <p:cNvPr id="2" name="Imagen 1">
+            <a:extLst>
+              <a:ext uri="{FF2B5EF4-FFF2-40B4-BE49-F238E27FC236}">
+                <a16:creationId xmlns:a16="http://schemas.microsoft.com/office/drawing/2014/main" id="{0D177CD9-B958-4BF5-9974-F66D391F7A44}"/>
+              </a:ext>
+            </a:extLst>
+          </p:cNvPr>
+          <p:cNvPicPr>
+            <a:picLocks noChangeAspect="1"/>
+          </p:cNvPicPr>
+          <p:nvPr/>
+        </p:nvPicPr>
+        <p:blipFill>
+          <a:blip r:embed="rId4"/>
+          <a:stretch>
+            <a:fillRect/>
+          </a:stretch>
+        </p:blipFill>
+        <p:spPr>
+          <a:xfrm>
+            <a:off x="6221148" y="3124301"/>
+            <a:ext cx="5491163" cy="3358466"/>
+          </a:xfrm>
+          <a:prstGeom prst="rect">
+            <a:avLst/>
+          </a:prstGeom>
+          <a:effectLst>
+            <a:glow rad="25400">
+              <a:schemeClr val="bg1">
+                <a:alpha val="40000"/>
+              </a:schemeClr>
+            </a:glow>
+          </a:effectLst>
+        </p:spPr>
+      </p:pic>
+      <p:cxnSp>
+        <p:nvCxnSpPr>
+          <p:cNvPr id="34" name="Conector recto de flecha 33">
+            <a:extLst>
+              <a:ext uri="{FF2B5EF4-FFF2-40B4-BE49-F238E27FC236}">
+                <a16:creationId xmlns:a16="http://schemas.microsoft.com/office/drawing/2014/main" id="{FE5B11F8-9635-41F2-BA0B-CF1CE47617E6}"/>
+              </a:ext>
+            </a:extLst>
+          </p:cNvPr>
+          <p:cNvCxnSpPr>
+            <a:cxnSpLocks/>
+            <a:stCxn id="2" idx="0"/>
+            <a:endCxn id="33" idx="2"/>
+          </p:cNvCxnSpPr>
+          <p:nvPr/>
+        </p:nvCxnSpPr>
+        <p:spPr>
+          <a:xfrm flipH="1" flipV="1">
+            <a:off x="8964143" y="2514600"/>
+            <a:ext cx="2587" cy="609701"/>
+          </a:xfrm>
+          <a:prstGeom prst="straightConnector1">
+            <a:avLst/>
+          </a:prstGeom>
+          <a:ln w="12700">
+            <a:solidFill>
+              <a:schemeClr val="bg1"/>
+            </a:solidFill>
+            <a:headEnd type="triangle"/>
+            <a:tailEnd type="triangle"/>
+          </a:ln>
+        </p:spPr>
+        <p:style>
+          <a:lnRef idx="1">
+            <a:schemeClr val="accent1"/>
+          </a:lnRef>
+          <a:fillRef idx="0">
+            <a:schemeClr val="accent1"/>
+          </a:fillRef>
+          <a:effectRef idx="0">
+            <a:schemeClr val="accent1"/>
+          </a:effectRef>
+          <a:fontRef idx="minor">
+            <a:schemeClr val="tx1"/>
+          </a:fontRef>
+        </p:style>
+      </p:cxnSp>
+      <p:sp>
+        <p:nvSpPr>
+          <p:cNvPr id="38" name="CuadroTexto 37">
+            <a:extLst>
+              <a:ext uri="{FF2B5EF4-FFF2-40B4-BE49-F238E27FC236}">
+                <a16:creationId xmlns:a16="http://schemas.microsoft.com/office/drawing/2014/main" id="{E593275B-18D5-4ED5-B785-2CD80B46AC8E}"/>
+              </a:ext>
+            </a:extLst>
+          </p:cNvPr>
+          <p:cNvSpPr txBox="1"/>
+          <p:nvPr/>
+        </p:nvSpPr>
+        <p:spPr>
+          <a:xfrm>
+            <a:off x="8964141" y="2650173"/>
+            <a:ext cx="1758422" cy="338554"/>
+          </a:xfrm>
+          <a:prstGeom prst="rect">
+            <a:avLst/>
+          </a:prstGeom>
+          <a:noFill/>
+        </p:spPr>
+        <p:txBody>
+          <a:bodyPr wrap="square" rtlCol="0">
+            <a:spAutoFit/>
+          </a:bodyPr>
+          <a:lstStyle/>
+          <a:p>
+            <a:r>
+              <a:rPr lang="en-US" sz="1600" dirty="0">
+                <a:solidFill>
+                  <a:schemeClr val="bg1"/>
+                </a:solidFill>
+              </a:rPr>
+              <a:t>reads and interacts</a:t>
+            </a:r>
+          </a:p>
+        </p:txBody>
+      </p:sp>
+      <p:sp>
+        <p:nvSpPr>
+          <p:cNvPr id="39" name="CuadroTexto 38">
+            <a:extLst>
+              <a:ext uri="{FF2B5EF4-FFF2-40B4-BE49-F238E27FC236}">
+                <a16:creationId xmlns:a16="http://schemas.microsoft.com/office/drawing/2014/main" id="{E933C427-2012-4298-BAC7-CF5FE7311DE1}"/>
+              </a:ext>
+            </a:extLst>
+          </p:cNvPr>
+          <p:cNvSpPr txBox="1"/>
+          <p:nvPr/>
+        </p:nvSpPr>
+        <p:spPr>
+          <a:xfrm>
+            <a:off x="5282744" y="4434202"/>
+            <a:ext cx="1376218" cy="369332"/>
+          </a:xfrm>
+          <a:prstGeom prst="rect">
+            <a:avLst/>
+          </a:prstGeom>
+          <a:noFill/>
+        </p:spPr>
+        <p:txBody>
+          <a:bodyPr wrap="square" rtlCol="0">
+            <a:spAutoFit/>
+          </a:bodyPr>
+          <a:lstStyle/>
+          <a:p>
+            <a:r>
+              <a:rPr lang="en-US" dirty="0">
+                <a:solidFill>
+                  <a:schemeClr val="bg1"/>
+                </a:solidFill>
+              </a:rPr>
+              <a:t>calls</a:t>
+            </a:r>
+          </a:p>
+        </p:txBody>
+      </p:sp>
+      <p:cxnSp>
+        <p:nvCxnSpPr>
+          <p:cNvPr id="40" name="Conector recto de flecha 39">
+            <a:extLst>
+              <a:ext uri="{FF2B5EF4-FFF2-40B4-BE49-F238E27FC236}">
+                <a16:creationId xmlns:a16="http://schemas.microsoft.com/office/drawing/2014/main" id="{65ADA00B-B061-4BC6-8BEA-533E11C25C79}"/>
+              </a:ext>
+            </a:extLst>
+          </p:cNvPr>
+          <p:cNvCxnSpPr>
+            <a:cxnSpLocks/>
+            <a:stCxn id="30" idx="3"/>
+            <a:endCxn id="2" idx="1"/>
+          </p:cNvCxnSpPr>
+          <p:nvPr/>
+        </p:nvCxnSpPr>
+        <p:spPr>
+          <a:xfrm>
+            <a:off x="5105698" y="4803534"/>
+            <a:ext cx="1115450" cy="0"/>
+          </a:xfrm>
+          <a:prstGeom prst="straightConnector1">
+            <a:avLst/>
+          </a:prstGeom>
+          <a:ln w="12700">
+            <a:solidFill>
+              <a:schemeClr val="bg1"/>
+            </a:solidFill>
+            <a:tailEnd type="triangle"/>
+          </a:ln>
+        </p:spPr>
+        <p:style>
+          <a:lnRef idx="1">
+            <a:schemeClr val="accent1"/>
+          </a:lnRef>
+          <a:fillRef idx="0">
+            <a:schemeClr val="accent1"/>
+          </a:fillRef>
+          <a:effectRef idx="0">
+            <a:schemeClr val="accent1"/>
+          </a:effectRef>
+          <a:fontRef idx="minor">
+            <a:schemeClr val="tx1"/>
+          </a:fontRef>
+        </p:style>
+      </p:cxnSp>
+    </p:spTree>
+    <p:extLst>
+      <p:ext uri="{BB962C8B-B14F-4D97-AF65-F5344CB8AC3E}">
+        <p14:creationId xmlns:p14="http://schemas.microsoft.com/office/powerpoint/2010/main" val="2070501123"/>
+      </p:ext>
+    </p:extLst>
+  </p:cSld>
+  <p:clrMapOvr>
+    <a:masterClrMapping/>
+  </p:clrMapOvr>
+</p:sld>
+</file>
+
+<file path=ppt/slides/slide45.xml><?xml version="1.0" encoding="utf-8"?>
+<p:sld xmlns:a="http://schemas.openxmlformats.org/drawingml/2006/main" xmlns:r="http://schemas.openxmlformats.org/officeDocument/2006/relationships" xmlns:p="http://schemas.openxmlformats.org/presentationml/2006/main">
+  <p:cSld>
+    <p:bg>
+      <p:bgPr>
+        <a:solidFill>
+          <a:srgbClr val="1E1E1E"/>
+        </a:solidFill>
+        <a:effectLst/>
+      </p:bgPr>
+    </p:bg>
+    <p:spTree>
+      <p:nvGrpSpPr>
+        <p:cNvPr id="1" name=""/>
+        <p:cNvGrpSpPr/>
+        <p:nvPr/>
+      </p:nvGrpSpPr>
+      <p:grpSpPr>
+        <a:xfrm>
+          <a:off x="0" y="0"/>
+          <a:ext cx="0" cy="0"/>
+          <a:chOff x="0" y="0"/>
+          <a:chExt cx="0" cy="0"/>
+        </a:xfrm>
+      </p:grpSpPr>
+      <p:pic>
+        <p:nvPicPr>
+          <p:cNvPr id="7" name="Imagen 6">
+            <a:extLst>
+              <a:ext uri="{FF2B5EF4-FFF2-40B4-BE49-F238E27FC236}">
+                <a16:creationId xmlns:a16="http://schemas.microsoft.com/office/drawing/2014/main" id="{2CFE6195-EA83-4C47-A03F-329D229C5AB7}"/>
+              </a:ext>
+            </a:extLst>
+          </p:cNvPr>
+          <p:cNvPicPr>
+            <a:picLocks noChangeAspect="1"/>
+          </p:cNvPicPr>
+          <p:nvPr/>
+        </p:nvPicPr>
+        <p:blipFill>
+          <a:blip r:embed="rId2"/>
+          <a:stretch>
+            <a:fillRect/>
+          </a:stretch>
+        </p:blipFill>
+        <p:spPr>
+          <a:xfrm>
+            <a:off x="207896" y="2087591"/>
+            <a:ext cx="5179886" cy="4335534"/>
+          </a:xfrm>
+          <a:prstGeom prst="rect">
+            <a:avLst/>
+          </a:prstGeom>
+          <a:effectLst>
+            <a:glow rad="25400">
+              <a:schemeClr val="bg1">
+                <a:alpha val="40000"/>
+              </a:schemeClr>
+            </a:glow>
+          </a:effectLst>
+        </p:spPr>
+      </p:pic>
+      <p:pic>
+        <p:nvPicPr>
+          <p:cNvPr id="11" name="Imagen 10">
+            <a:extLst>
+              <a:ext uri="{FF2B5EF4-FFF2-40B4-BE49-F238E27FC236}">
+                <a16:creationId xmlns:a16="http://schemas.microsoft.com/office/drawing/2014/main" id="{FACE3969-615E-4C45-B56D-19518D2A9CE0}"/>
+              </a:ext>
+            </a:extLst>
+          </p:cNvPr>
+          <p:cNvPicPr>
+            <a:picLocks noChangeAspect="1"/>
+          </p:cNvPicPr>
+          <p:nvPr/>
+        </p:nvPicPr>
+        <p:blipFill>
+          <a:blip r:embed="rId3"/>
+          <a:stretch>
+            <a:fillRect/>
+          </a:stretch>
+        </p:blipFill>
+        <p:spPr>
+          <a:xfrm>
+            <a:off x="6151615" y="1849550"/>
+            <a:ext cx="5830965" cy="4823295"/>
+          </a:xfrm>
+          <a:prstGeom prst="rect">
+            <a:avLst/>
+          </a:prstGeom>
+          <a:effectLst>
+            <a:glow rad="25400">
+              <a:schemeClr val="bg1">
+                <a:alpha val="40000"/>
+              </a:schemeClr>
+            </a:glow>
+          </a:effectLst>
+        </p:spPr>
+      </p:pic>
+      <p:pic>
+        <p:nvPicPr>
+          <p:cNvPr id="13" name="Imagen 12">
+            <a:extLst>
+              <a:ext uri="{FF2B5EF4-FFF2-40B4-BE49-F238E27FC236}">
+                <a16:creationId xmlns:a16="http://schemas.microsoft.com/office/drawing/2014/main" id="{DB69B325-2AFF-4143-A6CE-6A622ECFDFA2}"/>
+              </a:ext>
+            </a:extLst>
+          </p:cNvPr>
+          <p:cNvPicPr>
+            <a:picLocks noChangeAspect="1"/>
+          </p:cNvPicPr>
+          <p:nvPr/>
+        </p:nvPicPr>
+        <p:blipFill>
+          <a:blip r:embed="rId4"/>
+          <a:stretch>
+            <a:fillRect/>
+          </a:stretch>
+        </p:blipFill>
+        <p:spPr>
+          <a:xfrm>
+            <a:off x="6267604" y="433524"/>
+            <a:ext cx="5598986" cy="664286"/>
+          </a:xfrm>
+          <a:prstGeom prst="rect">
+            <a:avLst/>
+          </a:prstGeom>
+          <a:effectLst>
+            <a:glow rad="25400">
+              <a:schemeClr val="bg1">
+                <a:alpha val="40000"/>
+              </a:schemeClr>
+            </a:glow>
+          </a:effectLst>
+        </p:spPr>
+      </p:pic>
+      <p:sp>
+        <p:nvSpPr>
+          <p:cNvPr id="25" name="CuadroTexto 24">
+            <a:extLst>
+              <a:ext uri="{FF2B5EF4-FFF2-40B4-BE49-F238E27FC236}">
+                <a16:creationId xmlns:a16="http://schemas.microsoft.com/office/drawing/2014/main" id="{19C6170D-CFD8-49E4-816C-97EDFBA2B700}"/>
+              </a:ext>
+            </a:extLst>
+          </p:cNvPr>
+          <p:cNvSpPr txBox="1"/>
+          <p:nvPr/>
+        </p:nvSpPr>
+        <p:spPr>
+          <a:xfrm>
+            <a:off x="5407891" y="3891865"/>
+            <a:ext cx="1376218" cy="369332"/>
+          </a:xfrm>
+          <a:prstGeom prst="rect">
+            <a:avLst/>
+          </a:prstGeom>
+          <a:noFill/>
+        </p:spPr>
+        <p:txBody>
+          <a:bodyPr wrap="square" rtlCol="0">
+            <a:spAutoFit/>
+          </a:bodyPr>
+          <a:lstStyle/>
+          <a:p>
+            <a:r>
+              <a:rPr lang="en-US" dirty="0">
+                <a:solidFill>
+                  <a:schemeClr val="bg1"/>
+                </a:solidFill>
+              </a:rPr>
+              <a:t>calls</a:t>
+            </a:r>
+          </a:p>
+        </p:txBody>
+      </p:sp>
+      <p:cxnSp>
+        <p:nvCxnSpPr>
+          <p:cNvPr id="26" name="Conector recto de flecha 25">
+            <a:extLst>
+              <a:ext uri="{FF2B5EF4-FFF2-40B4-BE49-F238E27FC236}">
+                <a16:creationId xmlns:a16="http://schemas.microsoft.com/office/drawing/2014/main" id="{76AE51E0-8D6F-4932-8634-0B5B6F4E744C}"/>
+              </a:ext>
+            </a:extLst>
+          </p:cNvPr>
+          <p:cNvCxnSpPr>
+            <a:cxnSpLocks/>
+            <a:stCxn id="7" idx="3"/>
+            <a:endCxn id="11" idx="1"/>
+          </p:cNvCxnSpPr>
+          <p:nvPr/>
+        </p:nvCxnSpPr>
+        <p:spPr>
+          <a:xfrm>
+            <a:off x="5387782" y="4255358"/>
+            <a:ext cx="763833" cy="5840"/>
+          </a:xfrm>
+          <a:prstGeom prst="straightConnector1">
+            <a:avLst/>
+          </a:prstGeom>
+          <a:ln w="12700">
+            <a:solidFill>
+              <a:schemeClr val="bg1"/>
+            </a:solidFill>
+            <a:tailEnd type="triangle"/>
+          </a:ln>
+        </p:spPr>
+        <p:style>
+          <a:lnRef idx="1">
+            <a:schemeClr val="accent1"/>
+          </a:lnRef>
+          <a:fillRef idx="0">
+            <a:schemeClr val="accent1"/>
+          </a:fillRef>
+          <a:effectRef idx="0">
+            <a:schemeClr val="accent1"/>
+          </a:effectRef>
+          <a:fontRef idx="minor">
+            <a:schemeClr val="tx1"/>
+          </a:fontRef>
+        </p:style>
+      </p:cxnSp>
+      <p:cxnSp>
+        <p:nvCxnSpPr>
+          <p:cNvPr id="29" name="Conector recto de flecha 28">
+            <a:extLst>
+              <a:ext uri="{FF2B5EF4-FFF2-40B4-BE49-F238E27FC236}">
+                <a16:creationId xmlns:a16="http://schemas.microsoft.com/office/drawing/2014/main" id="{03CB87ED-D98B-4404-8865-52F51E0F0D1A}"/>
+              </a:ext>
+            </a:extLst>
+          </p:cNvPr>
+          <p:cNvCxnSpPr>
+            <a:cxnSpLocks/>
+            <a:stCxn id="11" idx="0"/>
+            <a:endCxn id="13" idx="2"/>
+          </p:cNvCxnSpPr>
+          <p:nvPr/>
+        </p:nvCxnSpPr>
+        <p:spPr>
+          <a:xfrm flipH="1" flipV="1">
+            <a:off x="9067097" y="1097810"/>
+            <a:ext cx="1" cy="751740"/>
+          </a:xfrm>
+          <a:prstGeom prst="straightConnector1">
+            <a:avLst/>
+          </a:prstGeom>
+          <a:ln w="12700">
+            <a:solidFill>
+              <a:schemeClr val="bg1"/>
+            </a:solidFill>
+            <a:headEnd type="triangle"/>
+            <a:tailEnd type="triangle"/>
+          </a:ln>
+        </p:spPr>
+        <p:style>
+          <a:lnRef idx="1">
+            <a:schemeClr val="accent1"/>
+          </a:lnRef>
+          <a:fillRef idx="0">
+            <a:schemeClr val="accent1"/>
+          </a:fillRef>
+          <a:effectRef idx="0">
+            <a:schemeClr val="accent1"/>
+          </a:effectRef>
+          <a:fontRef idx="minor">
+            <a:schemeClr val="tx1"/>
+          </a:fontRef>
+        </p:style>
+      </p:cxnSp>
+      <p:sp>
+        <p:nvSpPr>
+          <p:cNvPr id="30" name="CuadroTexto 29">
+            <a:extLst>
+              <a:ext uri="{FF2B5EF4-FFF2-40B4-BE49-F238E27FC236}">
+                <a16:creationId xmlns:a16="http://schemas.microsoft.com/office/drawing/2014/main" id="{97B5AC85-396E-4BE9-9E35-EC6CFF814F96}"/>
+              </a:ext>
+            </a:extLst>
+          </p:cNvPr>
+          <p:cNvSpPr txBox="1"/>
+          <p:nvPr/>
+        </p:nvSpPr>
+        <p:spPr>
+          <a:xfrm>
+            <a:off x="9067097" y="1304403"/>
+            <a:ext cx="1758422" cy="338554"/>
+          </a:xfrm>
+          <a:prstGeom prst="rect">
+            <a:avLst/>
+          </a:prstGeom>
+          <a:noFill/>
+        </p:spPr>
+        <p:txBody>
+          <a:bodyPr wrap="square" rtlCol="0">
+            <a:spAutoFit/>
+          </a:bodyPr>
+          <a:lstStyle/>
+          <a:p>
+            <a:r>
+              <a:rPr lang="en-US" sz="1600" dirty="0">
+                <a:solidFill>
+                  <a:schemeClr val="bg1"/>
+                </a:solidFill>
+              </a:rPr>
+              <a:t>reads and interacts</a:t>
+            </a:r>
+          </a:p>
+        </p:txBody>
+      </p:sp>
+      <p:sp>
+        <p:nvSpPr>
+          <p:cNvPr id="36" name="CuadroTexto 35">
+            <a:extLst>
+              <a:ext uri="{FF2B5EF4-FFF2-40B4-BE49-F238E27FC236}">
+                <a16:creationId xmlns:a16="http://schemas.microsoft.com/office/drawing/2014/main" id="{8D5F8848-69CC-474A-8B0C-8685958FFF9D}"/>
+              </a:ext>
+            </a:extLst>
+          </p:cNvPr>
+          <p:cNvSpPr txBox="1"/>
+          <p:nvPr/>
+        </p:nvSpPr>
+        <p:spPr>
+          <a:xfrm>
+            <a:off x="361700" y="215130"/>
+            <a:ext cx="3397994" cy="646331"/>
+          </a:xfrm>
+          <a:prstGeom prst="rect">
+            <a:avLst/>
+          </a:prstGeom>
+          <a:noFill/>
+        </p:spPr>
+        <p:txBody>
+          <a:bodyPr wrap="square" rtlCol="0">
+            <a:spAutoFit/>
+          </a:bodyPr>
+          <a:lstStyle/>
+          <a:p>
+            <a:r>
+              <a:rPr lang="en-US" sz="3600" dirty="0">
+                <a:solidFill>
+                  <a:srgbClr val="53A2D3"/>
+                </a:solidFill>
+              </a:rPr>
+              <a:t>Mundo real</a:t>
+            </a:r>
+          </a:p>
+        </p:txBody>
+      </p:sp>
+    </p:spTree>
+    <p:extLst>
+      <p:ext uri="{BB962C8B-B14F-4D97-AF65-F5344CB8AC3E}">
+        <p14:creationId xmlns:p14="http://schemas.microsoft.com/office/powerpoint/2010/main" val="181309968"/>
+      </p:ext>
+    </p:extLst>
+  </p:cSld>
+  <p:clrMapOvr>
+    <a:masterClrMapping/>
+  </p:clrMapOvr>
+</p:sld>
+</file>
+
+<file path=ppt/slides/slide46.xml><?xml version="1.0" encoding="utf-8"?>
 <p:sld xmlns:a="http://schemas.openxmlformats.org/drawingml/2006/main" xmlns:r="http://schemas.openxmlformats.org/officeDocument/2006/relationships" xmlns:p="http://schemas.openxmlformats.org/presentationml/2006/main">
   <p:cSld>
     <p:bg>

</xml_diff>

<commit_message>
done small change over prototype slide notes
</commit_message>
<xml_diff>
--- a/slides/Patrones de diseño con Typescript en el mundo real.pptx
+++ b/slides/Patrones de diseño con Typescript en el mundo real.pptx
@@ -229,7 +229,7 @@
           <a:p>
             <a:fld id="{EE51316C-28F6-4304-8589-C6B7F7B17E4E}" type="datetimeFigureOut">
               <a:rPr lang="es-ES" smtClean="0"/>
-              <a:t>01/11/2019</a:t>
+              <a:t>02/11/2019</a:t>
             </a:fld>
             <a:endParaRPr lang="es-ES"/>
           </a:p>
@@ -2549,116 +2549,6 @@
             </a:pPr>
             <a:r>
               <a:rPr lang="en-US" dirty="0" err="1"/>
-              <a:t>Desde</a:t>
-            </a:r>
-            <a:r>
-              <a:rPr lang="en-US" dirty="0"/>
-              <a:t> el </a:t>
-            </a:r>
-            <a:r>
-              <a:rPr lang="en-US" dirty="0" err="1"/>
-              <a:t>cliente</a:t>
-            </a:r>
-            <a:r>
-              <a:rPr lang="en-US" dirty="0"/>
-              <a:t> </a:t>
-            </a:r>
-            <a:r>
-              <a:rPr lang="en-US" dirty="0" err="1"/>
-              <a:t>sólo</a:t>
-            </a:r>
-            <a:r>
-              <a:rPr lang="en-US" dirty="0"/>
-              <a:t> se </a:t>
-            </a:r>
-            <a:r>
-              <a:rPr lang="en-US" dirty="0" err="1"/>
-              <a:t>conocen</a:t>
-            </a:r>
-            <a:r>
-              <a:rPr lang="en-US" dirty="0"/>
-              <a:t> los </a:t>
-            </a:r>
-            <a:r>
-              <a:rPr lang="en-US" dirty="0" err="1"/>
-              <a:t>métodos</a:t>
-            </a:r>
-            <a:r>
-              <a:rPr lang="en-US" dirty="0"/>
-              <a:t> </a:t>
-            </a:r>
-            <a:r>
-              <a:rPr lang="en-US" dirty="0" err="1"/>
-              <a:t>públicos</a:t>
-            </a:r>
-            <a:r>
-              <a:rPr lang="en-US" dirty="0"/>
-              <a:t> de la </a:t>
-            </a:r>
-            <a:r>
-              <a:rPr lang="en-US" dirty="0" err="1"/>
-              <a:t>interfaz</a:t>
-            </a:r>
-            <a:r>
-              <a:rPr lang="en-US" dirty="0"/>
-              <a:t>, del </a:t>
-            </a:r>
-            <a:r>
-              <a:rPr lang="en-US" dirty="0" err="1"/>
-              <a:t>prototipo</a:t>
-            </a:r>
-            <a:r>
-              <a:rPr lang="en-US" dirty="0"/>
-              <a:t>. Por </a:t>
-            </a:r>
-            <a:r>
-              <a:rPr lang="en-US" dirty="0" err="1"/>
-              <a:t>ejemplo</a:t>
-            </a:r>
-            <a:r>
-              <a:rPr lang="en-US" dirty="0"/>
-              <a:t> </a:t>
-            </a:r>
-            <a:r>
-              <a:rPr lang="en-US" dirty="0" err="1"/>
-              <a:t>su</a:t>
-            </a:r>
-            <a:r>
-              <a:rPr lang="en-US" dirty="0"/>
-              <a:t> </a:t>
-            </a:r>
-            <a:r>
-              <a:rPr lang="en-US" dirty="0" err="1"/>
-              <a:t>habilidad</a:t>
-            </a:r>
-            <a:r>
-              <a:rPr lang="en-US" dirty="0"/>
-              <a:t> de </a:t>
-            </a:r>
-            <a:r>
-              <a:rPr lang="en-US" dirty="0" err="1"/>
-              <a:t>copiarse</a:t>
-            </a:r>
-            <a:r>
-              <a:rPr lang="en-US" dirty="0"/>
-              <a:t>/</a:t>
-            </a:r>
-            <a:r>
-              <a:rPr lang="en-US" dirty="0" err="1"/>
-              <a:t>clonarse</a:t>
-            </a:r>
-            <a:r>
-              <a:rPr lang="en-US" dirty="0"/>
-              <a:t>.</a:t>
-            </a:r>
-          </a:p>
-          <a:p>
-            <a:pPr marL="171450" indent="-171450">
-              <a:buFont typeface="Arial" panose="020B0604020202020204" pitchFamily="34" charset="0"/>
-              <a:buChar char="•"/>
-            </a:pPr>
-            <a:r>
-              <a:rPr lang="en-US" dirty="0" err="1"/>
               <a:t>Permite</a:t>
             </a:r>
             <a:r>
@@ -4420,7 +4310,7 @@
           <a:p>
             <a:fld id="{0985B797-0E29-4660-9B0F-1C71CA65525C}" type="datetimeFigureOut">
               <a:rPr lang="en-US" smtClean="0"/>
-              <a:t>11/1/2019</a:t>
+              <a:t>11/2/2019</a:t>
             </a:fld>
             <a:endParaRPr lang="en-US"/>
           </a:p>
@@ -4620,7 +4510,7 @@
           <a:p>
             <a:fld id="{0985B797-0E29-4660-9B0F-1C71CA65525C}" type="datetimeFigureOut">
               <a:rPr lang="en-US" smtClean="0"/>
-              <a:t>11/1/2019</a:t>
+              <a:t>11/2/2019</a:t>
             </a:fld>
             <a:endParaRPr lang="en-US"/>
           </a:p>
@@ -4830,7 +4720,7 @@
           <a:p>
             <a:fld id="{0985B797-0E29-4660-9B0F-1C71CA65525C}" type="datetimeFigureOut">
               <a:rPr lang="en-US" smtClean="0"/>
-              <a:t>11/1/2019</a:t>
+              <a:t>11/2/2019</a:t>
             </a:fld>
             <a:endParaRPr lang="en-US"/>
           </a:p>
@@ -5030,7 +4920,7 @@
           <a:p>
             <a:fld id="{0985B797-0E29-4660-9B0F-1C71CA65525C}" type="datetimeFigureOut">
               <a:rPr lang="en-US" smtClean="0"/>
-              <a:t>11/1/2019</a:t>
+              <a:t>11/2/2019</a:t>
             </a:fld>
             <a:endParaRPr lang="en-US"/>
           </a:p>
@@ -5306,7 +5196,7 @@
           <a:p>
             <a:fld id="{0985B797-0E29-4660-9B0F-1C71CA65525C}" type="datetimeFigureOut">
               <a:rPr lang="en-US" smtClean="0"/>
-              <a:t>11/1/2019</a:t>
+              <a:t>11/2/2019</a:t>
             </a:fld>
             <a:endParaRPr lang="en-US"/>
           </a:p>
@@ -5574,7 +5464,7 @@
           <a:p>
             <a:fld id="{0985B797-0E29-4660-9B0F-1C71CA65525C}" type="datetimeFigureOut">
               <a:rPr lang="en-US" smtClean="0"/>
-              <a:t>11/1/2019</a:t>
+              <a:t>11/2/2019</a:t>
             </a:fld>
             <a:endParaRPr lang="en-US"/>
           </a:p>
@@ -5989,7 +5879,7 @@
           <a:p>
             <a:fld id="{0985B797-0E29-4660-9B0F-1C71CA65525C}" type="datetimeFigureOut">
               <a:rPr lang="en-US" smtClean="0"/>
-              <a:t>11/1/2019</a:t>
+              <a:t>11/2/2019</a:t>
             </a:fld>
             <a:endParaRPr lang="en-US"/>
           </a:p>
@@ -6131,7 +6021,7 @@
           <a:p>
             <a:fld id="{0985B797-0E29-4660-9B0F-1C71CA65525C}" type="datetimeFigureOut">
               <a:rPr lang="en-US" smtClean="0"/>
-              <a:t>11/1/2019</a:t>
+              <a:t>11/2/2019</a:t>
             </a:fld>
             <a:endParaRPr lang="en-US"/>
           </a:p>
@@ -6244,7 +6134,7 @@
           <a:p>
             <a:fld id="{0985B797-0E29-4660-9B0F-1C71CA65525C}" type="datetimeFigureOut">
               <a:rPr lang="en-US" smtClean="0"/>
-              <a:t>11/1/2019</a:t>
+              <a:t>11/2/2019</a:t>
             </a:fld>
             <a:endParaRPr lang="en-US"/>
           </a:p>
@@ -6557,7 +6447,7 @@
           <a:p>
             <a:fld id="{0985B797-0E29-4660-9B0F-1C71CA65525C}" type="datetimeFigureOut">
               <a:rPr lang="en-US" smtClean="0"/>
-              <a:t>11/1/2019</a:t>
+              <a:t>11/2/2019</a:t>
             </a:fld>
             <a:endParaRPr lang="en-US"/>
           </a:p>
@@ -6846,7 +6736,7 @@
           <a:p>
             <a:fld id="{0985B797-0E29-4660-9B0F-1C71CA65525C}" type="datetimeFigureOut">
               <a:rPr lang="en-US" smtClean="0"/>
-              <a:t>11/1/2019</a:t>
+              <a:t>11/2/2019</a:t>
             </a:fld>
             <a:endParaRPr lang="en-US"/>
           </a:p>
@@ -7089,7 +6979,7 @@
           <a:p>
             <a:fld id="{0985B797-0E29-4660-9B0F-1C71CA65525C}" type="datetimeFigureOut">
               <a:rPr lang="en-US" smtClean="0"/>
-              <a:t>11/1/2019</a:t>
+              <a:t>11/2/2019</a:t>
             </a:fld>
             <a:endParaRPr lang="en-US"/>
           </a:p>

</xml_diff>

<commit_message>
updated JSDay Canarias logo in slides
</commit_message>
<xml_diff>
--- a/slides/Patrones de diseño con Typescript en el mundo real.pptx
+++ b/slides/Patrones de diseño con Typescript en el mundo real.pptx
@@ -229,7 +229,7 @@
           <a:p>
             <a:fld id="{EE51316C-28F6-4304-8589-C6B7F7B17E4E}" type="datetimeFigureOut">
               <a:rPr lang="es-ES" smtClean="0"/>
-              <a:t>02/11/2019</a:t>
+              <a:t>08/11/2019</a:t>
             </a:fld>
             <a:endParaRPr lang="es-ES"/>
           </a:p>
@@ -4310,7 +4310,7 @@
           <a:p>
             <a:fld id="{0985B797-0E29-4660-9B0F-1C71CA65525C}" type="datetimeFigureOut">
               <a:rPr lang="en-US" smtClean="0"/>
-              <a:t>11/2/2019</a:t>
+              <a:t>11/8/2019</a:t>
             </a:fld>
             <a:endParaRPr lang="en-US"/>
           </a:p>
@@ -4510,7 +4510,7 @@
           <a:p>
             <a:fld id="{0985B797-0E29-4660-9B0F-1C71CA65525C}" type="datetimeFigureOut">
               <a:rPr lang="en-US" smtClean="0"/>
-              <a:t>11/2/2019</a:t>
+              <a:t>11/8/2019</a:t>
             </a:fld>
             <a:endParaRPr lang="en-US"/>
           </a:p>
@@ -4720,7 +4720,7 @@
           <a:p>
             <a:fld id="{0985B797-0E29-4660-9B0F-1C71CA65525C}" type="datetimeFigureOut">
               <a:rPr lang="en-US" smtClean="0"/>
-              <a:t>11/2/2019</a:t>
+              <a:t>11/8/2019</a:t>
             </a:fld>
             <a:endParaRPr lang="en-US"/>
           </a:p>
@@ -4920,7 +4920,7 @@
           <a:p>
             <a:fld id="{0985B797-0E29-4660-9B0F-1C71CA65525C}" type="datetimeFigureOut">
               <a:rPr lang="en-US" smtClean="0"/>
-              <a:t>11/2/2019</a:t>
+              <a:t>11/8/2019</a:t>
             </a:fld>
             <a:endParaRPr lang="en-US"/>
           </a:p>
@@ -5196,7 +5196,7 @@
           <a:p>
             <a:fld id="{0985B797-0E29-4660-9B0F-1C71CA65525C}" type="datetimeFigureOut">
               <a:rPr lang="en-US" smtClean="0"/>
-              <a:t>11/2/2019</a:t>
+              <a:t>11/8/2019</a:t>
             </a:fld>
             <a:endParaRPr lang="en-US"/>
           </a:p>
@@ -5464,7 +5464,7 @@
           <a:p>
             <a:fld id="{0985B797-0E29-4660-9B0F-1C71CA65525C}" type="datetimeFigureOut">
               <a:rPr lang="en-US" smtClean="0"/>
-              <a:t>11/2/2019</a:t>
+              <a:t>11/8/2019</a:t>
             </a:fld>
             <a:endParaRPr lang="en-US"/>
           </a:p>
@@ -5879,7 +5879,7 @@
           <a:p>
             <a:fld id="{0985B797-0E29-4660-9B0F-1C71CA65525C}" type="datetimeFigureOut">
               <a:rPr lang="en-US" smtClean="0"/>
-              <a:t>11/2/2019</a:t>
+              <a:t>11/8/2019</a:t>
             </a:fld>
             <a:endParaRPr lang="en-US"/>
           </a:p>
@@ -6021,7 +6021,7 @@
           <a:p>
             <a:fld id="{0985B797-0E29-4660-9B0F-1C71CA65525C}" type="datetimeFigureOut">
               <a:rPr lang="en-US" smtClean="0"/>
-              <a:t>11/2/2019</a:t>
+              <a:t>11/8/2019</a:t>
             </a:fld>
             <a:endParaRPr lang="en-US"/>
           </a:p>
@@ -6134,7 +6134,7 @@
           <a:p>
             <a:fld id="{0985B797-0E29-4660-9B0F-1C71CA65525C}" type="datetimeFigureOut">
               <a:rPr lang="en-US" smtClean="0"/>
-              <a:t>11/2/2019</a:t>
+              <a:t>11/8/2019</a:t>
             </a:fld>
             <a:endParaRPr lang="en-US"/>
           </a:p>
@@ -6447,7 +6447,7 @@
           <a:p>
             <a:fld id="{0985B797-0E29-4660-9B0F-1C71CA65525C}" type="datetimeFigureOut">
               <a:rPr lang="en-US" smtClean="0"/>
-              <a:t>11/2/2019</a:t>
+              <a:t>11/8/2019</a:t>
             </a:fld>
             <a:endParaRPr lang="en-US"/>
           </a:p>
@@ -6736,7 +6736,7 @@
           <a:p>
             <a:fld id="{0985B797-0E29-4660-9B0F-1C71CA65525C}" type="datetimeFigureOut">
               <a:rPr lang="en-US" smtClean="0"/>
-              <a:t>11/2/2019</a:t>
+              <a:t>11/8/2019</a:t>
             </a:fld>
             <a:endParaRPr lang="en-US"/>
           </a:p>
@@ -6979,7 +6979,7 @@
           <a:p>
             <a:fld id="{0985B797-0E29-4660-9B0F-1C71CA65525C}" type="datetimeFigureOut">
               <a:rPr lang="en-US" smtClean="0"/>
-              <a:t>11/2/2019</a:t>
+              <a:t>11/8/2019</a:t>
             </a:fld>
             <a:endParaRPr lang="en-US"/>
           </a:p>
@@ -7404,6 +7404,42 @@
           <a:chExt cx="0" cy="0"/>
         </a:xfrm>
       </p:grpSpPr>
+      <p:pic>
+        <p:nvPicPr>
+          <p:cNvPr id="6" name="Imagen 5" descr="Imagen que contiene dibujo, reloj&#10;&#10;Descripción generada automáticamente">
+            <a:extLst>
+              <a:ext uri="{FF2B5EF4-FFF2-40B4-BE49-F238E27FC236}">
+                <a16:creationId xmlns:a16="http://schemas.microsoft.com/office/drawing/2014/main" id="{0E4268FC-8624-4670-9497-FDE48924CE4B}"/>
+              </a:ext>
+            </a:extLst>
+          </p:cNvPr>
+          <p:cNvPicPr>
+            <a:picLocks noChangeAspect="1"/>
+          </p:cNvPicPr>
+          <p:nvPr/>
+        </p:nvPicPr>
+        <p:blipFill>
+          <a:blip r:embed="rId2">
+            <a:extLst>
+              <a:ext uri="{28A0092B-C50C-407E-A947-70E740481C1C}">
+                <a14:useLocalDpi xmlns:a14="http://schemas.microsoft.com/office/drawing/2010/main" val="0"/>
+              </a:ext>
+            </a:extLst>
+          </a:blip>
+          <a:stretch>
+            <a:fillRect/>
+          </a:stretch>
+        </p:blipFill>
+        <p:spPr>
+          <a:xfrm>
+            <a:off x="863332" y="778396"/>
+            <a:ext cx="4135539" cy="766384"/>
+          </a:xfrm>
+          <a:prstGeom prst="rect">
+            <a:avLst/>
+          </a:prstGeom>
+        </p:spPr>
+      </p:pic>
       <p:sp>
         <p:nvSpPr>
           <p:cNvPr id="2" name="Título 1"/>
@@ -7454,45 +7490,6 @@
           </a:p>
         </p:txBody>
       </p:sp>
-      <p:pic>
-        <p:nvPicPr>
-          <p:cNvPr id="4" name="Graphic 3">
-            <a:extLst>
-              <a:ext uri="{FF2B5EF4-FFF2-40B4-BE49-F238E27FC236}">
-                <a16:creationId xmlns:a16="http://schemas.microsoft.com/office/drawing/2014/main" id="{139EE45F-5F5A-4806-9E1F-03457367F69D}"/>
-              </a:ext>
-            </a:extLst>
-          </p:cNvPr>
-          <p:cNvPicPr>
-            <a:picLocks noChangeAspect="1"/>
-          </p:cNvPicPr>
-          <p:nvPr/>
-        </p:nvPicPr>
-        <p:blipFill>
-          <a:blip r:embed="rId2" cstate="hqprint">
-            <a:extLst>
-              <a:ext uri="{28A0092B-C50C-407E-A947-70E740481C1C}">
-                <a14:useLocalDpi xmlns:a14="http://schemas.microsoft.com/office/drawing/2010/main" val="0"/>
-              </a:ext>
-              <a:ext uri="{96DAC541-7B7A-43D3-8B79-37D633B846F1}">
-                <asvg:svgBlip xmlns:asvg="http://schemas.microsoft.com/office/drawing/2016/SVG/main" r:embed="rId3"/>
-              </a:ext>
-            </a:extLst>
-          </a:blip>
-          <a:stretch>
-            <a:fillRect/>
-          </a:stretch>
-        </p:blipFill>
-        <p:spPr>
-          <a:xfrm>
-            <a:off x="863332" y="778397"/>
-            <a:ext cx="4136663" cy="766383"/>
-          </a:xfrm>
-          <a:prstGeom prst="rect">
-            <a:avLst/>
-          </a:prstGeom>
-        </p:spPr>
-      </p:pic>
       <p:sp>
         <p:nvSpPr>
           <p:cNvPr id="5" name="Marcador de posición de texto 23">
@@ -22235,205 +22232,6 @@
       </p:grpSpPr>
       <p:sp>
         <p:nvSpPr>
-          <p:cNvPr id="4" name="Marcador de posición de texto 26">
-            <a:extLst>
-              <a:ext uri="{FF2B5EF4-FFF2-40B4-BE49-F238E27FC236}">
-                <a16:creationId xmlns:a16="http://schemas.microsoft.com/office/drawing/2014/main" id="{39A58E15-8C27-4298-8EC9-9393BDA37E69}"/>
-              </a:ext>
-            </a:extLst>
-          </p:cNvPr>
-          <p:cNvSpPr>
-            <a:spLocks noGrp="1"/>
-          </p:cNvSpPr>
-          <p:nvPr/>
-        </p:nvSpPr>
-        <p:spPr>
-          <a:xfrm>
-            <a:off x="2389787" y="2326338"/>
-            <a:ext cx="7412426" cy="1234281"/>
-          </a:xfrm>
-          <a:prstGeom prst="rect">
-            <a:avLst/>
-          </a:prstGeom>
-        </p:spPr>
-        <p:txBody>
-          <a:bodyPr vert="horz" lIns="91440" tIns="45720" rIns="91440" bIns="45720" rtlCol="0">
-            <a:noAutofit/>
-          </a:bodyPr>
-          <a:lstStyle>
-            <a:lvl1pPr marL="0" indent="0" algn="l" defTabSz="1828709" rtl="0" eaLnBrk="1" latinLnBrk="0" hangingPunct="1">
-              <a:lnSpc>
-                <a:spcPct val="90000"/>
-              </a:lnSpc>
-              <a:spcBef>
-                <a:spcPts val="2000"/>
-              </a:spcBef>
-              <a:buFont typeface="Arial" panose="020B0604020202020204" pitchFamily="34" charset="0"/>
-              <a:buNone/>
-              <a:defRPr sz="8000" b="1" i="0" kern="1200">
-                <a:solidFill>
-                  <a:schemeClr val="tx1"/>
-                </a:solidFill>
-                <a:latin typeface="Calibri" panose="020F0502020204030204" pitchFamily="34" charset="0"/>
-                <a:ea typeface="+mn-ea"/>
-                <a:cs typeface="Calibri" panose="020F0502020204030204" pitchFamily="34" charset="0"/>
-              </a:defRPr>
-            </a:lvl1pPr>
-            <a:lvl2pPr marL="914354" indent="0" algn="l" defTabSz="1828709" rtl="0" eaLnBrk="1" latinLnBrk="0" hangingPunct="1">
-              <a:lnSpc>
-                <a:spcPct val="90000"/>
-              </a:lnSpc>
-              <a:spcBef>
-                <a:spcPts val="1000"/>
-              </a:spcBef>
-              <a:buFont typeface="Arial" panose="020B0604020202020204" pitchFamily="34" charset="0"/>
-              <a:buNone/>
-              <a:defRPr sz="8000" b="1" i="0" kern="1200">
-                <a:solidFill>
-                  <a:schemeClr val="tx1"/>
-                </a:solidFill>
-                <a:latin typeface="Calibri" panose="020F0502020204030204" pitchFamily="34" charset="0"/>
-                <a:ea typeface="+mn-ea"/>
-                <a:cs typeface="Calibri" panose="020F0502020204030204" pitchFamily="34" charset="0"/>
-              </a:defRPr>
-            </a:lvl2pPr>
-            <a:lvl3pPr marL="1828709" indent="0" algn="l" defTabSz="1828709" rtl="0" eaLnBrk="1" latinLnBrk="0" hangingPunct="1">
-              <a:lnSpc>
-                <a:spcPct val="90000"/>
-              </a:lnSpc>
-              <a:spcBef>
-                <a:spcPts val="1000"/>
-              </a:spcBef>
-              <a:buFont typeface="Arial" panose="020B0604020202020204" pitchFamily="34" charset="0"/>
-              <a:buNone/>
-              <a:defRPr sz="8000" b="1" i="0" kern="1200">
-                <a:solidFill>
-                  <a:schemeClr val="tx1"/>
-                </a:solidFill>
-                <a:latin typeface="Calibri" panose="020F0502020204030204" pitchFamily="34" charset="0"/>
-                <a:ea typeface="+mn-ea"/>
-                <a:cs typeface="Calibri" panose="020F0502020204030204" pitchFamily="34" charset="0"/>
-              </a:defRPr>
-            </a:lvl3pPr>
-            <a:lvl4pPr marL="2743063" indent="0" algn="l" defTabSz="1828709" rtl="0" eaLnBrk="1" latinLnBrk="0" hangingPunct="1">
-              <a:lnSpc>
-                <a:spcPct val="90000"/>
-              </a:lnSpc>
-              <a:spcBef>
-                <a:spcPts val="1000"/>
-              </a:spcBef>
-              <a:buFont typeface="Arial" panose="020B0604020202020204" pitchFamily="34" charset="0"/>
-              <a:buNone/>
-              <a:defRPr sz="8000" b="1" i="0" kern="1200">
-                <a:solidFill>
-                  <a:schemeClr val="tx1"/>
-                </a:solidFill>
-                <a:latin typeface="Calibri" panose="020F0502020204030204" pitchFamily="34" charset="0"/>
-                <a:ea typeface="+mn-ea"/>
-                <a:cs typeface="Calibri" panose="020F0502020204030204" pitchFamily="34" charset="0"/>
-              </a:defRPr>
-            </a:lvl4pPr>
-            <a:lvl5pPr marL="3657417" indent="0" algn="l" defTabSz="1828709" rtl="0" eaLnBrk="1" latinLnBrk="0" hangingPunct="1">
-              <a:lnSpc>
-                <a:spcPct val="90000"/>
-              </a:lnSpc>
-              <a:spcBef>
-                <a:spcPts val="1000"/>
-              </a:spcBef>
-              <a:buFont typeface="Arial" panose="020B0604020202020204" pitchFamily="34" charset="0"/>
-              <a:buNone/>
-              <a:defRPr sz="8000" b="1" i="0" kern="1200">
-                <a:solidFill>
-                  <a:schemeClr val="tx1"/>
-                </a:solidFill>
-                <a:latin typeface="Calibri" panose="020F0502020204030204" pitchFamily="34" charset="0"/>
-                <a:ea typeface="+mn-ea"/>
-                <a:cs typeface="Calibri" panose="020F0502020204030204" pitchFamily="34" charset="0"/>
-              </a:defRPr>
-            </a:lvl5pPr>
-            <a:lvl6pPr marL="5028949" indent="-457177" algn="l" defTabSz="1828709" rtl="0" eaLnBrk="1" latinLnBrk="0" hangingPunct="1">
-              <a:lnSpc>
-                <a:spcPct val="90000"/>
-              </a:lnSpc>
-              <a:spcBef>
-                <a:spcPts val="1000"/>
-              </a:spcBef>
-              <a:buFont typeface="Arial" panose="020B0604020202020204" pitchFamily="34" charset="0"/>
-              <a:buChar char="•"/>
-              <a:defRPr sz="3600" kern="1200">
-                <a:solidFill>
-                  <a:schemeClr val="tx1"/>
-                </a:solidFill>
-                <a:latin typeface="+mn-lt"/>
-                <a:ea typeface="+mn-ea"/>
-                <a:cs typeface="+mn-cs"/>
-              </a:defRPr>
-            </a:lvl6pPr>
-            <a:lvl7pPr marL="5943303" indent="-457177" algn="l" defTabSz="1828709" rtl="0" eaLnBrk="1" latinLnBrk="0" hangingPunct="1">
-              <a:lnSpc>
-                <a:spcPct val="90000"/>
-              </a:lnSpc>
-              <a:spcBef>
-                <a:spcPts val="1000"/>
-              </a:spcBef>
-              <a:buFont typeface="Arial" panose="020B0604020202020204" pitchFamily="34" charset="0"/>
-              <a:buChar char="•"/>
-              <a:defRPr sz="3600" kern="1200">
-                <a:solidFill>
-                  <a:schemeClr val="tx1"/>
-                </a:solidFill>
-                <a:latin typeface="+mn-lt"/>
-                <a:ea typeface="+mn-ea"/>
-                <a:cs typeface="+mn-cs"/>
-              </a:defRPr>
-            </a:lvl7pPr>
-            <a:lvl8pPr marL="6857657" indent="-457177" algn="l" defTabSz="1828709" rtl="0" eaLnBrk="1" latinLnBrk="0" hangingPunct="1">
-              <a:lnSpc>
-                <a:spcPct val="90000"/>
-              </a:lnSpc>
-              <a:spcBef>
-                <a:spcPts val="1000"/>
-              </a:spcBef>
-              <a:buFont typeface="Arial" panose="020B0604020202020204" pitchFamily="34" charset="0"/>
-              <a:buChar char="•"/>
-              <a:defRPr sz="3600" kern="1200">
-                <a:solidFill>
-                  <a:schemeClr val="tx1"/>
-                </a:solidFill>
-                <a:latin typeface="+mn-lt"/>
-                <a:ea typeface="+mn-ea"/>
-                <a:cs typeface="+mn-cs"/>
-              </a:defRPr>
-            </a:lvl8pPr>
-            <a:lvl9pPr marL="7772011" indent="-457177" algn="l" defTabSz="1828709" rtl="0" eaLnBrk="1" latinLnBrk="0" hangingPunct="1">
-              <a:lnSpc>
-                <a:spcPct val="90000"/>
-              </a:lnSpc>
-              <a:spcBef>
-                <a:spcPts val="1000"/>
-              </a:spcBef>
-              <a:buFont typeface="Arial" panose="020B0604020202020204" pitchFamily="34" charset="0"/>
-              <a:buChar char="•"/>
-              <a:defRPr sz="3600" kern="1200">
-                <a:solidFill>
-                  <a:schemeClr val="tx1"/>
-                </a:solidFill>
-                <a:latin typeface="+mn-lt"/>
-                <a:ea typeface="+mn-ea"/>
-                <a:cs typeface="+mn-cs"/>
-              </a:defRPr>
-            </a:lvl9pPr>
-          </a:lstStyle>
-          <a:p>
-            <a:r>
-              <a:rPr lang="es-ES" dirty="0"/>
-              <a:t>¡Muchas gracias!</a:t>
-            </a:r>
-          </a:p>
-        </p:txBody>
-      </p:sp>
-      <p:sp>
-        <p:nvSpPr>
           <p:cNvPr id="6" name="Rectangle 5">
             <a:extLst>
               <a:ext uri="{FF2B5EF4-FFF2-40B4-BE49-F238E27FC236}">
@@ -22483,10 +22281,10 @@
       </p:sp>
       <p:pic>
         <p:nvPicPr>
-          <p:cNvPr id="7" name="Graphic 6">
-            <a:extLst>
-              <a:ext uri="{FF2B5EF4-FFF2-40B4-BE49-F238E27FC236}">
-                <a16:creationId xmlns:a16="http://schemas.microsoft.com/office/drawing/2014/main" id="{20F4E7B3-C185-4485-829A-F2608A2BA392}"/>
+          <p:cNvPr id="8" name="Imagen 7" descr="Imagen que contiene dibujo, reloj&#10;&#10;Descripción generada automáticamente">
+            <a:extLst>
+              <a:ext uri="{FF2B5EF4-FFF2-40B4-BE49-F238E27FC236}">
+                <a16:creationId xmlns:a16="http://schemas.microsoft.com/office/drawing/2014/main" id="{5D440C69-C7C3-479B-A4D6-674FFFDA1973}"/>
               </a:ext>
             </a:extLst>
           </p:cNvPr>
@@ -22496,13 +22294,10 @@
           <p:nvPr/>
         </p:nvPicPr>
         <p:blipFill>
-          <a:blip r:embed="rId2" cstate="hqprint">
+          <a:blip r:embed="rId2">
             <a:extLst>
               <a:ext uri="{28A0092B-C50C-407E-A947-70E740481C1C}">
                 <a14:useLocalDpi xmlns:a14="http://schemas.microsoft.com/office/drawing/2010/main" val="0"/>
-              </a:ext>
-              <a:ext uri="{96DAC541-7B7A-43D3-8B79-37D633B846F1}">
-                <asvg:svgBlip xmlns:asvg="http://schemas.microsoft.com/office/drawing/2016/SVG/main" r:embed="rId3"/>
               </a:ext>
             </a:extLst>
           </a:blip>
@@ -22512,14 +22307,213 @@
         </p:blipFill>
         <p:spPr>
           <a:xfrm>
-            <a:off x="630461" y="5477261"/>
-            <a:ext cx="4809916" cy="891114"/>
+            <a:off x="630461" y="5463611"/>
+            <a:ext cx="4808598" cy="891113"/>
           </a:xfrm>
           <a:prstGeom prst="rect">
             <a:avLst/>
           </a:prstGeom>
         </p:spPr>
       </p:pic>
+      <p:sp>
+        <p:nvSpPr>
+          <p:cNvPr id="4" name="Marcador de posición de texto 26">
+            <a:extLst>
+              <a:ext uri="{FF2B5EF4-FFF2-40B4-BE49-F238E27FC236}">
+                <a16:creationId xmlns:a16="http://schemas.microsoft.com/office/drawing/2014/main" id="{39A58E15-8C27-4298-8EC9-9393BDA37E69}"/>
+              </a:ext>
+            </a:extLst>
+          </p:cNvPr>
+          <p:cNvSpPr>
+            <a:spLocks noGrp="1"/>
+          </p:cNvSpPr>
+          <p:nvPr/>
+        </p:nvSpPr>
+        <p:spPr>
+          <a:xfrm>
+            <a:off x="2389787" y="2326338"/>
+            <a:ext cx="7412426" cy="1234281"/>
+          </a:xfrm>
+          <a:prstGeom prst="rect">
+            <a:avLst/>
+          </a:prstGeom>
+        </p:spPr>
+        <p:txBody>
+          <a:bodyPr vert="horz" lIns="91440" tIns="45720" rIns="91440" bIns="45720" rtlCol="0">
+            <a:noAutofit/>
+          </a:bodyPr>
+          <a:lstStyle>
+            <a:lvl1pPr marL="0" indent="0" algn="l" defTabSz="1828709" rtl="0" eaLnBrk="1" latinLnBrk="0" hangingPunct="1">
+              <a:lnSpc>
+                <a:spcPct val="90000"/>
+              </a:lnSpc>
+              <a:spcBef>
+                <a:spcPts val="2000"/>
+              </a:spcBef>
+              <a:buFont typeface="Arial" panose="020B0604020202020204" pitchFamily="34" charset="0"/>
+              <a:buNone/>
+              <a:defRPr sz="8000" b="1" i="0" kern="1200">
+                <a:solidFill>
+                  <a:schemeClr val="tx1"/>
+                </a:solidFill>
+                <a:latin typeface="Calibri" panose="020F0502020204030204" pitchFamily="34" charset="0"/>
+                <a:ea typeface="+mn-ea"/>
+                <a:cs typeface="Calibri" panose="020F0502020204030204" pitchFamily="34" charset="0"/>
+              </a:defRPr>
+            </a:lvl1pPr>
+            <a:lvl2pPr marL="914354" indent="0" algn="l" defTabSz="1828709" rtl="0" eaLnBrk="1" latinLnBrk="0" hangingPunct="1">
+              <a:lnSpc>
+                <a:spcPct val="90000"/>
+              </a:lnSpc>
+              <a:spcBef>
+                <a:spcPts val="1000"/>
+              </a:spcBef>
+              <a:buFont typeface="Arial" panose="020B0604020202020204" pitchFamily="34" charset="0"/>
+              <a:buNone/>
+              <a:defRPr sz="8000" b="1" i="0" kern="1200">
+                <a:solidFill>
+                  <a:schemeClr val="tx1"/>
+                </a:solidFill>
+                <a:latin typeface="Calibri" panose="020F0502020204030204" pitchFamily="34" charset="0"/>
+                <a:ea typeface="+mn-ea"/>
+                <a:cs typeface="Calibri" panose="020F0502020204030204" pitchFamily="34" charset="0"/>
+              </a:defRPr>
+            </a:lvl2pPr>
+            <a:lvl3pPr marL="1828709" indent="0" algn="l" defTabSz="1828709" rtl="0" eaLnBrk="1" latinLnBrk="0" hangingPunct="1">
+              <a:lnSpc>
+                <a:spcPct val="90000"/>
+              </a:lnSpc>
+              <a:spcBef>
+                <a:spcPts val="1000"/>
+              </a:spcBef>
+              <a:buFont typeface="Arial" panose="020B0604020202020204" pitchFamily="34" charset="0"/>
+              <a:buNone/>
+              <a:defRPr sz="8000" b="1" i="0" kern="1200">
+                <a:solidFill>
+                  <a:schemeClr val="tx1"/>
+                </a:solidFill>
+                <a:latin typeface="Calibri" panose="020F0502020204030204" pitchFamily="34" charset="0"/>
+                <a:ea typeface="+mn-ea"/>
+                <a:cs typeface="Calibri" panose="020F0502020204030204" pitchFamily="34" charset="0"/>
+              </a:defRPr>
+            </a:lvl3pPr>
+            <a:lvl4pPr marL="2743063" indent="0" algn="l" defTabSz="1828709" rtl="0" eaLnBrk="1" latinLnBrk="0" hangingPunct="1">
+              <a:lnSpc>
+                <a:spcPct val="90000"/>
+              </a:lnSpc>
+              <a:spcBef>
+                <a:spcPts val="1000"/>
+              </a:spcBef>
+              <a:buFont typeface="Arial" panose="020B0604020202020204" pitchFamily="34" charset="0"/>
+              <a:buNone/>
+              <a:defRPr sz="8000" b="1" i="0" kern="1200">
+                <a:solidFill>
+                  <a:schemeClr val="tx1"/>
+                </a:solidFill>
+                <a:latin typeface="Calibri" panose="020F0502020204030204" pitchFamily="34" charset="0"/>
+                <a:ea typeface="+mn-ea"/>
+                <a:cs typeface="Calibri" panose="020F0502020204030204" pitchFamily="34" charset="0"/>
+              </a:defRPr>
+            </a:lvl4pPr>
+            <a:lvl5pPr marL="3657417" indent="0" algn="l" defTabSz="1828709" rtl="0" eaLnBrk="1" latinLnBrk="0" hangingPunct="1">
+              <a:lnSpc>
+                <a:spcPct val="90000"/>
+              </a:lnSpc>
+              <a:spcBef>
+                <a:spcPts val="1000"/>
+              </a:spcBef>
+              <a:buFont typeface="Arial" panose="020B0604020202020204" pitchFamily="34" charset="0"/>
+              <a:buNone/>
+              <a:defRPr sz="8000" b="1" i="0" kern="1200">
+                <a:solidFill>
+                  <a:schemeClr val="tx1"/>
+                </a:solidFill>
+                <a:latin typeface="Calibri" panose="020F0502020204030204" pitchFamily="34" charset="0"/>
+                <a:ea typeface="+mn-ea"/>
+                <a:cs typeface="Calibri" panose="020F0502020204030204" pitchFamily="34" charset="0"/>
+              </a:defRPr>
+            </a:lvl5pPr>
+            <a:lvl6pPr marL="5028949" indent="-457177" algn="l" defTabSz="1828709" rtl="0" eaLnBrk="1" latinLnBrk="0" hangingPunct="1">
+              <a:lnSpc>
+                <a:spcPct val="90000"/>
+              </a:lnSpc>
+              <a:spcBef>
+                <a:spcPts val="1000"/>
+              </a:spcBef>
+              <a:buFont typeface="Arial" panose="020B0604020202020204" pitchFamily="34" charset="0"/>
+              <a:buChar char="•"/>
+              <a:defRPr sz="3600" kern="1200">
+                <a:solidFill>
+                  <a:schemeClr val="tx1"/>
+                </a:solidFill>
+                <a:latin typeface="+mn-lt"/>
+                <a:ea typeface="+mn-ea"/>
+                <a:cs typeface="+mn-cs"/>
+              </a:defRPr>
+            </a:lvl6pPr>
+            <a:lvl7pPr marL="5943303" indent="-457177" algn="l" defTabSz="1828709" rtl="0" eaLnBrk="1" latinLnBrk="0" hangingPunct="1">
+              <a:lnSpc>
+                <a:spcPct val="90000"/>
+              </a:lnSpc>
+              <a:spcBef>
+                <a:spcPts val="1000"/>
+              </a:spcBef>
+              <a:buFont typeface="Arial" panose="020B0604020202020204" pitchFamily="34" charset="0"/>
+              <a:buChar char="•"/>
+              <a:defRPr sz="3600" kern="1200">
+                <a:solidFill>
+                  <a:schemeClr val="tx1"/>
+                </a:solidFill>
+                <a:latin typeface="+mn-lt"/>
+                <a:ea typeface="+mn-ea"/>
+                <a:cs typeface="+mn-cs"/>
+              </a:defRPr>
+            </a:lvl7pPr>
+            <a:lvl8pPr marL="6857657" indent="-457177" algn="l" defTabSz="1828709" rtl="0" eaLnBrk="1" latinLnBrk="0" hangingPunct="1">
+              <a:lnSpc>
+                <a:spcPct val="90000"/>
+              </a:lnSpc>
+              <a:spcBef>
+                <a:spcPts val="1000"/>
+              </a:spcBef>
+              <a:buFont typeface="Arial" panose="020B0604020202020204" pitchFamily="34" charset="0"/>
+              <a:buChar char="•"/>
+              <a:defRPr sz="3600" kern="1200">
+                <a:solidFill>
+                  <a:schemeClr val="tx1"/>
+                </a:solidFill>
+                <a:latin typeface="+mn-lt"/>
+                <a:ea typeface="+mn-ea"/>
+                <a:cs typeface="+mn-cs"/>
+              </a:defRPr>
+            </a:lvl8pPr>
+            <a:lvl9pPr marL="7772011" indent="-457177" algn="l" defTabSz="1828709" rtl="0" eaLnBrk="1" latinLnBrk="0" hangingPunct="1">
+              <a:lnSpc>
+                <a:spcPct val="90000"/>
+              </a:lnSpc>
+              <a:spcBef>
+                <a:spcPts val="1000"/>
+              </a:spcBef>
+              <a:buFont typeface="Arial" panose="020B0604020202020204" pitchFamily="34" charset="0"/>
+              <a:buChar char="•"/>
+              <a:defRPr sz="3600" kern="1200">
+                <a:solidFill>
+                  <a:schemeClr val="tx1"/>
+                </a:solidFill>
+                <a:latin typeface="+mn-lt"/>
+                <a:ea typeface="+mn-ea"/>
+                <a:cs typeface="+mn-cs"/>
+              </a:defRPr>
+            </a:lvl9pPr>
+          </a:lstStyle>
+          <a:p>
+            <a:r>
+              <a:rPr lang="es-ES" dirty="0"/>
+              <a:t>¡Muchas gracias!</a:t>
+            </a:r>
+          </a:p>
+        </p:txBody>
+      </p:sp>
       <p:sp>
         <p:nvSpPr>
           <p:cNvPr id="5" name="Marcador de posición de texto 23">

</xml_diff>

<commit_message>
added bold font to wikipedia definition slide
</commit_message>
<xml_diff>
--- a/slides/Patrones de diseño con Typescript en el mundo real.pptx
+++ b/slides/Patrones de diseño con Typescript en el mundo real.pptx
@@ -231,7 +231,7 @@
           <a:p>
             <a:fld id="{EE51316C-28F6-4304-8589-C6B7F7B17E4E}" type="datetimeFigureOut">
               <a:rPr lang="es-ES" smtClean="0"/>
-              <a:t>08/11/2019</a:t>
+              <a:t>09/11/2019</a:t>
             </a:fld>
             <a:endParaRPr lang="es-ES"/>
           </a:p>
@@ -4400,7 +4400,7 @@
           <a:p>
             <a:fld id="{0985B797-0E29-4660-9B0F-1C71CA65525C}" type="datetimeFigureOut">
               <a:rPr lang="en-US" smtClean="0"/>
-              <a:t>11/8/2019</a:t>
+              <a:t>11/9/2019</a:t>
             </a:fld>
             <a:endParaRPr lang="en-US"/>
           </a:p>
@@ -4600,7 +4600,7 @@
           <a:p>
             <a:fld id="{0985B797-0E29-4660-9B0F-1C71CA65525C}" type="datetimeFigureOut">
               <a:rPr lang="en-US" smtClean="0"/>
-              <a:t>11/8/2019</a:t>
+              <a:t>11/9/2019</a:t>
             </a:fld>
             <a:endParaRPr lang="en-US"/>
           </a:p>
@@ -4810,7 +4810,7 @@
           <a:p>
             <a:fld id="{0985B797-0E29-4660-9B0F-1C71CA65525C}" type="datetimeFigureOut">
               <a:rPr lang="en-US" smtClean="0"/>
-              <a:t>11/8/2019</a:t>
+              <a:t>11/9/2019</a:t>
             </a:fld>
             <a:endParaRPr lang="en-US"/>
           </a:p>
@@ -5010,7 +5010,7 @@
           <a:p>
             <a:fld id="{0985B797-0E29-4660-9B0F-1C71CA65525C}" type="datetimeFigureOut">
               <a:rPr lang="en-US" smtClean="0"/>
-              <a:t>11/8/2019</a:t>
+              <a:t>11/9/2019</a:t>
             </a:fld>
             <a:endParaRPr lang="en-US"/>
           </a:p>
@@ -5286,7 +5286,7 @@
           <a:p>
             <a:fld id="{0985B797-0E29-4660-9B0F-1C71CA65525C}" type="datetimeFigureOut">
               <a:rPr lang="en-US" smtClean="0"/>
-              <a:t>11/8/2019</a:t>
+              <a:t>11/9/2019</a:t>
             </a:fld>
             <a:endParaRPr lang="en-US"/>
           </a:p>
@@ -5554,7 +5554,7 @@
           <a:p>
             <a:fld id="{0985B797-0E29-4660-9B0F-1C71CA65525C}" type="datetimeFigureOut">
               <a:rPr lang="en-US" smtClean="0"/>
-              <a:t>11/8/2019</a:t>
+              <a:t>11/9/2019</a:t>
             </a:fld>
             <a:endParaRPr lang="en-US"/>
           </a:p>
@@ -5969,7 +5969,7 @@
           <a:p>
             <a:fld id="{0985B797-0E29-4660-9B0F-1C71CA65525C}" type="datetimeFigureOut">
               <a:rPr lang="en-US" smtClean="0"/>
-              <a:t>11/8/2019</a:t>
+              <a:t>11/9/2019</a:t>
             </a:fld>
             <a:endParaRPr lang="en-US"/>
           </a:p>
@@ -6111,7 +6111,7 @@
           <a:p>
             <a:fld id="{0985B797-0E29-4660-9B0F-1C71CA65525C}" type="datetimeFigureOut">
               <a:rPr lang="en-US" smtClean="0"/>
-              <a:t>11/8/2019</a:t>
+              <a:t>11/9/2019</a:t>
             </a:fld>
             <a:endParaRPr lang="en-US"/>
           </a:p>
@@ -6224,7 +6224,7 @@
           <a:p>
             <a:fld id="{0985B797-0E29-4660-9B0F-1C71CA65525C}" type="datetimeFigureOut">
               <a:rPr lang="en-US" smtClean="0"/>
-              <a:t>11/8/2019</a:t>
+              <a:t>11/9/2019</a:t>
             </a:fld>
             <a:endParaRPr lang="en-US"/>
           </a:p>
@@ -6537,7 +6537,7 @@
           <a:p>
             <a:fld id="{0985B797-0E29-4660-9B0F-1C71CA65525C}" type="datetimeFigureOut">
               <a:rPr lang="en-US" smtClean="0"/>
-              <a:t>11/8/2019</a:t>
+              <a:t>11/9/2019</a:t>
             </a:fld>
             <a:endParaRPr lang="en-US"/>
           </a:p>
@@ -6826,7 +6826,7 @@
           <a:p>
             <a:fld id="{0985B797-0E29-4660-9B0F-1C71CA65525C}" type="datetimeFigureOut">
               <a:rPr lang="en-US" smtClean="0"/>
-              <a:t>11/8/2019</a:t>
+              <a:t>11/9/2019</a:t>
             </a:fld>
             <a:endParaRPr lang="en-US"/>
           </a:p>
@@ -7069,7 +7069,7 @@
           <a:p>
             <a:fld id="{0985B797-0E29-4660-9B0F-1C71CA65525C}" type="datetimeFigureOut">
               <a:rPr lang="en-US" smtClean="0"/>
-              <a:t>11/8/2019</a:t>
+              <a:t>11/9/2019</a:t>
             </a:fld>
             <a:endParaRPr lang="en-US"/>
           </a:p>
@@ -23709,7 +23709,15 @@
             </a:pPr>
             <a:r>
               <a:rPr lang="es-ES" i="1" dirty="0"/>
-              <a:t>Los patrones de diseño son unas técnicas para resolver problemas comunes en el desarrollo de software y otros ámbitos referentes al diseño de interacción o interfaces.</a:t>
+              <a:t>Los patrones de diseño son unas </a:t>
+            </a:r>
+            <a:r>
+              <a:rPr lang="es-ES" b="1" i="1" dirty="0"/>
+              <a:t>técnicas para resolver problemas comunes en el desarrollo de software</a:t>
+            </a:r>
+            <a:r>
+              <a:rPr lang="es-ES" i="1" dirty="0"/>
+              <a:t> y otros ámbitos referentes al diseño de interacción o interfaces.</a:t>
             </a:r>
           </a:p>
           <a:p>
@@ -23724,8 +23732,37 @@
             </a:pPr>
             <a:r>
               <a:rPr lang="es-ES" i="1" dirty="0"/>
-              <a:t>Un patrón de diseño resulta ser una solución a un problema de diseño. Para que una solución sea considerada un patrón debe poseer ciertas características. Una de ellas es que debe haber comprobado su efectividad resolviendo problemas similares en ocasiones anteriores. Otra es que debe ser reutilizable, lo que significa que es aplicable a diferentes problemas de diseño en distintas circunstancias</a:t>
-            </a:r>
+              <a:t>Un patrón de diseño resulta ser una </a:t>
+            </a:r>
+            <a:r>
+              <a:rPr lang="es-ES" b="1" i="1" dirty="0"/>
+              <a:t>solución a un problema de diseño</a:t>
+            </a:r>
+            <a:r>
+              <a:rPr lang="es-ES" i="1" dirty="0"/>
+              <a:t>. Para que una solución sea considerada un patrón debe poseer ciertas características. Una de ellas es que </a:t>
+            </a:r>
+            <a:r>
+              <a:rPr lang="es-ES" b="1" i="1" dirty="0"/>
+              <a:t>debe haber comprobado su efectividad</a:t>
+            </a:r>
+            <a:r>
+              <a:rPr lang="es-ES" i="1" dirty="0"/>
+              <a:t> resolviendo problemas similares en ocasiones anteriores. Otra es que </a:t>
+            </a:r>
+            <a:r>
+              <a:rPr lang="es-ES" b="1" i="1" dirty="0"/>
+              <a:t>debe ser reutilizable</a:t>
+            </a:r>
+            <a:r>
+              <a:rPr lang="es-ES" i="1" dirty="0"/>
+              <a:t>, lo que significa que es aplicable a diferentes problemas de diseño en </a:t>
+            </a:r>
+            <a:r>
+              <a:rPr lang="es-ES" i="1"/>
+              <a:t>distintas circunstancias.</a:t>
+            </a:r>
+            <a:endParaRPr lang="es-ES" i="1" dirty="0"/>
           </a:p>
           <a:p>
             <a:pPr marL="0" indent="0">

</xml_diff>

<commit_message>
fixed factory method with params slide
</commit_message>
<xml_diff>
--- a/slides/Patrones de diseño con Typescript en el mundo real.pptx
+++ b/slides/Patrones de diseño con Typescript en el mundo real.pptx
@@ -233,7 +233,7 @@
           <a:p>
             <a:fld id="{EE51316C-28F6-4304-8589-C6B7F7B17E4E}" type="datetimeFigureOut">
               <a:rPr lang="es-ES" smtClean="0"/>
-              <a:t>18/01/2020</a:t>
+              <a:t>19/01/2020</a:t>
             </a:fld>
             <a:endParaRPr lang="es-ES"/>
           </a:p>
@@ -4680,7 +4680,7 @@
           <a:p>
             <a:fld id="{0985B797-0E29-4660-9B0F-1C71CA65525C}" type="datetimeFigureOut">
               <a:rPr lang="en-US" smtClean="0"/>
-              <a:t>1/18/2020</a:t>
+              <a:t>1/19/2020</a:t>
             </a:fld>
             <a:endParaRPr lang="en-US"/>
           </a:p>
@@ -4880,7 +4880,7 @@
           <a:p>
             <a:fld id="{0985B797-0E29-4660-9B0F-1C71CA65525C}" type="datetimeFigureOut">
               <a:rPr lang="en-US" smtClean="0"/>
-              <a:t>1/18/2020</a:t>
+              <a:t>1/19/2020</a:t>
             </a:fld>
             <a:endParaRPr lang="en-US"/>
           </a:p>
@@ -5090,7 +5090,7 @@
           <a:p>
             <a:fld id="{0985B797-0E29-4660-9B0F-1C71CA65525C}" type="datetimeFigureOut">
               <a:rPr lang="en-US" smtClean="0"/>
-              <a:t>1/18/2020</a:t>
+              <a:t>1/19/2020</a:t>
             </a:fld>
             <a:endParaRPr lang="en-US"/>
           </a:p>
@@ -5290,7 +5290,7 @@
           <a:p>
             <a:fld id="{0985B797-0E29-4660-9B0F-1C71CA65525C}" type="datetimeFigureOut">
               <a:rPr lang="en-US" smtClean="0"/>
-              <a:t>1/18/2020</a:t>
+              <a:t>1/19/2020</a:t>
             </a:fld>
             <a:endParaRPr lang="en-US"/>
           </a:p>
@@ -5566,7 +5566,7 @@
           <a:p>
             <a:fld id="{0985B797-0E29-4660-9B0F-1C71CA65525C}" type="datetimeFigureOut">
               <a:rPr lang="en-US" smtClean="0"/>
-              <a:t>1/18/2020</a:t>
+              <a:t>1/19/2020</a:t>
             </a:fld>
             <a:endParaRPr lang="en-US"/>
           </a:p>
@@ -5834,7 +5834,7 @@
           <a:p>
             <a:fld id="{0985B797-0E29-4660-9B0F-1C71CA65525C}" type="datetimeFigureOut">
               <a:rPr lang="en-US" smtClean="0"/>
-              <a:t>1/18/2020</a:t>
+              <a:t>1/19/2020</a:t>
             </a:fld>
             <a:endParaRPr lang="en-US"/>
           </a:p>
@@ -6249,7 +6249,7 @@
           <a:p>
             <a:fld id="{0985B797-0E29-4660-9B0F-1C71CA65525C}" type="datetimeFigureOut">
               <a:rPr lang="en-US" smtClean="0"/>
-              <a:t>1/18/2020</a:t>
+              <a:t>1/19/2020</a:t>
             </a:fld>
             <a:endParaRPr lang="en-US"/>
           </a:p>
@@ -6391,7 +6391,7 @@
           <a:p>
             <a:fld id="{0985B797-0E29-4660-9B0F-1C71CA65525C}" type="datetimeFigureOut">
               <a:rPr lang="en-US" smtClean="0"/>
-              <a:t>1/18/2020</a:t>
+              <a:t>1/19/2020</a:t>
             </a:fld>
             <a:endParaRPr lang="en-US"/>
           </a:p>
@@ -6504,7 +6504,7 @@
           <a:p>
             <a:fld id="{0985B797-0E29-4660-9B0F-1C71CA65525C}" type="datetimeFigureOut">
               <a:rPr lang="en-US" smtClean="0"/>
-              <a:t>1/18/2020</a:t>
+              <a:t>1/19/2020</a:t>
             </a:fld>
             <a:endParaRPr lang="en-US"/>
           </a:p>
@@ -6817,7 +6817,7 @@
           <a:p>
             <a:fld id="{0985B797-0E29-4660-9B0F-1C71CA65525C}" type="datetimeFigureOut">
               <a:rPr lang="en-US" smtClean="0"/>
-              <a:t>1/18/2020</a:t>
+              <a:t>1/19/2020</a:t>
             </a:fld>
             <a:endParaRPr lang="en-US"/>
           </a:p>
@@ -7106,7 +7106,7 @@
           <a:p>
             <a:fld id="{0985B797-0E29-4660-9B0F-1C71CA65525C}" type="datetimeFigureOut">
               <a:rPr lang="en-US" smtClean="0"/>
-              <a:t>1/18/2020</a:t>
+              <a:t>1/19/2020</a:t>
             </a:fld>
             <a:endParaRPr lang="en-US"/>
           </a:p>
@@ -7349,7 +7349,7 @@
           <a:p>
             <a:fld id="{0985B797-0E29-4660-9B0F-1C71CA65525C}" type="datetimeFigureOut">
               <a:rPr lang="en-US" smtClean="0"/>
-              <a:t>1/18/2020</a:t>
+              <a:t>1/19/2020</a:t>
             </a:fld>
             <a:endParaRPr lang="en-US"/>
           </a:p>
@@ -27540,15 +27540,14 @@
           </p:cNvPr>
           <p:cNvCxnSpPr>
             <a:cxnSpLocks/>
-            <a:stCxn id="28" idx="3"/>
             <a:endCxn id="6" idx="1"/>
           </p:cNvCxnSpPr>
           <p:nvPr/>
         </p:nvCxnSpPr>
         <p:spPr>
-          <a:xfrm flipV="1">
-            <a:off x="6816436" y="1416526"/>
-            <a:ext cx="2576060" cy="5610"/>
+          <a:xfrm>
+            <a:off x="5624137" y="1407529"/>
+            <a:ext cx="3768359" cy="8997"/>
           </a:xfrm>
           <a:prstGeom prst="straightConnector1">
             <a:avLst/>
@@ -27589,7 +27588,7 @@
         </p:nvSpPr>
         <p:spPr>
           <a:xfrm>
-            <a:off x="5647285" y="1252859"/>
+            <a:off x="6258999" y="1091613"/>
             <a:ext cx="1169151" cy="338554"/>
           </a:xfrm>
           <a:prstGeom prst="rect">
@@ -27698,6 +27697,443 @@
           </a:p>
         </p:txBody>
       </p:sp>
+      <p:sp>
+        <p:nvSpPr>
+          <p:cNvPr id="39" name="CuadroTexto 38">
+            <a:extLst>
+              <a:ext uri="{FF2B5EF4-FFF2-40B4-BE49-F238E27FC236}">
+                <a16:creationId xmlns:a16="http://schemas.microsoft.com/office/drawing/2014/main" id="{C8EAE2A9-1D48-4069-9D0F-2D14D1453AA2}"/>
+              </a:ext>
+            </a:extLst>
+          </p:cNvPr>
+          <p:cNvSpPr txBox="1"/>
+          <p:nvPr/>
+        </p:nvSpPr>
+        <p:spPr>
+          <a:xfrm>
+            <a:off x="9839880" y="3106912"/>
+            <a:ext cx="1376218" cy="338554"/>
+          </a:xfrm>
+          <a:prstGeom prst="rect">
+            <a:avLst/>
+          </a:prstGeom>
+          <a:noFill/>
+        </p:spPr>
+        <p:txBody>
+          <a:bodyPr wrap="square" rtlCol="0">
+            <a:spAutoFit/>
+          </a:bodyPr>
+          <a:lstStyle/>
+          <a:p>
+            <a:r>
+              <a:rPr lang="en-US" sz="1600" dirty="0">
+                <a:solidFill>
+                  <a:schemeClr val="bg1"/>
+                </a:solidFill>
+              </a:rPr>
+              <a:t>gets</a:t>
+            </a:r>
+          </a:p>
+        </p:txBody>
+      </p:sp>
+      <p:pic>
+        <p:nvPicPr>
+          <p:cNvPr id="53" name="Imagen 52">
+            <a:extLst>
+              <a:ext uri="{FF2B5EF4-FFF2-40B4-BE49-F238E27FC236}">
+                <a16:creationId xmlns:a16="http://schemas.microsoft.com/office/drawing/2014/main" id="{258348A1-8868-4B4B-B380-B32C7F6D44D0}"/>
+              </a:ext>
+            </a:extLst>
+          </p:cNvPr>
+          <p:cNvPicPr>
+            <a:picLocks noChangeAspect="1"/>
+          </p:cNvPicPr>
+          <p:nvPr/>
+        </p:nvPicPr>
+        <p:blipFill>
+          <a:blip r:embed="rId4"/>
+          <a:stretch>
+            <a:fillRect/>
+          </a:stretch>
+        </p:blipFill>
+        <p:spPr>
+          <a:xfrm>
+            <a:off x="329997" y="4798389"/>
+            <a:ext cx="3219074" cy="1642218"/>
+          </a:xfrm>
+          <a:prstGeom prst="rect">
+            <a:avLst/>
+          </a:prstGeom>
+        </p:spPr>
+      </p:pic>
+      <p:sp>
+        <p:nvSpPr>
+          <p:cNvPr id="95" name="CuadroTexto 94">
+            <a:extLst>
+              <a:ext uri="{FF2B5EF4-FFF2-40B4-BE49-F238E27FC236}">
+                <a16:creationId xmlns:a16="http://schemas.microsoft.com/office/drawing/2014/main" id="{67848249-14A6-4729-A6A1-BB8AF75BB5E5}"/>
+              </a:ext>
+            </a:extLst>
+          </p:cNvPr>
+          <p:cNvSpPr txBox="1"/>
+          <p:nvPr/>
+        </p:nvSpPr>
+        <p:spPr>
+          <a:xfrm>
+            <a:off x="175289" y="3723216"/>
+            <a:ext cx="935768" cy="369332"/>
+          </a:xfrm>
+          <a:prstGeom prst="rect">
+            <a:avLst/>
+          </a:prstGeom>
+          <a:noFill/>
+        </p:spPr>
+        <p:txBody>
+          <a:bodyPr wrap="square" rtlCol="0">
+            <a:spAutoFit/>
+          </a:bodyPr>
+          <a:lstStyle/>
+          <a:p>
+            <a:r>
+              <a:rPr lang="en-US" dirty="0">
+                <a:solidFill>
+                  <a:schemeClr val="bg1"/>
+                </a:solidFill>
+              </a:rPr>
+              <a:t>Usage:</a:t>
+            </a:r>
+          </a:p>
+        </p:txBody>
+      </p:sp>
+      <p:pic>
+        <p:nvPicPr>
+          <p:cNvPr id="98" name="Imagen 97">
+            <a:extLst>
+              <a:ext uri="{FF2B5EF4-FFF2-40B4-BE49-F238E27FC236}">
+                <a16:creationId xmlns:a16="http://schemas.microsoft.com/office/drawing/2014/main" id="{FD217EEE-32A7-4431-A10D-C72C9D432A7D}"/>
+              </a:ext>
+            </a:extLst>
+          </p:cNvPr>
+          <p:cNvPicPr>
+            <a:picLocks noChangeAspect="1"/>
+          </p:cNvPicPr>
+          <p:nvPr/>
+        </p:nvPicPr>
+        <p:blipFill>
+          <a:blip r:embed="rId5"/>
+          <a:stretch>
+            <a:fillRect/>
+          </a:stretch>
+        </p:blipFill>
+        <p:spPr>
+          <a:xfrm>
+            <a:off x="235185" y="2097665"/>
+            <a:ext cx="5328679" cy="598728"/>
+          </a:xfrm>
+          <a:prstGeom prst="rect">
+            <a:avLst/>
+          </a:prstGeom>
+        </p:spPr>
+      </p:pic>
+      <p:pic>
+        <p:nvPicPr>
+          <p:cNvPr id="99" name="Imagen 98">
+            <a:extLst>
+              <a:ext uri="{FF2B5EF4-FFF2-40B4-BE49-F238E27FC236}">
+                <a16:creationId xmlns:a16="http://schemas.microsoft.com/office/drawing/2014/main" id="{B7554640-2141-4ECA-9DBB-AA03B44695E0}"/>
+              </a:ext>
+            </a:extLst>
+          </p:cNvPr>
+          <p:cNvPicPr>
+            <a:picLocks noChangeAspect="1"/>
+          </p:cNvPicPr>
+          <p:nvPr/>
+        </p:nvPicPr>
+        <p:blipFill>
+          <a:blip r:embed="rId6"/>
+          <a:stretch>
+            <a:fillRect/>
+          </a:stretch>
+        </p:blipFill>
+        <p:spPr>
+          <a:xfrm>
+            <a:off x="244407" y="1395745"/>
+            <a:ext cx="5143609" cy="631952"/>
+          </a:xfrm>
+          <a:prstGeom prst="rect">
+            <a:avLst/>
+          </a:prstGeom>
+        </p:spPr>
+      </p:pic>
+      <p:pic>
+        <p:nvPicPr>
+          <p:cNvPr id="100" name="Imagen 99">
+            <a:extLst>
+              <a:ext uri="{FF2B5EF4-FFF2-40B4-BE49-F238E27FC236}">
+                <a16:creationId xmlns:a16="http://schemas.microsoft.com/office/drawing/2014/main" id="{0D705CEE-9F14-416B-8B73-39260594E740}"/>
+              </a:ext>
+            </a:extLst>
+          </p:cNvPr>
+          <p:cNvPicPr>
+            <a:picLocks noChangeAspect="1"/>
+          </p:cNvPicPr>
+          <p:nvPr/>
+        </p:nvPicPr>
+        <p:blipFill>
+          <a:blip r:embed="rId7"/>
+          <a:stretch>
+            <a:fillRect/>
+          </a:stretch>
+        </p:blipFill>
+        <p:spPr>
+          <a:xfrm>
+            <a:off x="235185" y="2755462"/>
+            <a:ext cx="5290656" cy="629285"/>
+          </a:xfrm>
+          <a:prstGeom prst="rect">
+            <a:avLst/>
+          </a:prstGeom>
+        </p:spPr>
+      </p:pic>
+      <p:pic>
+        <p:nvPicPr>
+          <p:cNvPr id="2" name="Imagen 1">
+            <a:extLst>
+              <a:ext uri="{FF2B5EF4-FFF2-40B4-BE49-F238E27FC236}">
+                <a16:creationId xmlns:a16="http://schemas.microsoft.com/office/drawing/2014/main" id="{609F9505-B986-494B-892B-D1F095D77BE1}"/>
+              </a:ext>
+            </a:extLst>
+          </p:cNvPr>
+          <p:cNvPicPr>
+            <a:picLocks noChangeAspect="1"/>
+          </p:cNvPicPr>
+          <p:nvPr/>
+        </p:nvPicPr>
+        <p:blipFill>
+          <a:blip r:embed="rId8"/>
+          <a:stretch>
+            <a:fillRect/>
+          </a:stretch>
+        </p:blipFill>
+        <p:spPr>
+          <a:xfrm>
+            <a:off x="288904" y="4238453"/>
+            <a:ext cx="5431478" cy="446854"/>
+          </a:xfrm>
+          <a:prstGeom prst="rect">
+            <a:avLst/>
+          </a:prstGeom>
+        </p:spPr>
+      </p:pic>
+      <p:pic>
+        <p:nvPicPr>
+          <p:cNvPr id="3" name="Imagen 2">
+            <a:extLst>
+              <a:ext uri="{FF2B5EF4-FFF2-40B4-BE49-F238E27FC236}">
+                <a16:creationId xmlns:a16="http://schemas.microsoft.com/office/drawing/2014/main" id="{9ECA7B51-42E0-45E5-BDA6-E7BA03961FBE}"/>
+              </a:ext>
+            </a:extLst>
+          </p:cNvPr>
+          <p:cNvPicPr>
+            <a:picLocks noChangeAspect="1"/>
+          </p:cNvPicPr>
+          <p:nvPr/>
+        </p:nvPicPr>
+        <p:blipFill>
+          <a:blip r:embed="rId9"/>
+          <a:stretch>
+            <a:fillRect/>
+          </a:stretch>
+        </p:blipFill>
+        <p:spPr>
+          <a:xfrm>
+            <a:off x="6085576" y="3626464"/>
+            <a:ext cx="4970351" cy="3079393"/>
+          </a:xfrm>
+          <a:prstGeom prst="rect">
+            <a:avLst/>
+          </a:prstGeom>
+          <a:effectLst>
+            <a:glow rad="25400">
+              <a:schemeClr val="bg1">
+                <a:alpha val="40000"/>
+              </a:schemeClr>
+            </a:glow>
+          </a:effectLst>
+        </p:spPr>
+      </p:pic>
+      <p:sp>
+        <p:nvSpPr>
+          <p:cNvPr id="30" name="Rectángulo 29"/>
+          <p:cNvSpPr/>
+          <p:nvPr/>
+        </p:nvSpPr>
+        <p:spPr>
+          <a:xfrm>
+            <a:off x="484863" y="351291"/>
+            <a:ext cx="7904064" cy="769441"/>
+          </a:xfrm>
+          <a:prstGeom prst="rect">
+            <a:avLst/>
+          </a:prstGeom>
+        </p:spPr>
+        <p:txBody>
+          <a:bodyPr wrap="square">
+            <a:spAutoFit/>
+          </a:bodyPr>
+          <a:lstStyle/>
+          <a:p>
+            <a:r>
+              <a:rPr lang="es-ES" sz="4400" dirty="0">
+                <a:solidFill>
+                  <a:schemeClr val="bg1"/>
+                </a:solidFill>
+                <a:latin typeface="Segoe UI" panose="020B0502040204020203" pitchFamily="34" charset="0"/>
+                <a:cs typeface="Segoe UI" panose="020B0502040204020203" pitchFamily="34" charset="0"/>
+              </a:rPr>
+              <a:t>Factory </a:t>
+            </a:r>
+            <a:r>
+              <a:rPr lang="es-ES" sz="4400" dirty="0" err="1">
+                <a:solidFill>
+                  <a:schemeClr val="bg1"/>
+                </a:solidFill>
+                <a:latin typeface="Segoe UI" panose="020B0502040204020203" pitchFamily="34" charset="0"/>
+                <a:cs typeface="Segoe UI" panose="020B0502040204020203" pitchFamily="34" charset="0"/>
+              </a:rPr>
+              <a:t>method</a:t>
+            </a:r>
+            <a:r>
+              <a:rPr lang="es-ES" sz="4400" dirty="0">
+                <a:solidFill>
+                  <a:schemeClr val="bg1"/>
+                </a:solidFill>
+                <a:latin typeface="Segoe UI" panose="020B0502040204020203" pitchFamily="34" charset="0"/>
+                <a:cs typeface="Segoe UI" panose="020B0502040204020203" pitchFamily="34" charset="0"/>
+              </a:rPr>
+              <a:t> (</a:t>
+            </a:r>
+            <a:r>
+              <a:rPr lang="es-ES" sz="4400" dirty="0" err="1">
+                <a:solidFill>
+                  <a:schemeClr val="bg1"/>
+                </a:solidFill>
+                <a:latin typeface="Segoe UI" panose="020B0502040204020203" pitchFamily="34" charset="0"/>
+                <a:cs typeface="Segoe UI" panose="020B0502040204020203" pitchFamily="34" charset="0"/>
+              </a:rPr>
+              <a:t>with</a:t>
+            </a:r>
+            <a:r>
+              <a:rPr lang="es-ES" sz="4400" dirty="0">
+                <a:solidFill>
+                  <a:schemeClr val="bg1"/>
+                </a:solidFill>
+                <a:latin typeface="Segoe UI" panose="020B0502040204020203" pitchFamily="34" charset="0"/>
+                <a:cs typeface="Segoe UI" panose="020B0502040204020203" pitchFamily="34" charset="0"/>
+              </a:rPr>
+              <a:t> </a:t>
+            </a:r>
+            <a:r>
+              <a:rPr lang="es-ES" sz="4400" dirty="0" err="1">
+                <a:solidFill>
+                  <a:schemeClr val="bg1"/>
+                </a:solidFill>
+                <a:latin typeface="Segoe UI" panose="020B0502040204020203" pitchFamily="34" charset="0"/>
+                <a:cs typeface="Segoe UI" panose="020B0502040204020203" pitchFamily="34" charset="0"/>
+              </a:rPr>
+              <a:t>params</a:t>
+            </a:r>
+            <a:r>
+              <a:rPr lang="es-ES" sz="4400" dirty="0">
+                <a:solidFill>
+                  <a:schemeClr val="bg1"/>
+                </a:solidFill>
+                <a:latin typeface="Segoe UI" panose="020B0502040204020203" pitchFamily="34" charset="0"/>
+                <a:cs typeface="Segoe UI" panose="020B0502040204020203" pitchFamily="34" charset="0"/>
+              </a:rPr>
+              <a:t>)</a:t>
+            </a:r>
+          </a:p>
+        </p:txBody>
+      </p:sp>
+      <p:sp>
+        <p:nvSpPr>
+          <p:cNvPr id="35" name="CuadroTexto 34">
+            <a:extLst>
+              <a:ext uri="{FF2B5EF4-FFF2-40B4-BE49-F238E27FC236}">
+                <a16:creationId xmlns:a16="http://schemas.microsoft.com/office/drawing/2014/main" id="{8D5F8848-69CC-474A-8B0C-8685958FFF9D}"/>
+              </a:ext>
+            </a:extLst>
+          </p:cNvPr>
+          <p:cNvSpPr txBox="1"/>
+          <p:nvPr/>
+        </p:nvSpPr>
+        <p:spPr>
+          <a:xfrm>
+            <a:off x="7936937" y="474401"/>
+            <a:ext cx="3397994" cy="646331"/>
+          </a:xfrm>
+          <a:prstGeom prst="rect">
+            <a:avLst/>
+          </a:prstGeom>
+          <a:noFill/>
+        </p:spPr>
+        <p:txBody>
+          <a:bodyPr wrap="square" rtlCol="0">
+            <a:spAutoFit/>
+          </a:bodyPr>
+          <a:lstStyle/>
+          <a:p>
+            <a:r>
+              <a:rPr lang="en-US" sz="3600" dirty="0" err="1">
+                <a:solidFill>
+                  <a:srgbClr val="53A2D3"/>
+                </a:solidFill>
+                <a:latin typeface="Segoe UI" panose="020B0502040204020203" pitchFamily="34" charset="0"/>
+                <a:cs typeface="Segoe UI" panose="020B0502040204020203" pitchFamily="34" charset="0"/>
+              </a:rPr>
+              <a:t>realidad</a:t>
+            </a:r>
+            <a:endParaRPr lang="en-US" sz="3600" dirty="0">
+              <a:solidFill>
+                <a:srgbClr val="53A2D3"/>
+              </a:solidFill>
+              <a:latin typeface="Segoe UI" panose="020B0502040204020203" pitchFamily="34" charset="0"/>
+              <a:cs typeface="Segoe UI" panose="020B0502040204020203" pitchFamily="34" charset="0"/>
+            </a:endParaRPr>
+          </a:p>
+        </p:txBody>
+      </p:sp>
+      <p:pic>
+        <p:nvPicPr>
+          <p:cNvPr id="40" name="Imagen 39"/>
+          <p:cNvPicPr>
+            <a:picLocks noChangeAspect="1"/>
+          </p:cNvPicPr>
+          <p:nvPr/>
+        </p:nvPicPr>
+        <p:blipFill>
+          <a:blip r:embed="rId10" cstate="hqprint">
+            <a:extLst>
+              <a:ext uri="{28A0092B-C50C-407E-A947-70E740481C1C}">
+                <a14:useLocalDpi xmlns:a14="http://schemas.microsoft.com/office/drawing/2010/main" val="0"/>
+              </a:ext>
+            </a:extLst>
+          </a:blip>
+          <a:stretch>
+            <a:fillRect/>
+          </a:stretch>
+        </p:blipFill>
+        <p:spPr>
+          <a:xfrm>
+            <a:off x="10676614" y="5268709"/>
+            <a:ext cx="1078969" cy="1078969"/>
+          </a:xfrm>
+          <a:prstGeom prst="rect">
+            <a:avLst/>
+          </a:prstGeom>
+        </p:spPr>
+      </p:pic>
       <p:cxnSp>
         <p:nvCxnSpPr>
           <p:cNvPr id="37" name="Conector recto de flecha 36">
@@ -27712,14 +28148,13 @@
           </p:cNvPr>
           <p:cNvCxnSpPr>
             <a:cxnSpLocks/>
-            <a:endCxn id="13" idx="2"/>
           </p:cNvCxnSpPr>
           <p:nvPr/>
         </p:nvCxnSpPr>
         <p:spPr>
           <a:xfrm flipV="1">
-            <a:off x="9635935" y="3504961"/>
-            <a:ext cx="0" cy="344044"/>
+            <a:off x="9687369" y="2983589"/>
+            <a:ext cx="229517" cy="638278"/>
           </a:xfrm>
           <a:prstGeom prst="straightConnector1">
             <a:avLst/>
@@ -27746,443 +28181,6 @@
           </a:fontRef>
         </p:style>
       </p:cxnSp>
-      <p:sp>
-        <p:nvSpPr>
-          <p:cNvPr id="39" name="CuadroTexto 38">
-            <a:extLst>
-              <a:ext uri="{FF2B5EF4-FFF2-40B4-BE49-F238E27FC236}">
-                <a16:creationId xmlns:a16="http://schemas.microsoft.com/office/drawing/2014/main" id="{C8EAE2A9-1D48-4069-9D0F-2D14D1453AA2}"/>
-              </a:ext>
-            </a:extLst>
-          </p:cNvPr>
-          <p:cNvSpPr txBox="1"/>
-          <p:nvPr/>
-        </p:nvSpPr>
-        <p:spPr>
-          <a:xfrm>
-            <a:off x="9527331" y="1796799"/>
-            <a:ext cx="1376218" cy="338554"/>
-          </a:xfrm>
-          <a:prstGeom prst="rect">
-            <a:avLst/>
-          </a:prstGeom>
-          <a:noFill/>
-        </p:spPr>
-        <p:txBody>
-          <a:bodyPr wrap="square" rtlCol="0">
-            <a:spAutoFit/>
-          </a:bodyPr>
-          <a:lstStyle/>
-          <a:p>
-            <a:r>
-              <a:rPr lang="en-US" sz="1600" dirty="0">
-                <a:solidFill>
-                  <a:schemeClr val="bg1"/>
-                </a:solidFill>
-              </a:rPr>
-              <a:t>gets</a:t>
-            </a:r>
-          </a:p>
-        </p:txBody>
-      </p:sp>
-      <p:pic>
-        <p:nvPicPr>
-          <p:cNvPr id="53" name="Imagen 52">
-            <a:extLst>
-              <a:ext uri="{FF2B5EF4-FFF2-40B4-BE49-F238E27FC236}">
-                <a16:creationId xmlns:a16="http://schemas.microsoft.com/office/drawing/2014/main" id="{258348A1-8868-4B4B-B380-B32C7F6D44D0}"/>
-              </a:ext>
-            </a:extLst>
-          </p:cNvPr>
-          <p:cNvPicPr>
-            <a:picLocks noChangeAspect="1"/>
-          </p:cNvPicPr>
-          <p:nvPr/>
-        </p:nvPicPr>
-        <p:blipFill>
-          <a:blip r:embed="rId4"/>
-          <a:stretch>
-            <a:fillRect/>
-          </a:stretch>
-        </p:blipFill>
-        <p:spPr>
-          <a:xfrm>
-            <a:off x="329997" y="4798389"/>
-            <a:ext cx="3219074" cy="1642218"/>
-          </a:xfrm>
-          <a:prstGeom prst="rect">
-            <a:avLst/>
-          </a:prstGeom>
-        </p:spPr>
-      </p:pic>
-      <p:sp>
-        <p:nvSpPr>
-          <p:cNvPr id="95" name="CuadroTexto 94">
-            <a:extLst>
-              <a:ext uri="{FF2B5EF4-FFF2-40B4-BE49-F238E27FC236}">
-                <a16:creationId xmlns:a16="http://schemas.microsoft.com/office/drawing/2014/main" id="{67848249-14A6-4729-A6A1-BB8AF75BB5E5}"/>
-              </a:ext>
-            </a:extLst>
-          </p:cNvPr>
-          <p:cNvSpPr txBox="1"/>
-          <p:nvPr/>
-        </p:nvSpPr>
-        <p:spPr>
-          <a:xfrm>
-            <a:off x="175289" y="3723216"/>
-            <a:ext cx="935768" cy="369332"/>
-          </a:xfrm>
-          <a:prstGeom prst="rect">
-            <a:avLst/>
-          </a:prstGeom>
-          <a:noFill/>
-        </p:spPr>
-        <p:txBody>
-          <a:bodyPr wrap="square" rtlCol="0">
-            <a:spAutoFit/>
-          </a:bodyPr>
-          <a:lstStyle/>
-          <a:p>
-            <a:r>
-              <a:rPr lang="en-US" dirty="0">
-                <a:solidFill>
-                  <a:schemeClr val="bg1"/>
-                </a:solidFill>
-              </a:rPr>
-              <a:t>Usage:</a:t>
-            </a:r>
-          </a:p>
-        </p:txBody>
-      </p:sp>
-      <p:pic>
-        <p:nvPicPr>
-          <p:cNvPr id="98" name="Imagen 97">
-            <a:extLst>
-              <a:ext uri="{FF2B5EF4-FFF2-40B4-BE49-F238E27FC236}">
-                <a16:creationId xmlns:a16="http://schemas.microsoft.com/office/drawing/2014/main" id="{FD217EEE-32A7-4431-A10D-C72C9D432A7D}"/>
-              </a:ext>
-            </a:extLst>
-          </p:cNvPr>
-          <p:cNvPicPr>
-            <a:picLocks noChangeAspect="1"/>
-          </p:cNvPicPr>
-          <p:nvPr/>
-        </p:nvPicPr>
-        <p:blipFill>
-          <a:blip r:embed="rId5"/>
-          <a:stretch>
-            <a:fillRect/>
-          </a:stretch>
-        </p:blipFill>
-        <p:spPr>
-          <a:xfrm>
-            <a:off x="235185" y="2097665"/>
-            <a:ext cx="5328679" cy="598728"/>
-          </a:xfrm>
-          <a:prstGeom prst="rect">
-            <a:avLst/>
-          </a:prstGeom>
-        </p:spPr>
-      </p:pic>
-      <p:pic>
-        <p:nvPicPr>
-          <p:cNvPr id="99" name="Imagen 98">
-            <a:extLst>
-              <a:ext uri="{FF2B5EF4-FFF2-40B4-BE49-F238E27FC236}">
-                <a16:creationId xmlns:a16="http://schemas.microsoft.com/office/drawing/2014/main" id="{B7554640-2141-4ECA-9DBB-AA03B44695E0}"/>
-              </a:ext>
-            </a:extLst>
-          </p:cNvPr>
-          <p:cNvPicPr>
-            <a:picLocks noChangeAspect="1"/>
-          </p:cNvPicPr>
-          <p:nvPr/>
-        </p:nvPicPr>
-        <p:blipFill>
-          <a:blip r:embed="rId6"/>
-          <a:stretch>
-            <a:fillRect/>
-          </a:stretch>
-        </p:blipFill>
-        <p:spPr>
-          <a:xfrm>
-            <a:off x="244407" y="1395745"/>
-            <a:ext cx="5143609" cy="631952"/>
-          </a:xfrm>
-          <a:prstGeom prst="rect">
-            <a:avLst/>
-          </a:prstGeom>
-        </p:spPr>
-      </p:pic>
-      <p:pic>
-        <p:nvPicPr>
-          <p:cNvPr id="100" name="Imagen 99">
-            <a:extLst>
-              <a:ext uri="{FF2B5EF4-FFF2-40B4-BE49-F238E27FC236}">
-                <a16:creationId xmlns:a16="http://schemas.microsoft.com/office/drawing/2014/main" id="{0D705CEE-9F14-416B-8B73-39260594E740}"/>
-              </a:ext>
-            </a:extLst>
-          </p:cNvPr>
-          <p:cNvPicPr>
-            <a:picLocks noChangeAspect="1"/>
-          </p:cNvPicPr>
-          <p:nvPr/>
-        </p:nvPicPr>
-        <p:blipFill>
-          <a:blip r:embed="rId7"/>
-          <a:stretch>
-            <a:fillRect/>
-          </a:stretch>
-        </p:blipFill>
-        <p:spPr>
-          <a:xfrm>
-            <a:off x="235185" y="2755462"/>
-            <a:ext cx="5290656" cy="629285"/>
-          </a:xfrm>
-          <a:prstGeom prst="rect">
-            <a:avLst/>
-          </a:prstGeom>
-        </p:spPr>
-      </p:pic>
-      <p:pic>
-        <p:nvPicPr>
-          <p:cNvPr id="2" name="Imagen 1">
-            <a:extLst>
-              <a:ext uri="{FF2B5EF4-FFF2-40B4-BE49-F238E27FC236}">
-                <a16:creationId xmlns:a16="http://schemas.microsoft.com/office/drawing/2014/main" id="{609F9505-B986-494B-892B-D1F095D77BE1}"/>
-              </a:ext>
-            </a:extLst>
-          </p:cNvPr>
-          <p:cNvPicPr>
-            <a:picLocks noChangeAspect="1"/>
-          </p:cNvPicPr>
-          <p:nvPr/>
-        </p:nvPicPr>
-        <p:blipFill>
-          <a:blip r:embed="rId8"/>
-          <a:stretch>
-            <a:fillRect/>
-          </a:stretch>
-        </p:blipFill>
-        <p:spPr>
-          <a:xfrm>
-            <a:off x="288904" y="4238453"/>
-            <a:ext cx="5431478" cy="446854"/>
-          </a:xfrm>
-          <a:prstGeom prst="rect">
-            <a:avLst/>
-          </a:prstGeom>
-        </p:spPr>
-      </p:pic>
-      <p:pic>
-        <p:nvPicPr>
-          <p:cNvPr id="3" name="Imagen 2">
-            <a:extLst>
-              <a:ext uri="{FF2B5EF4-FFF2-40B4-BE49-F238E27FC236}">
-                <a16:creationId xmlns:a16="http://schemas.microsoft.com/office/drawing/2014/main" id="{9ECA7B51-42E0-45E5-BDA6-E7BA03961FBE}"/>
-              </a:ext>
-            </a:extLst>
-          </p:cNvPr>
-          <p:cNvPicPr>
-            <a:picLocks noChangeAspect="1"/>
-          </p:cNvPicPr>
-          <p:nvPr/>
-        </p:nvPicPr>
-        <p:blipFill>
-          <a:blip r:embed="rId9"/>
-          <a:stretch>
-            <a:fillRect/>
-          </a:stretch>
-        </p:blipFill>
-        <p:spPr>
-          <a:xfrm>
-            <a:off x="6085576" y="3626464"/>
-            <a:ext cx="4970351" cy="3079393"/>
-          </a:xfrm>
-          <a:prstGeom prst="rect">
-            <a:avLst/>
-          </a:prstGeom>
-          <a:effectLst>
-            <a:glow rad="25400">
-              <a:schemeClr val="bg1">
-                <a:alpha val="40000"/>
-              </a:schemeClr>
-            </a:glow>
-          </a:effectLst>
-        </p:spPr>
-      </p:pic>
-      <p:sp>
-        <p:nvSpPr>
-          <p:cNvPr id="30" name="Rectángulo 29"/>
-          <p:cNvSpPr/>
-          <p:nvPr/>
-        </p:nvSpPr>
-        <p:spPr>
-          <a:xfrm>
-            <a:off x="484863" y="351291"/>
-            <a:ext cx="7904064" cy="769441"/>
-          </a:xfrm>
-          <a:prstGeom prst="rect">
-            <a:avLst/>
-          </a:prstGeom>
-        </p:spPr>
-        <p:txBody>
-          <a:bodyPr wrap="square">
-            <a:spAutoFit/>
-          </a:bodyPr>
-          <a:lstStyle/>
-          <a:p>
-            <a:r>
-              <a:rPr lang="es-ES" sz="4400" dirty="0">
-                <a:solidFill>
-                  <a:schemeClr val="bg1"/>
-                </a:solidFill>
-                <a:latin typeface="Segoe UI" panose="020B0502040204020203" pitchFamily="34" charset="0"/>
-                <a:cs typeface="Segoe UI" panose="020B0502040204020203" pitchFamily="34" charset="0"/>
-              </a:rPr>
-              <a:t>Factory </a:t>
-            </a:r>
-            <a:r>
-              <a:rPr lang="es-ES" sz="4400" dirty="0" err="1">
-                <a:solidFill>
-                  <a:schemeClr val="bg1"/>
-                </a:solidFill>
-                <a:latin typeface="Segoe UI" panose="020B0502040204020203" pitchFamily="34" charset="0"/>
-                <a:cs typeface="Segoe UI" panose="020B0502040204020203" pitchFamily="34" charset="0"/>
-              </a:rPr>
-              <a:t>method</a:t>
-            </a:r>
-            <a:r>
-              <a:rPr lang="es-ES" sz="4400" dirty="0">
-                <a:solidFill>
-                  <a:schemeClr val="bg1"/>
-                </a:solidFill>
-                <a:latin typeface="Segoe UI" panose="020B0502040204020203" pitchFamily="34" charset="0"/>
-                <a:cs typeface="Segoe UI" panose="020B0502040204020203" pitchFamily="34" charset="0"/>
-              </a:rPr>
-              <a:t> (</a:t>
-            </a:r>
-            <a:r>
-              <a:rPr lang="es-ES" sz="4400" dirty="0" err="1">
-                <a:solidFill>
-                  <a:schemeClr val="bg1"/>
-                </a:solidFill>
-                <a:latin typeface="Segoe UI" panose="020B0502040204020203" pitchFamily="34" charset="0"/>
-                <a:cs typeface="Segoe UI" panose="020B0502040204020203" pitchFamily="34" charset="0"/>
-              </a:rPr>
-              <a:t>with</a:t>
-            </a:r>
-            <a:r>
-              <a:rPr lang="es-ES" sz="4400" dirty="0">
-                <a:solidFill>
-                  <a:schemeClr val="bg1"/>
-                </a:solidFill>
-                <a:latin typeface="Segoe UI" panose="020B0502040204020203" pitchFamily="34" charset="0"/>
-                <a:cs typeface="Segoe UI" panose="020B0502040204020203" pitchFamily="34" charset="0"/>
-              </a:rPr>
-              <a:t> </a:t>
-            </a:r>
-            <a:r>
-              <a:rPr lang="es-ES" sz="4400" dirty="0" err="1">
-                <a:solidFill>
-                  <a:schemeClr val="bg1"/>
-                </a:solidFill>
-                <a:latin typeface="Segoe UI" panose="020B0502040204020203" pitchFamily="34" charset="0"/>
-                <a:cs typeface="Segoe UI" panose="020B0502040204020203" pitchFamily="34" charset="0"/>
-              </a:rPr>
-              <a:t>params</a:t>
-            </a:r>
-            <a:r>
-              <a:rPr lang="es-ES" sz="4400" dirty="0">
-                <a:solidFill>
-                  <a:schemeClr val="bg1"/>
-                </a:solidFill>
-                <a:latin typeface="Segoe UI" panose="020B0502040204020203" pitchFamily="34" charset="0"/>
-                <a:cs typeface="Segoe UI" panose="020B0502040204020203" pitchFamily="34" charset="0"/>
-              </a:rPr>
-              <a:t>)</a:t>
-            </a:r>
-          </a:p>
-        </p:txBody>
-      </p:sp>
-      <p:sp>
-        <p:nvSpPr>
-          <p:cNvPr id="35" name="CuadroTexto 34">
-            <a:extLst>
-              <a:ext uri="{FF2B5EF4-FFF2-40B4-BE49-F238E27FC236}">
-                <a16:creationId xmlns:a16="http://schemas.microsoft.com/office/drawing/2014/main" id="{8D5F8848-69CC-474A-8B0C-8685958FFF9D}"/>
-              </a:ext>
-            </a:extLst>
-          </p:cNvPr>
-          <p:cNvSpPr txBox="1"/>
-          <p:nvPr/>
-        </p:nvSpPr>
-        <p:spPr>
-          <a:xfrm>
-            <a:off x="7936937" y="474401"/>
-            <a:ext cx="3397994" cy="646331"/>
-          </a:xfrm>
-          <a:prstGeom prst="rect">
-            <a:avLst/>
-          </a:prstGeom>
-          <a:noFill/>
-        </p:spPr>
-        <p:txBody>
-          <a:bodyPr wrap="square" rtlCol="0">
-            <a:spAutoFit/>
-          </a:bodyPr>
-          <a:lstStyle/>
-          <a:p>
-            <a:r>
-              <a:rPr lang="en-US" sz="3600" dirty="0" err="1">
-                <a:solidFill>
-                  <a:srgbClr val="53A2D3"/>
-                </a:solidFill>
-                <a:latin typeface="Segoe UI" panose="020B0502040204020203" pitchFamily="34" charset="0"/>
-                <a:cs typeface="Segoe UI" panose="020B0502040204020203" pitchFamily="34" charset="0"/>
-              </a:rPr>
-              <a:t>realidad</a:t>
-            </a:r>
-            <a:endParaRPr lang="en-US" sz="3600" dirty="0">
-              <a:solidFill>
-                <a:srgbClr val="53A2D3"/>
-              </a:solidFill>
-              <a:latin typeface="Segoe UI" panose="020B0502040204020203" pitchFamily="34" charset="0"/>
-              <a:cs typeface="Segoe UI" panose="020B0502040204020203" pitchFamily="34" charset="0"/>
-            </a:endParaRPr>
-          </a:p>
-        </p:txBody>
-      </p:sp>
-      <p:pic>
-        <p:nvPicPr>
-          <p:cNvPr id="40" name="Imagen 39"/>
-          <p:cNvPicPr>
-            <a:picLocks noChangeAspect="1"/>
-          </p:cNvPicPr>
-          <p:nvPr/>
-        </p:nvPicPr>
-        <p:blipFill>
-          <a:blip r:embed="rId10" cstate="hqprint">
-            <a:extLst>
-              <a:ext uri="{28A0092B-C50C-407E-A947-70E740481C1C}">
-                <a14:useLocalDpi xmlns:a14="http://schemas.microsoft.com/office/drawing/2010/main" val="0"/>
-              </a:ext>
-            </a:extLst>
-          </a:blip>
-          <a:stretch>
-            <a:fillRect/>
-          </a:stretch>
-        </p:blipFill>
-        <p:spPr>
-          <a:xfrm>
-            <a:off x="10676614" y="5268709"/>
-            <a:ext cx="1078969" cy="1078969"/>
-          </a:xfrm>
-          <a:prstGeom prst="rect">
-            <a:avLst/>
-          </a:prstGeom>
-        </p:spPr>
-      </p:pic>
     </p:spTree>
     <p:extLst>
       <p:ext uri="{BB962C8B-B14F-4D97-AF65-F5344CB8AC3E}">

</xml_diff>

<commit_message>
fixed tooltip adapter component in slides
</commit_message>
<xml_diff>
--- a/slides/Patrones de diseño con Typescript en el mundo real.pptx
+++ b/slides/Patrones de diseño con Typescript en el mundo real.pptx
@@ -233,7 +233,7 @@
           <a:p>
             <a:fld id="{EE51316C-28F6-4304-8589-C6B7F7B17E4E}" type="datetimeFigureOut">
               <a:rPr lang="es-ES" smtClean="0"/>
-              <a:t>19/01/2020</a:t>
+              <a:t>24/01/2020</a:t>
             </a:fld>
             <a:endParaRPr lang="es-ES"/>
           </a:p>
@@ -4680,7 +4680,7 @@
           <a:p>
             <a:fld id="{0985B797-0E29-4660-9B0F-1C71CA65525C}" type="datetimeFigureOut">
               <a:rPr lang="en-US" smtClean="0"/>
-              <a:t>1/19/2020</a:t>
+              <a:t>1/24/2020</a:t>
             </a:fld>
             <a:endParaRPr lang="en-US"/>
           </a:p>
@@ -4880,7 +4880,7 @@
           <a:p>
             <a:fld id="{0985B797-0E29-4660-9B0F-1C71CA65525C}" type="datetimeFigureOut">
               <a:rPr lang="en-US" smtClean="0"/>
-              <a:t>1/19/2020</a:t>
+              <a:t>1/24/2020</a:t>
             </a:fld>
             <a:endParaRPr lang="en-US"/>
           </a:p>
@@ -5090,7 +5090,7 @@
           <a:p>
             <a:fld id="{0985B797-0E29-4660-9B0F-1C71CA65525C}" type="datetimeFigureOut">
               <a:rPr lang="en-US" smtClean="0"/>
-              <a:t>1/19/2020</a:t>
+              <a:t>1/24/2020</a:t>
             </a:fld>
             <a:endParaRPr lang="en-US"/>
           </a:p>
@@ -5290,7 +5290,7 @@
           <a:p>
             <a:fld id="{0985B797-0E29-4660-9B0F-1C71CA65525C}" type="datetimeFigureOut">
               <a:rPr lang="en-US" smtClean="0"/>
-              <a:t>1/19/2020</a:t>
+              <a:t>1/24/2020</a:t>
             </a:fld>
             <a:endParaRPr lang="en-US"/>
           </a:p>
@@ -5566,7 +5566,7 @@
           <a:p>
             <a:fld id="{0985B797-0E29-4660-9B0F-1C71CA65525C}" type="datetimeFigureOut">
               <a:rPr lang="en-US" smtClean="0"/>
-              <a:t>1/19/2020</a:t>
+              <a:t>1/24/2020</a:t>
             </a:fld>
             <a:endParaRPr lang="en-US"/>
           </a:p>
@@ -5834,7 +5834,7 @@
           <a:p>
             <a:fld id="{0985B797-0E29-4660-9B0F-1C71CA65525C}" type="datetimeFigureOut">
               <a:rPr lang="en-US" smtClean="0"/>
-              <a:t>1/19/2020</a:t>
+              <a:t>1/24/2020</a:t>
             </a:fld>
             <a:endParaRPr lang="en-US"/>
           </a:p>
@@ -6249,7 +6249,7 @@
           <a:p>
             <a:fld id="{0985B797-0E29-4660-9B0F-1C71CA65525C}" type="datetimeFigureOut">
               <a:rPr lang="en-US" smtClean="0"/>
-              <a:t>1/19/2020</a:t>
+              <a:t>1/24/2020</a:t>
             </a:fld>
             <a:endParaRPr lang="en-US"/>
           </a:p>
@@ -6391,7 +6391,7 @@
           <a:p>
             <a:fld id="{0985B797-0E29-4660-9B0F-1C71CA65525C}" type="datetimeFigureOut">
               <a:rPr lang="en-US" smtClean="0"/>
-              <a:t>1/19/2020</a:t>
+              <a:t>1/24/2020</a:t>
             </a:fld>
             <a:endParaRPr lang="en-US"/>
           </a:p>
@@ -6504,7 +6504,7 @@
           <a:p>
             <a:fld id="{0985B797-0E29-4660-9B0F-1C71CA65525C}" type="datetimeFigureOut">
               <a:rPr lang="en-US" smtClean="0"/>
-              <a:t>1/19/2020</a:t>
+              <a:t>1/24/2020</a:t>
             </a:fld>
             <a:endParaRPr lang="en-US"/>
           </a:p>
@@ -6817,7 +6817,7 @@
           <a:p>
             <a:fld id="{0985B797-0E29-4660-9B0F-1C71CA65525C}" type="datetimeFigureOut">
               <a:rPr lang="en-US" smtClean="0"/>
-              <a:t>1/19/2020</a:t>
+              <a:t>1/24/2020</a:t>
             </a:fld>
             <a:endParaRPr lang="en-US"/>
           </a:p>
@@ -7106,7 +7106,7 @@
           <a:p>
             <a:fld id="{0985B797-0E29-4660-9B0F-1C71CA65525C}" type="datetimeFigureOut">
               <a:rPr lang="en-US" smtClean="0"/>
-              <a:t>1/19/2020</a:t>
+              <a:t>1/24/2020</a:t>
             </a:fld>
             <a:endParaRPr lang="en-US"/>
           </a:p>
@@ -7349,7 +7349,7 @@
           <a:p>
             <a:fld id="{0985B797-0E29-4660-9B0F-1C71CA65525C}" type="datetimeFigureOut">
               <a:rPr lang="en-US" smtClean="0"/>
-              <a:t>1/19/2020</a:t>
+              <a:t>1/24/2020</a:t>
             </a:fld>
             <a:endParaRPr lang="en-US"/>
           </a:p>
@@ -9140,6 +9140,43 @@
       </p:grpSpPr>
       <p:sp>
         <p:nvSpPr>
+          <p:cNvPr id="12" name="CuadroTexto 11">
+            <a:extLst>
+              <a:ext uri="{FF2B5EF4-FFF2-40B4-BE49-F238E27FC236}">
+                <a16:creationId xmlns:a16="http://schemas.microsoft.com/office/drawing/2014/main" id="{4984E2BF-9736-48EF-99A3-6D7FCC5212CD}"/>
+              </a:ext>
+            </a:extLst>
+          </p:cNvPr>
+          <p:cNvSpPr txBox="1"/>
+          <p:nvPr/>
+        </p:nvSpPr>
+        <p:spPr>
+          <a:xfrm>
+            <a:off x="568859" y="1313975"/>
+            <a:ext cx="7376721" cy="3541043"/>
+          </a:xfrm>
+          <a:prstGeom prst="rect">
+            <a:avLst/>
+          </a:prstGeom>
+          <a:noFill/>
+          <a:ln>
+            <a:solidFill>
+              <a:schemeClr val="bg1"/>
+            </a:solidFill>
+          </a:ln>
+        </p:spPr>
+        <p:txBody>
+          <a:bodyPr wrap="square" rtlCol="0">
+            <a:spAutoFit/>
+          </a:bodyPr>
+          <a:lstStyle/>
+          <a:p>
+            <a:endParaRPr lang="en-US" dirty="0"/>
+          </a:p>
+        </p:txBody>
+      </p:sp>
+      <p:sp>
+        <p:nvSpPr>
           <p:cNvPr id="13" name="CuadroTexto 12">
             <a:extLst>
               <a:ext uri="{FF2B5EF4-FFF2-40B4-BE49-F238E27FC236}">
@@ -9214,66 +9251,6 @@
       </p:pic>
       <p:pic>
         <p:nvPicPr>
-          <p:cNvPr id="8" name="Imagen 7">
-            <a:extLst>
-              <a:ext uri="{FF2B5EF4-FFF2-40B4-BE49-F238E27FC236}">
-                <a16:creationId xmlns:a16="http://schemas.microsoft.com/office/drawing/2014/main" id="{485C5F0C-7AD6-4DE3-9926-D9F267B388D9}"/>
-              </a:ext>
-            </a:extLst>
-          </p:cNvPr>
-          <p:cNvPicPr>
-            <a:picLocks noChangeAspect="1"/>
-          </p:cNvPicPr>
-          <p:nvPr/>
-        </p:nvPicPr>
-        <p:blipFill>
-          <a:blip r:embed="rId3"/>
-          <a:stretch>
-            <a:fillRect/>
-          </a:stretch>
-        </p:blipFill>
-        <p:spPr>
-          <a:xfrm>
-            <a:off x="568859" y="1827350"/>
-            <a:ext cx="6524625" cy="3305175"/>
-          </a:xfrm>
-          <a:prstGeom prst="rect">
-            <a:avLst/>
-          </a:prstGeom>
-        </p:spPr>
-      </p:pic>
-      <p:pic>
-        <p:nvPicPr>
-          <p:cNvPr id="11" name="Imagen 10">
-            <a:extLst>
-              <a:ext uri="{FF2B5EF4-FFF2-40B4-BE49-F238E27FC236}">
-                <a16:creationId xmlns:a16="http://schemas.microsoft.com/office/drawing/2014/main" id="{A16E7029-5441-49AB-A7B5-6206776246F1}"/>
-              </a:ext>
-            </a:extLst>
-          </p:cNvPr>
-          <p:cNvPicPr>
-            <a:picLocks noChangeAspect="1"/>
-          </p:cNvPicPr>
-          <p:nvPr/>
-        </p:nvPicPr>
-        <p:blipFill>
-          <a:blip r:embed="rId4"/>
-          <a:stretch>
-            <a:fillRect/>
-          </a:stretch>
-        </p:blipFill>
-        <p:spPr>
-          <a:xfrm>
-            <a:off x="568859" y="1442890"/>
-            <a:ext cx="7301926" cy="199370"/>
-          </a:xfrm>
-          <a:prstGeom prst="rect">
-            <a:avLst/>
-          </a:prstGeom>
-        </p:spPr>
-      </p:pic>
-      <p:pic>
-        <p:nvPicPr>
           <p:cNvPr id="1026" name="Picture 2" descr="Resultado de imagen de logo npm transparent">
             <a:extLst>
               <a:ext uri="{FF2B5EF4-FFF2-40B4-BE49-F238E27FC236}">
@@ -9287,7 +9264,7 @@
           <p:nvPr/>
         </p:nvPicPr>
         <p:blipFill>
-          <a:blip r:embed="rId5" cstate="hqprint">
+          <a:blip r:embed="rId3" cstate="hqprint">
             <a:extLst>
               <a:ext uri="{28A0092B-C50C-407E-A947-70E740481C1C}">
                 <a14:useLocalDpi xmlns:a14="http://schemas.microsoft.com/office/drawing/2010/main" val="0"/>
@@ -9355,43 +9332,6 @@
               </a:rPr>
               <a:t>ng2-tooltip-directive</a:t>
             </a:r>
-          </a:p>
-        </p:txBody>
-      </p:sp>
-      <p:sp>
-        <p:nvSpPr>
-          <p:cNvPr id="12" name="CuadroTexto 11">
-            <a:extLst>
-              <a:ext uri="{FF2B5EF4-FFF2-40B4-BE49-F238E27FC236}">
-                <a16:creationId xmlns:a16="http://schemas.microsoft.com/office/drawing/2014/main" id="{4984E2BF-9736-48EF-99A3-6D7FCC5212CD}"/>
-              </a:ext>
-            </a:extLst>
-          </p:cNvPr>
-          <p:cNvSpPr txBox="1"/>
-          <p:nvPr/>
-        </p:nvSpPr>
-        <p:spPr>
-          <a:xfrm>
-            <a:off x="568859" y="1313975"/>
-            <a:ext cx="7376723" cy="3818550"/>
-          </a:xfrm>
-          <a:prstGeom prst="rect">
-            <a:avLst/>
-          </a:prstGeom>
-          <a:noFill/>
-          <a:ln>
-            <a:solidFill>
-              <a:schemeClr val="bg1"/>
-            </a:solidFill>
-          </a:ln>
-        </p:spPr>
-        <p:txBody>
-          <a:bodyPr wrap="square" rtlCol="0">
-            <a:spAutoFit/>
-          </a:bodyPr>
-          <a:lstStyle/>
-          <a:p>
-            <a:endParaRPr lang="en-US" dirty="0"/>
           </a:p>
         </p:txBody>
       </p:sp>
@@ -9615,7 +9555,7 @@
           <p:nvPr/>
         </p:nvPicPr>
         <p:blipFill>
-          <a:blip r:embed="rId6" cstate="hqprint">
+          <a:blip r:embed="rId4" cstate="hqprint">
             <a:extLst>
               <a:ext uri="{28A0092B-C50C-407E-A947-70E740481C1C}">
                 <a14:useLocalDpi xmlns:a14="http://schemas.microsoft.com/office/drawing/2010/main" val="0"/>
@@ -9630,6 +9570,36 @@
           <a:xfrm>
             <a:off x="10861876" y="5491473"/>
             <a:ext cx="865997" cy="985445"/>
+          </a:xfrm>
+          <a:prstGeom prst="rect">
+            <a:avLst/>
+          </a:prstGeom>
+        </p:spPr>
+      </p:pic>
+      <p:pic>
+        <p:nvPicPr>
+          <p:cNvPr id="2" name="Imagen 1">
+            <a:extLst>
+              <a:ext uri="{FF2B5EF4-FFF2-40B4-BE49-F238E27FC236}">
+                <a16:creationId xmlns:a16="http://schemas.microsoft.com/office/drawing/2014/main" id="{564576D5-2A15-4FFF-AB88-F2554A76232A}"/>
+              </a:ext>
+            </a:extLst>
+          </p:cNvPr>
+          <p:cNvPicPr>
+            <a:picLocks noChangeAspect="1"/>
+          </p:cNvPicPr>
+          <p:nvPr/>
+        </p:nvPicPr>
+        <p:blipFill>
+          <a:blip r:embed="rId5"/>
+          <a:stretch>
+            <a:fillRect/>
+          </a:stretch>
+        </p:blipFill>
+        <p:spPr>
+          <a:xfrm>
+            <a:off x="649200" y="1546042"/>
+            <a:ext cx="7220981" cy="3087649"/>
           </a:xfrm>
           <a:prstGeom prst="rect">
             <a:avLst/>

</xml_diff>

<commit_message>
modified factory method (abstract instead interface + loggers creation depending on environment)
</commit_message>
<xml_diff>
--- a/slides/Patrones de diseño con Typescript en el mundo real.pptx
+++ b/slides/Patrones de diseño con Typescript en el mundo real.pptx
@@ -233,7 +233,7 @@
           <a:p>
             <a:fld id="{EE51316C-28F6-4304-8589-C6B7F7B17E4E}" type="datetimeFigureOut">
               <a:rPr lang="es-ES" smtClean="0"/>
-              <a:t>24/01/2020</a:t>
+              <a:t>31/01/2020</a:t>
             </a:fld>
             <a:endParaRPr lang="es-ES"/>
           </a:p>
@@ -4680,7 +4680,7 @@
           <a:p>
             <a:fld id="{0985B797-0E29-4660-9B0F-1C71CA65525C}" type="datetimeFigureOut">
               <a:rPr lang="en-US" smtClean="0"/>
-              <a:t>1/24/2020</a:t>
+              <a:t>1/31/2020</a:t>
             </a:fld>
             <a:endParaRPr lang="en-US"/>
           </a:p>
@@ -4880,7 +4880,7 @@
           <a:p>
             <a:fld id="{0985B797-0E29-4660-9B0F-1C71CA65525C}" type="datetimeFigureOut">
               <a:rPr lang="en-US" smtClean="0"/>
-              <a:t>1/24/2020</a:t>
+              <a:t>1/31/2020</a:t>
             </a:fld>
             <a:endParaRPr lang="en-US"/>
           </a:p>
@@ -5090,7 +5090,7 @@
           <a:p>
             <a:fld id="{0985B797-0E29-4660-9B0F-1C71CA65525C}" type="datetimeFigureOut">
               <a:rPr lang="en-US" smtClean="0"/>
-              <a:t>1/24/2020</a:t>
+              <a:t>1/31/2020</a:t>
             </a:fld>
             <a:endParaRPr lang="en-US"/>
           </a:p>
@@ -5290,7 +5290,7 @@
           <a:p>
             <a:fld id="{0985B797-0E29-4660-9B0F-1C71CA65525C}" type="datetimeFigureOut">
               <a:rPr lang="en-US" smtClean="0"/>
-              <a:t>1/24/2020</a:t>
+              <a:t>1/31/2020</a:t>
             </a:fld>
             <a:endParaRPr lang="en-US"/>
           </a:p>
@@ -5566,7 +5566,7 @@
           <a:p>
             <a:fld id="{0985B797-0E29-4660-9B0F-1C71CA65525C}" type="datetimeFigureOut">
               <a:rPr lang="en-US" smtClean="0"/>
-              <a:t>1/24/2020</a:t>
+              <a:t>1/31/2020</a:t>
             </a:fld>
             <a:endParaRPr lang="en-US"/>
           </a:p>
@@ -5834,7 +5834,7 @@
           <a:p>
             <a:fld id="{0985B797-0E29-4660-9B0F-1C71CA65525C}" type="datetimeFigureOut">
               <a:rPr lang="en-US" smtClean="0"/>
-              <a:t>1/24/2020</a:t>
+              <a:t>1/31/2020</a:t>
             </a:fld>
             <a:endParaRPr lang="en-US"/>
           </a:p>
@@ -6249,7 +6249,7 @@
           <a:p>
             <a:fld id="{0985B797-0E29-4660-9B0F-1C71CA65525C}" type="datetimeFigureOut">
               <a:rPr lang="en-US" smtClean="0"/>
-              <a:t>1/24/2020</a:t>
+              <a:t>1/31/2020</a:t>
             </a:fld>
             <a:endParaRPr lang="en-US"/>
           </a:p>
@@ -6391,7 +6391,7 @@
           <a:p>
             <a:fld id="{0985B797-0E29-4660-9B0F-1C71CA65525C}" type="datetimeFigureOut">
               <a:rPr lang="en-US" smtClean="0"/>
-              <a:t>1/24/2020</a:t>
+              <a:t>1/31/2020</a:t>
             </a:fld>
             <a:endParaRPr lang="en-US"/>
           </a:p>
@@ -6504,7 +6504,7 @@
           <a:p>
             <a:fld id="{0985B797-0E29-4660-9B0F-1C71CA65525C}" type="datetimeFigureOut">
               <a:rPr lang="en-US" smtClean="0"/>
-              <a:t>1/24/2020</a:t>
+              <a:t>1/31/2020</a:t>
             </a:fld>
             <a:endParaRPr lang="en-US"/>
           </a:p>
@@ -6817,7 +6817,7 @@
           <a:p>
             <a:fld id="{0985B797-0E29-4660-9B0F-1C71CA65525C}" type="datetimeFigureOut">
               <a:rPr lang="en-US" smtClean="0"/>
-              <a:t>1/24/2020</a:t>
+              <a:t>1/31/2020</a:t>
             </a:fld>
             <a:endParaRPr lang="en-US"/>
           </a:p>
@@ -7106,7 +7106,7 @@
           <a:p>
             <a:fld id="{0985B797-0E29-4660-9B0F-1C71CA65525C}" type="datetimeFigureOut">
               <a:rPr lang="en-US" smtClean="0"/>
-              <a:t>1/24/2020</a:t>
+              <a:t>1/31/2020</a:t>
             </a:fld>
             <a:endParaRPr lang="en-US"/>
           </a:p>
@@ -7349,7 +7349,7 @@
           <a:p>
             <a:fld id="{0985B797-0E29-4660-9B0F-1C71CA65525C}" type="datetimeFigureOut">
               <a:rPr lang="en-US" smtClean="0"/>
-              <a:t>1/24/2020</a:t>
+              <a:t>1/31/2020</a:t>
             </a:fld>
             <a:endParaRPr lang="en-US"/>
           </a:p>
@@ -25435,15 +25435,15 @@
           </p:cNvPr>
           <p:cNvCxnSpPr>
             <a:cxnSpLocks/>
-            <a:stCxn id="17" idx="0"/>
-            <a:endCxn id="16" idx="2"/>
+            <a:stCxn id="3" idx="0"/>
+            <a:endCxn id="2" idx="2"/>
           </p:cNvCxnSpPr>
           <p:nvPr/>
         </p:nvCxnSpPr>
         <p:spPr>
-          <a:xfrm flipH="1" flipV="1">
-            <a:off x="8872306" y="2733234"/>
-            <a:ext cx="1" cy="1260954"/>
+          <a:xfrm flipV="1">
+            <a:off x="8822216" y="2637305"/>
+            <a:ext cx="0" cy="1299059"/>
           </a:xfrm>
           <a:prstGeom prst="straightConnector1">
             <a:avLst/>
@@ -25481,15 +25481,15 @@
           </p:cNvPr>
           <p:cNvCxnSpPr>
             <a:cxnSpLocks/>
-            <a:stCxn id="17" idx="1"/>
+            <a:stCxn id="3" idx="1"/>
             <a:endCxn id="19" idx="3"/>
           </p:cNvCxnSpPr>
           <p:nvPr/>
         </p:nvCxnSpPr>
         <p:spPr>
-          <a:xfrm flipH="1" flipV="1">
+          <a:xfrm flipH="1">
             <a:off x="5412772" y="4665700"/>
-            <a:ext cx="1178297" cy="1"/>
+            <a:ext cx="1152524" cy="0"/>
           </a:xfrm>
           <a:prstGeom prst="straightConnector1">
             <a:avLst/>
@@ -25550,7 +25550,7 @@
                   <a:schemeClr val="bg1"/>
                 </a:solidFill>
               </a:rPr>
-              <a:t>implements</a:t>
+              <a:t>extends</a:t>
             </a:r>
           </a:p>
         </p:txBody>
@@ -25569,7 +25569,7 @@
         </p:nvSpPr>
         <p:spPr>
           <a:xfrm>
-            <a:off x="5553973" y="4256125"/>
+            <a:off x="5617710" y="4256125"/>
             <a:ext cx="1376218" cy="369332"/>
           </a:xfrm>
           <a:prstGeom prst="rect">
@@ -25635,10 +25635,10 @@
       </p:sp>
       <p:pic>
         <p:nvPicPr>
-          <p:cNvPr id="16" name="Picture 20">
-            <a:extLst>
-              <a:ext uri="{FF2B5EF4-FFF2-40B4-BE49-F238E27FC236}">
-                <a16:creationId xmlns:a16="http://schemas.microsoft.com/office/drawing/2014/main" id="{20F5CF87-6066-42DF-A37A-0ED8E41AEC7B}"/>
+          <p:cNvPr id="18" name="Picture 5">
+            <a:extLst>
+              <a:ext uri="{FF2B5EF4-FFF2-40B4-BE49-F238E27FC236}">
+                <a16:creationId xmlns:a16="http://schemas.microsoft.com/office/drawing/2014/main" id="{150E2F75-1749-462D-9A46-C31B36E47638}"/>
               </a:ext>
             </a:extLst>
           </p:cNvPr>
@@ -25655,8 +25655,8 @@
         </p:blipFill>
         <p:spPr>
           <a:xfrm>
-            <a:off x="7391168" y="1875984"/>
-            <a:ext cx="2962275" cy="857250"/>
+            <a:off x="1931386" y="1875984"/>
+            <a:ext cx="2305050" cy="809625"/>
           </a:xfrm>
           <a:prstGeom prst="rect">
             <a:avLst/>
@@ -25672,10 +25672,10 @@
       </p:pic>
       <p:pic>
         <p:nvPicPr>
-          <p:cNvPr id="17" name="Picture 23">
-            <a:extLst>
-              <a:ext uri="{FF2B5EF4-FFF2-40B4-BE49-F238E27FC236}">
-                <a16:creationId xmlns:a16="http://schemas.microsoft.com/office/drawing/2014/main" id="{9CF8FE69-6A1E-4815-8271-299035F12114}"/>
+          <p:cNvPr id="19" name="Picture 6">
+            <a:extLst>
+              <a:ext uri="{FF2B5EF4-FFF2-40B4-BE49-F238E27FC236}">
+                <a16:creationId xmlns:a16="http://schemas.microsoft.com/office/drawing/2014/main" id="{D9CE24AE-88DE-4FC9-8D09-9B4FDF793F56}"/>
               </a:ext>
             </a:extLst>
           </p:cNvPr>
@@ -25692,8 +25692,8 @@
         </p:blipFill>
         <p:spPr>
           <a:xfrm>
-            <a:off x="6591069" y="3994188"/>
-            <a:ext cx="4562475" cy="1343025"/>
+            <a:off x="755047" y="4256125"/>
+            <a:ext cx="4657725" cy="819150"/>
           </a:xfrm>
           <a:prstGeom prst="rect">
             <a:avLst/>
@@ -25707,30 +25707,159 @@
           </a:effectLst>
         </p:spPr>
       </p:pic>
+      <p:sp>
+        <p:nvSpPr>
+          <p:cNvPr id="24" name="CuadroTexto 23">
+            <a:extLst>
+              <a:ext uri="{FF2B5EF4-FFF2-40B4-BE49-F238E27FC236}">
+                <a16:creationId xmlns:a16="http://schemas.microsoft.com/office/drawing/2014/main" id="{8D5F8848-69CC-474A-8B0C-8685958FFF9D}"/>
+              </a:ext>
+            </a:extLst>
+          </p:cNvPr>
+          <p:cNvSpPr txBox="1"/>
+          <p:nvPr/>
+        </p:nvSpPr>
+        <p:spPr>
+          <a:xfrm>
+            <a:off x="4495996" y="447480"/>
+            <a:ext cx="1447800" cy="646331"/>
+          </a:xfrm>
+          <a:prstGeom prst="rect">
+            <a:avLst/>
+          </a:prstGeom>
+          <a:noFill/>
+        </p:spPr>
+        <p:txBody>
+          <a:bodyPr wrap="square" rtlCol="0">
+            <a:spAutoFit/>
+          </a:bodyPr>
+          <a:lstStyle/>
+          <a:p>
+            <a:r>
+              <a:rPr lang="en-US" sz="3600" dirty="0" err="1">
+                <a:solidFill>
+                  <a:srgbClr val="49C593"/>
+                </a:solidFill>
+                <a:latin typeface="Segoe UI" panose="020B0502040204020203" pitchFamily="34" charset="0"/>
+                <a:cs typeface="Segoe UI" panose="020B0502040204020203" pitchFamily="34" charset="0"/>
+              </a:rPr>
+              <a:t>teoría</a:t>
+            </a:r>
+            <a:endParaRPr lang="en-US" sz="3600" dirty="0">
+              <a:solidFill>
+                <a:srgbClr val="49C593"/>
+              </a:solidFill>
+              <a:latin typeface="Segoe UI" panose="020B0502040204020203" pitchFamily="34" charset="0"/>
+              <a:cs typeface="Segoe UI" panose="020B0502040204020203" pitchFamily="34" charset="0"/>
+            </a:endParaRPr>
+          </a:p>
+        </p:txBody>
+      </p:sp>
+      <p:sp>
+        <p:nvSpPr>
+          <p:cNvPr id="25" name="Rectángulo 24"/>
+          <p:cNvSpPr/>
+          <p:nvPr/>
+        </p:nvSpPr>
+        <p:spPr>
+          <a:xfrm>
+            <a:off x="484863" y="351291"/>
+            <a:ext cx="4101187" cy="769441"/>
+          </a:xfrm>
+          <a:prstGeom prst="rect">
+            <a:avLst/>
+          </a:prstGeom>
+        </p:spPr>
+        <p:txBody>
+          <a:bodyPr wrap="none">
+            <a:spAutoFit/>
+          </a:bodyPr>
+          <a:lstStyle/>
+          <a:p>
+            <a:r>
+              <a:rPr lang="es-ES" sz="4400" dirty="0">
+                <a:solidFill>
+                  <a:schemeClr val="bg1"/>
+                </a:solidFill>
+                <a:latin typeface="Segoe UI" panose="020B0502040204020203" pitchFamily="34" charset="0"/>
+                <a:cs typeface="Segoe UI" panose="020B0502040204020203" pitchFamily="34" charset="0"/>
+              </a:rPr>
+              <a:t>Factory </a:t>
+            </a:r>
+            <a:r>
+              <a:rPr lang="es-ES" sz="4400" dirty="0" err="1">
+                <a:solidFill>
+                  <a:schemeClr val="bg1"/>
+                </a:solidFill>
+                <a:latin typeface="Segoe UI" panose="020B0502040204020203" pitchFamily="34" charset="0"/>
+                <a:cs typeface="Segoe UI" panose="020B0502040204020203" pitchFamily="34" charset="0"/>
+              </a:rPr>
+              <a:t>method</a:t>
+            </a:r>
+            <a:endParaRPr lang="es-ES" sz="4400" dirty="0">
+              <a:solidFill>
+                <a:schemeClr val="bg1"/>
+              </a:solidFill>
+              <a:latin typeface="Segoe UI" panose="020B0502040204020203" pitchFamily="34" charset="0"/>
+              <a:cs typeface="Segoe UI" panose="020B0502040204020203" pitchFamily="34" charset="0"/>
+            </a:endParaRPr>
+          </a:p>
+        </p:txBody>
+      </p:sp>
       <p:pic>
         <p:nvPicPr>
-          <p:cNvPr id="18" name="Picture 5">
-            <a:extLst>
-              <a:ext uri="{FF2B5EF4-FFF2-40B4-BE49-F238E27FC236}">
-                <a16:creationId xmlns:a16="http://schemas.microsoft.com/office/drawing/2014/main" id="{150E2F75-1749-462D-9A46-C31B36E47638}"/>
-              </a:ext>
-            </a:extLst>
-          </p:cNvPr>
+          <p:cNvPr id="27" name="Imagen 26"/>
           <p:cNvPicPr>
             <a:picLocks noChangeAspect="1"/>
           </p:cNvPicPr>
           <p:nvPr/>
         </p:nvPicPr>
         <p:blipFill>
-          <a:blip r:embed="rId5"/>
+          <a:blip r:embed="rId5" cstate="hqprint">
+            <a:extLst>
+              <a:ext uri="{28A0092B-C50C-407E-A947-70E740481C1C}">
+                <a14:useLocalDpi xmlns:a14="http://schemas.microsoft.com/office/drawing/2010/main" val="0"/>
+              </a:ext>
+            </a:extLst>
+          </a:blip>
           <a:stretch>
             <a:fillRect/>
           </a:stretch>
         </p:blipFill>
         <p:spPr>
           <a:xfrm>
-            <a:off x="1931386" y="1875984"/>
-            <a:ext cx="2305050" cy="809625"/>
+            <a:off x="10676614" y="5268709"/>
+            <a:ext cx="1078969" cy="1078969"/>
+          </a:xfrm>
+          <a:prstGeom prst="rect">
+            <a:avLst/>
+          </a:prstGeom>
+        </p:spPr>
+      </p:pic>
+      <p:pic>
+        <p:nvPicPr>
+          <p:cNvPr id="2" name="Imagen 1">
+            <a:extLst>
+              <a:ext uri="{FF2B5EF4-FFF2-40B4-BE49-F238E27FC236}">
+                <a16:creationId xmlns:a16="http://schemas.microsoft.com/office/drawing/2014/main" id="{6CC29873-FEBB-4DC7-9AED-FD017F5D8AE8}"/>
+              </a:ext>
+            </a:extLst>
+          </p:cNvPr>
+          <p:cNvPicPr>
+            <a:picLocks noChangeAspect="1"/>
+          </p:cNvPicPr>
+          <p:nvPr/>
+        </p:nvPicPr>
+        <p:blipFill>
+          <a:blip r:embed="rId6"/>
+          <a:stretch>
+            <a:fillRect/>
+          </a:stretch>
+        </p:blipFill>
+        <p:spPr>
+          <a:xfrm>
+            <a:off x="6540546" y="1827680"/>
+            <a:ext cx="4563340" cy="809625"/>
           </a:xfrm>
           <a:prstGeom prst="rect">
             <a:avLst/>
@@ -25746,10 +25875,10 @@
       </p:pic>
       <p:pic>
         <p:nvPicPr>
-          <p:cNvPr id="19" name="Picture 6">
-            <a:extLst>
-              <a:ext uri="{FF2B5EF4-FFF2-40B4-BE49-F238E27FC236}">
-                <a16:creationId xmlns:a16="http://schemas.microsoft.com/office/drawing/2014/main" id="{D9CE24AE-88DE-4FC9-8D09-9B4FDF793F56}"/>
+          <p:cNvPr id="3" name="Imagen 2">
+            <a:extLst>
+              <a:ext uri="{FF2B5EF4-FFF2-40B4-BE49-F238E27FC236}">
+                <a16:creationId xmlns:a16="http://schemas.microsoft.com/office/drawing/2014/main" id="{C24FC2AF-8BAD-42BF-A241-478A57812E14}"/>
               </a:ext>
             </a:extLst>
           </p:cNvPr>
@@ -25759,15 +25888,15 @@
           <p:nvPr/>
         </p:nvPicPr>
         <p:blipFill>
-          <a:blip r:embed="rId6"/>
+          <a:blip r:embed="rId7"/>
           <a:stretch>
             <a:fillRect/>
           </a:stretch>
         </p:blipFill>
         <p:spPr>
           <a:xfrm>
-            <a:off x="755047" y="4256125"/>
-            <a:ext cx="4657725" cy="819150"/>
+            <a:off x="6565296" y="3936364"/>
+            <a:ext cx="4513840" cy="1458671"/>
           </a:xfrm>
           <a:prstGeom prst="rect">
             <a:avLst/>
@@ -25779,135 +25908,6 @@
               </a:schemeClr>
             </a:glow>
           </a:effectLst>
-        </p:spPr>
-      </p:pic>
-      <p:sp>
-        <p:nvSpPr>
-          <p:cNvPr id="24" name="CuadroTexto 23">
-            <a:extLst>
-              <a:ext uri="{FF2B5EF4-FFF2-40B4-BE49-F238E27FC236}">
-                <a16:creationId xmlns:a16="http://schemas.microsoft.com/office/drawing/2014/main" id="{8D5F8848-69CC-474A-8B0C-8685958FFF9D}"/>
-              </a:ext>
-            </a:extLst>
-          </p:cNvPr>
-          <p:cNvSpPr txBox="1"/>
-          <p:nvPr/>
-        </p:nvSpPr>
-        <p:spPr>
-          <a:xfrm>
-            <a:off x="4495996" y="447480"/>
-            <a:ext cx="1447800" cy="646331"/>
-          </a:xfrm>
-          <a:prstGeom prst="rect">
-            <a:avLst/>
-          </a:prstGeom>
-          <a:noFill/>
-        </p:spPr>
-        <p:txBody>
-          <a:bodyPr wrap="square" rtlCol="0">
-            <a:spAutoFit/>
-          </a:bodyPr>
-          <a:lstStyle/>
-          <a:p>
-            <a:r>
-              <a:rPr lang="en-US" sz="3600" dirty="0" err="1">
-                <a:solidFill>
-                  <a:srgbClr val="49C593"/>
-                </a:solidFill>
-                <a:latin typeface="Segoe UI" panose="020B0502040204020203" pitchFamily="34" charset="0"/>
-                <a:cs typeface="Segoe UI" panose="020B0502040204020203" pitchFamily="34" charset="0"/>
-              </a:rPr>
-              <a:t>teoría</a:t>
-            </a:r>
-            <a:endParaRPr lang="en-US" sz="3600" dirty="0">
-              <a:solidFill>
-                <a:srgbClr val="49C593"/>
-              </a:solidFill>
-              <a:latin typeface="Segoe UI" panose="020B0502040204020203" pitchFamily="34" charset="0"/>
-              <a:cs typeface="Segoe UI" panose="020B0502040204020203" pitchFamily="34" charset="0"/>
-            </a:endParaRPr>
-          </a:p>
-        </p:txBody>
-      </p:sp>
-      <p:sp>
-        <p:nvSpPr>
-          <p:cNvPr id="25" name="Rectángulo 24"/>
-          <p:cNvSpPr/>
-          <p:nvPr/>
-        </p:nvSpPr>
-        <p:spPr>
-          <a:xfrm>
-            <a:off x="484863" y="351291"/>
-            <a:ext cx="4101187" cy="769441"/>
-          </a:xfrm>
-          <a:prstGeom prst="rect">
-            <a:avLst/>
-          </a:prstGeom>
-        </p:spPr>
-        <p:txBody>
-          <a:bodyPr wrap="none">
-            <a:spAutoFit/>
-          </a:bodyPr>
-          <a:lstStyle/>
-          <a:p>
-            <a:r>
-              <a:rPr lang="es-ES" sz="4400" dirty="0">
-                <a:solidFill>
-                  <a:schemeClr val="bg1"/>
-                </a:solidFill>
-                <a:latin typeface="Segoe UI" panose="020B0502040204020203" pitchFamily="34" charset="0"/>
-                <a:cs typeface="Segoe UI" panose="020B0502040204020203" pitchFamily="34" charset="0"/>
-              </a:rPr>
-              <a:t>Factory </a:t>
-            </a:r>
-            <a:r>
-              <a:rPr lang="es-ES" sz="4400" dirty="0" err="1">
-                <a:solidFill>
-                  <a:schemeClr val="bg1"/>
-                </a:solidFill>
-                <a:latin typeface="Segoe UI" panose="020B0502040204020203" pitchFamily="34" charset="0"/>
-                <a:cs typeface="Segoe UI" panose="020B0502040204020203" pitchFamily="34" charset="0"/>
-              </a:rPr>
-              <a:t>method</a:t>
-            </a:r>
-            <a:endParaRPr lang="es-ES" sz="4400" dirty="0">
-              <a:solidFill>
-                <a:schemeClr val="bg1"/>
-              </a:solidFill>
-              <a:latin typeface="Segoe UI" panose="020B0502040204020203" pitchFamily="34" charset="0"/>
-              <a:cs typeface="Segoe UI" panose="020B0502040204020203" pitchFamily="34" charset="0"/>
-            </a:endParaRPr>
-          </a:p>
-        </p:txBody>
-      </p:sp>
-      <p:pic>
-        <p:nvPicPr>
-          <p:cNvPr id="27" name="Imagen 26"/>
-          <p:cNvPicPr>
-            <a:picLocks noChangeAspect="1"/>
-          </p:cNvPicPr>
-          <p:nvPr/>
-        </p:nvPicPr>
-        <p:blipFill>
-          <a:blip r:embed="rId7" cstate="hqprint">
-            <a:extLst>
-              <a:ext uri="{28A0092B-C50C-407E-A947-70E740481C1C}">
-                <a14:useLocalDpi xmlns:a14="http://schemas.microsoft.com/office/drawing/2010/main" val="0"/>
-              </a:ext>
-            </a:extLst>
-          </a:blip>
-          <a:stretch>
-            <a:fillRect/>
-          </a:stretch>
-        </p:blipFill>
-        <p:spPr>
-          <a:xfrm>
-            <a:off x="10676614" y="5268709"/>
-            <a:ext cx="1078969" cy="1078969"/>
-          </a:xfrm>
-          <a:prstGeom prst="rect">
-            <a:avLst/>
-          </a:prstGeom>
         </p:spPr>
       </p:pic>
     </p:spTree>
@@ -25970,7 +25970,7 @@
         </p:blipFill>
         <p:spPr>
           <a:xfrm>
-            <a:off x="1599030" y="1663033"/>
+            <a:off x="1435923" y="1358461"/>
             <a:ext cx="2266950" cy="619125"/>
           </a:xfrm>
           <a:prstGeom prst="rect">
@@ -26007,7 +26007,7 @@
         </p:blipFill>
         <p:spPr>
           <a:xfrm>
-            <a:off x="717968" y="3350327"/>
+            <a:off x="554861" y="2995255"/>
             <a:ext cx="4029075" cy="971550"/>
           </a:xfrm>
           <a:prstGeom prst="rect">
@@ -26045,7 +26045,7 @@
         </p:blipFill>
         <p:spPr>
           <a:xfrm>
-            <a:off x="6832963" y="1039514"/>
+            <a:off x="7087193" y="736011"/>
             <a:ext cx="3333750" cy="1304925"/>
           </a:xfrm>
           <a:prstGeom prst="rect">
@@ -26082,7 +26082,7 @@
         </p:blipFill>
         <p:spPr>
           <a:xfrm>
-            <a:off x="8581929" y="3156900"/>
+            <a:off x="8836159" y="2785705"/>
             <a:ext cx="2771775" cy="1390650"/>
           </a:xfrm>
           <a:prstGeom prst="rect">
@@ -26119,7 +26119,7 @@
         </p:blipFill>
         <p:spPr>
           <a:xfrm>
-            <a:off x="5715593" y="3156900"/>
+            <a:off x="5969823" y="2804755"/>
             <a:ext cx="2743200" cy="1371600"/>
           </a:xfrm>
           <a:prstGeom prst="rect">
@@ -26134,43 +26134,6 @@
           </a:effectLst>
         </p:spPr>
       </p:pic>
-      <p:pic>
-        <p:nvPicPr>
-          <p:cNvPr id="10" name="Imagen 9">
-            <a:extLst>
-              <a:ext uri="{FF2B5EF4-FFF2-40B4-BE49-F238E27FC236}">
-                <a16:creationId xmlns:a16="http://schemas.microsoft.com/office/drawing/2014/main" id="{753BA75E-AFB4-43C7-93C5-DBBA2CC5CFE2}"/>
-              </a:ext>
-            </a:extLst>
-          </p:cNvPr>
-          <p:cNvPicPr>
-            <a:picLocks noChangeAspect="1"/>
-          </p:cNvPicPr>
-          <p:nvPr/>
-        </p:nvPicPr>
-        <p:blipFill>
-          <a:blip r:embed="rId7"/>
-          <a:stretch>
-            <a:fillRect/>
-          </a:stretch>
-        </p:blipFill>
-        <p:spPr>
-          <a:xfrm>
-            <a:off x="2468561" y="5135271"/>
-            <a:ext cx="7162800" cy="1076325"/>
-          </a:xfrm>
-          <a:prstGeom prst="rect">
-            <a:avLst/>
-          </a:prstGeom>
-          <a:effectLst>
-            <a:glow rad="25400">
-              <a:schemeClr val="bg1">
-                <a:alpha val="40000"/>
-              </a:schemeClr>
-            </a:glow>
-          </a:effectLst>
-        </p:spPr>
-      </p:pic>
       <p:cxnSp>
         <p:nvCxnSpPr>
           <p:cNvPr id="14" name="Conector recto de flecha 13">
@@ -26188,8 +26151,8 @@
         </p:nvCxnSpPr>
         <p:spPr>
           <a:xfrm flipH="1" flipV="1">
-            <a:off x="2732505" y="2282158"/>
-            <a:ext cx="1" cy="1068169"/>
+            <a:off x="2569398" y="1977586"/>
+            <a:ext cx="1" cy="1017669"/>
           </a:xfrm>
           <a:prstGeom prst="straightConnector1">
             <a:avLst/>
@@ -26233,8 +26196,8 @@
         </p:nvCxnSpPr>
         <p:spPr>
           <a:xfrm flipV="1">
-            <a:off x="7087193" y="2344439"/>
-            <a:ext cx="1412645" cy="812461"/>
+            <a:off x="7341423" y="2040936"/>
+            <a:ext cx="1412645" cy="763819"/>
           </a:xfrm>
           <a:prstGeom prst="straightConnector1">
             <a:avLst/>
@@ -26278,8 +26241,8 @@
         </p:nvCxnSpPr>
         <p:spPr>
           <a:xfrm flipH="1" flipV="1">
-            <a:off x="8499838" y="2344439"/>
-            <a:ext cx="1467979" cy="812461"/>
+            <a:off x="8754068" y="2040936"/>
+            <a:ext cx="1467979" cy="744769"/>
           </a:xfrm>
           <a:prstGeom prst="straightConnector1">
             <a:avLst/>
@@ -26316,6 +26279,7 @@
             </a:extLst>
           </p:cNvPr>
           <p:cNvCxnSpPr>
+            <a:cxnSpLocks/>
             <a:stCxn id="9" idx="1"/>
             <a:endCxn id="4" idx="3"/>
           </p:cNvCxnSpPr>
@@ -26323,8 +26287,8 @@
         </p:nvCxnSpPr>
         <p:spPr>
           <a:xfrm flipH="1" flipV="1">
-            <a:off x="4747043" y="3836102"/>
-            <a:ext cx="968550" cy="6598"/>
+            <a:off x="4583936" y="3481030"/>
+            <a:ext cx="1385887" cy="9525"/>
           </a:xfrm>
           <a:prstGeom prst="straightConnector1">
             <a:avLst/>
@@ -26365,7 +26329,7 @@
         </p:nvSpPr>
         <p:spPr>
           <a:xfrm>
-            <a:off x="9320753" y="2485766"/>
+            <a:off x="9574983" y="2182263"/>
             <a:ext cx="1376218" cy="369332"/>
           </a:xfrm>
           <a:prstGeom prst="rect">
@@ -26404,7 +26368,7 @@
         </p:nvSpPr>
         <p:spPr>
           <a:xfrm>
-            <a:off x="6832963" y="2490822"/>
+            <a:off x="7087193" y="2187319"/>
             <a:ext cx="1376218" cy="369332"/>
           </a:xfrm>
           <a:prstGeom prst="rect">
@@ -26443,7 +26407,7 @@
         </p:nvSpPr>
         <p:spPr>
           <a:xfrm>
-            <a:off x="2782076" y="2589214"/>
+            <a:off x="2618969" y="2284642"/>
             <a:ext cx="1376218" cy="369332"/>
           </a:xfrm>
           <a:prstGeom prst="rect">
@@ -26482,7 +26446,7 @@
         </p:nvSpPr>
         <p:spPr>
           <a:xfrm>
-            <a:off x="2413855" y="4765939"/>
+            <a:off x="169377" y="4676508"/>
             <a:ext cx="935768" cy="369332"/>
           </a:xfrm>
           <a:prstGeom prst="rect">
@@ -26521,7 +26485,7 @@
         </p:nvSpPr>
         <p:spPr>
           <a:xfrm>
-            <a:off x="4829134" y="3408549"/>
+            <a:off x="4845961" y="3111698"/>
             <a:ext cx="1376218" cy="369332"/>
           </a:xfrm>
           <a:prstGeom prst="rect">
@@ -26654,7 +26618,7 @@
           <p:nvPr/>
         </p:nvPicPr>
         <p:blipFill>
-          <a:blip r:embed="rId8" cstate="hqprint">
+          <a:blip r:embed="rId7" cstate="hqprint">
             <a:extLst>
               <a:ext uri="{28A0092B-C50C-407E-A947-70E740481C1C}">
                 <a14:useLocalDpi xmlns:a14="http://schemas.microsoft.com/office/drawing/2010/main" val="0"/>
@@ -26667,7 +26631,7 @@
         </p:blipFill>
         <p:spPr>
           <a:xfrm>
-            <a:off x="10676614" y="5268709"/>
+            <a:off x="10951201" y="5560998"/>
             <a:ext cx="1078969" cy="1078969"/>
           </a:xfrm>
           <a:prstGeom prst="rect">
@@ -26675,6 +26639,250 @@
           </a:prstGeom>
         </p:spPr>
       </p:pic>
+      <p:pic>
+        <p:nvPicPr>
+          <p:cNvPr id="6" name="Imagen 5">
+            <a:extLst>
+              <a:ext uri="{FF2B5EF4-FFF2-40B4-BE49-F238E27FC236}">
+                <a16:creationId xmlns:a16="http://schemas.microsoft.com/office/drawing/2014/main" id="{C9BC8E56-1EAF-44FD-9A65-0890AA6126F8}"/>
+              </a:ext>
+            </a:extLst>
+          </p:cNvPr>
+          <p:cNvPicPr>
+            <a:picLocks noChangeAspect="1"/>
+          </p:cNvPicPr>
+          <p:nvPr/>
+        </p:nvPicPr>
+        <p:blipFill>
+          <a:blip r:embed="rId8"/>
+          <a:stretch>
+            <a:fillRect/>
+          </a:stretch>
+        </p:blipFill>
+        <p:spPr>
+          <a:xfrm>
+            <a:off x="6611690" y="4978663"/>
+            <a:ext cx="4313294" cy="1661304"/>
+          </a:xfrm>
+          <a:prstGeom prst="rect">
+            <a:avLst/>
+          </a:prstGeom>
+          <a:effectLst>
+            <a:glow rad="25400">
+              <a:schemeClr val="bg1">
+                <a:alpha val="40000"/>
+              </a:schemeClr>
+            </a:glow>
+          </a:effectLst>
+        </p:spPr>
+      </p:pic>
+      <p:pic>
+        <p:nvPicPr>
+          <p:cNvPr id="7" name="Imagen 6">
+            <a:extLst>
+              <a:ext uri="{FF2B5EF4-FFF2-40B4-BE49-F238E27FC236}">
+                <a16:creationId xmlns:a16="http://schemas.microsoft.com/office/drawing/2014/main" id="{C89E3786-E217-4E6A-8C99-03CCC1151751}"/>
+              </a:ext>
+            </a:extLst>
+          </p:cNvPr>
+          <p:cNvPicPr>
+            <a:picLocks noChangeAspect="1"/>
+          </p:cNvPicPr>
+          <p:nvPr/>
+        </p:nvPicPr>
+        <p:blipFill>
+          <a:blip r:embed="rId9"/>
+          <a:stretch>
+            <a:fillRect/>
+          </a:stretch>
+        </p:blipFill>
+        <p:spPr>
+          <a:xfrm>
+            <a:off x="269186" y="5092316"/>
+            <a:ext cx="5794839" cy="1174534"/>
+          </a:xfrm>
+          <a:prstGeom prst="rect">
+            <a:avLst/>
+          </a:prstGeom>
+          <a:effectLst>
+            <a:glow rad="25400">
+              <a:schemeClr val="bg1">
+                <a:alpha val="40000"/>
+              </a:schemeClr>
+            </a:glow>
+          </a:effectLst>
+        </p:spPr>
+      </p:pic>
+      <p:cxnSp>
+        <p:nvCxnSpPr>
+          <p:cNvPr id="23" name="Conector recto de flecha 22">
+            <a:extLst>
+              <a:ext uri="{FF2B5EF4-FFF2-40B4-BE49-F238E27FC236}">
+                <a16:creationId xmlns:a16="http://schemas.microsoft.com/office/drawing/2014/main" id="{E3A50647-F6AA-4981-B773-0D7F27CB5307}"/>
+              </a:ext>
+            </a:extLst>
+          </p:cNvPr>
+          <p:cNvCxnSpPr>
+            <a:cxnSpLocks/>
+            <a:stCxn id="6" idx="0"/>
+            <a:endCxn id="9" idx="2"/>
+          </p:cNvCxnSpPr>
+          <p:nvPr/>
+        </p:nvCxnSpPr>
+        <p:spPr>
+          <a:xfrm flipH="1" flipV="1">
+            <a:off x="7341423" y="4176355"/>
+            <a:ext cx="1426914" cy="802308"/>
+          </a:xfrm>
+          <a:prstGeom prst="straightConnector1">
+            <a:avLst/>
+          </a:prstGeom>
+          <a:ln w="12700">
+            <a:solidFill>
+              <a:schemeClr val="bg1"/>
+            </a:solidFill>
+            <a:tailEnd type="triangle"/>
+          </a:ln>
+        </p:spPr>
+        <p:style>
+          <a:lnRef idx="1">
+            <a:schemeClr val="accent1"/>
+          </a:lnRef>
+          <a:fillRef idx="0">
+            <a:schemeClr val="accent1"/>
+          </a:fillRef>
+          <a:effectRef idx="0">
+            <a:schemeClr val="accent1"/>
+          </a:effectRef>
+          <a:fontRef idx="minor">
+            <a:schemeClr val="tx1"/>
+          </a:fontRef>
+        </p:style>
+      </p:cxnSp>
+      <p:sp>
+        <p:nvSpPr>
+          <p:cNvPr id="26" name="CuadroTexto 25">
+            <a:extLst>
+              <a:ext uri="{FF2B5EF4-FFF2-40B4-BE49-F238E27FC236}">
+                <a16:creationId xmlns:a16="http://schemas.microsoft.com/office/drawing/2014/main" id="{22AAB100-6AED-40FC-8806-DB2F2E038392}"/>
+              </a:ext>
+            </a:extLst>
+          </p:cNvPr>
+          <p:cNvSpPr txBox="1"/>
+          <p:nvPr/>
+        </p:nvSpPr>
+        <p:spPr>
+          <a:xfrm>
+            <a:off x="6892180" y="4392843"/>
+            <a:ext cx="1376218" cy="369332"/>
+          </a:xfrm>
+          <a:prstGeom prst="rect">
+            <a:avLst/>
+          </a:prstGeom>
+          <a:noFill/>
+        </p:spPr>
+        <p:txBody>
+          <a:bodyPr wrap="square" rtlCol="0">
+            <a:spAutoFit/>
+          </a:bodyPr>
+          <a:lstStyle/>
+          <a:p>
+            <a:r>
+              <a:rPr lang="en-US" dirty="0">
+                <a:solidFill>
+                  <a:schemeClr val="bg1"/>
+                </a:solidFill>
+              </a:rPr>
+              <a:t>creates</a:t>
+            </a:r>
+          </a:p>
+        </p:txBody>
+      </p:sp>
+      <p:cxnSp>
+        <p:nvCxnSpPr>
+          <p:cNvPr id="27" name="Conector recto de flecha 26">
+            <a:extLst>
+              <a:ext uri="{FF2B5EF4-FFF2-40B4-BE49-F238E27FC236}">
+                <a16:creationId xmlns:a16="http://schemas.microsoft.com/office/drawing/2014/main" id="{0C96292C-A60A-4FB5-BD05-839478A67046}"/>
+              </a:ext>
+            </a:extLst>
+          </p:cNvPr>
+          <p:cNvCxnSpPr>
+            <a:cxnSpLocks/>
+            <a:stCxn id="6" idx="0"/>
+            <a:endCxn id="3" idx="2"/>
+          </p:cNvCxnSpPr>
+          <p:nvPr/>
+        </p:nvCxnSpPr>
+        <p:spPr>
+          <a:xfrm flipV="1">
+            <a:off x="8768337" y="4176355"/>
+            <a:ext cx="1453710" cy="802308"/>
+          </a:xfrm>
+          <a:prstGeom prst="straightConnector1">
+            <a:avLst/>
+          </a:prstGeom>
+          <a:ln w="12700">
+            <a:solidFill>
+              <a:schemeClr val="bg1"/>
+            </a:solidFill>
+            <a:tailEnd type="triangle"/>
+          </a:ln>
+        </p:spPr>
+        <p:style>
+          <a:lnRef idx="1">
+            <a:schemeClr val="accent1"/>
+          </a:lnRef>
+          <a:fillRef idx="0">
+            <a:schemeClr val="accent1"/>
+          </a:fillRef>
+          <a:effectRef idx="0">
+            <a:schemeClr val="accent1"/>
+          </a:effectRef>
+          <a:fontRef idx="minor">
+            <a:schemeClr val="tx1"/>
+          </a:fontRef>
+        </p:style>
+      </p:cxnSp>
+      <p:sp>
+        <p:nvSpPr>
+          <p:cNvPr id="30" name="CuadroTexto 29">
+            <a:extLst>
+              <a:ext uri="{FF2B5EF4-FFF2-40B4-BE49-F238E27FC236}">
+                <a16:creationId xmlns:a16="http://schemas.microsoft.com/office/drawing/2014/main" id="{97808C26-71C8-429E-A670-85346B50C0B3}"/>
+              </a:ext>
+            </a:extLst>
+          </p:cNvPr>
+          <p:cNvSpPr txBox="1"/>
+          <p:nvPr/>
+        </p:nvSpPr>
+        <p:spPr>
+          <a:xfrm>
+            <a:off x="9768216" y="4410465"/>
+            <a:ext cx="1376218" cy="369332"/>
+          </a:xfrm>
+          <a:prstGeom prst="rect">
+            <a:avLst/>
+          </a:prstGeom>
+          <a:noFill/>
+        </p:spPr>
+        <p:txBody>
+          <a:bodyPr wrap="square" rtlCol="0">
+            <a:spAutoFit/>
+          </a:bodyPr>
+          <a:lstStyle/>
+          <a:p>
+            <a:r>
+              <a:rPr lang="en-US" dirty="0">
+                <a:solidFill>
+                  <a:schemeClr val="bg1"/>
+                </a:solidFill>
+              </a:rPr>
+              <a:t>creates</a:t>
+            </a:r>
+          </a:p>
+        </p:txBody>
+      </p:sp>
     </p:spTree>
     <p:extLst>
       <p:ext uri="{BB962C8B-B14F-4D97-AF65-F5344CB8AC3E}">

</xml_diff>